<commit_message>
Commited for Chain Of Resposibility Design Pattern
</commit_message>
<xml_diff>
--- a/DesignPatterns.pptx
+++ b/DesignPatterns.pptx
@@ -20,6 +20,8 @@
     <p:sldId id="268" r:id="rId14"/>
     <p:sldId id="269" r:id="rId15"/>
     <p:sldId id="271" r:id="rId16"/>
+    <p:sldId id="272" r:id="rId17"/>
+    <p:sldId id="273" r:id="rId18"/>
   </p:sldIdLst>
   <p:sldSz cx="12192000" cy="6858000"/>
   <p:notesSz cx="6858000" cy="9144000"/>
@@ -129,8 +131,7 @@
 <file path=ppt/revisionInfo.xml><?xml version="1.0" encoding="utf-8"?>
 <p1510:revInfo xmlns:a="http://schemas.openxmlformats.org/drawingml/2006/main" xmlns:r="http://schemas.openxmlformats.org/officeDocument/2006/relationships" xmlns:p1510="http://schemas.microsoft.com/office/powerpoint/2015/10/main">
   <p1510:revLst>
-    <p1510:client id="{2B8E2204-9F68-4922-875F-CECA66539EED}" v="1" dt="2023-09-08T09:20:49.879"/>
-    <p1510:client id="{AB31B840-5B75-4E75-A826-5505BB4DF856}" v="27" dt="2023-09-08T07:20:25.171"/>
+    <p1510:client id="{2B8E2204-9F68-4922-875F-CECA66539EED}" v="11" dt="2023-09-11T07:16:55.642"/>
   </p1510:revLst>
 </p1510:revInfo>
 </file>
@@ -458,11 +459,64 @@
   </pc:docChgLst>
   <pc:docChgLst>
     <pc:chgData name="Manaswini Ray" userId="451f23f8-43b4-4daa-9511-0c9fb98bad1c" providerId="ADAL" clId="{2B8E2204-9F68-4922-875F-CECA66539EED}"/>
-    <pc:docChg chg="undo custSel addSld delSld modSld">
-      <pc:chgData name="Manaswini Ray" userId="451f23f8-43b4-4daa-9511-0c9fb98bad1c" providerId="ADAL" clId="{2B8E2204-9F68-4922-875F-CECA66539EED}" dt="2023-09-08T09:20:54.746" v="4" actId="47"/>
+    <pc:docChg chg="undo custSel addSld delSld modSld sldOrd">
+      <pc:chgData name="Manaswini Ray" userId="451f23f8-43b4-4daa-9511-0c9fb98bad1c" providerId="ADAL" clId="{2B8E2204-9F68-4922-875F-CECA66539EED}" dt="2023-09-11T07:18:10.181" v="143" actId="20577"/>
       <pc:docMkLst>
         <pc:docMk/>
       </pc:docMkLst>
+      <pc:sldChg chg="delSp modSp mod">
+        <pc:chgData name="Manaswini Ray" userId="451f23f8-43b4-4daa-9511-0c9fb98bad1c" providerId="ADAL" clId="{2B8E2204-9F68-4922-875F-CECA66539EED}" dt="2023-09-11T07:13:32.329" v="60" actId="113"/>
+        <pc:sldMkLst>
+          <pc:docMk/>
+          <pc:sldMk cId="1265598325" sldId="256"/>
+        </pc:sldMkLst>
+        <pc:spChg chg="mod">
+          <ac:chgData name="Manaswini Ray" userId="451f23f8-43b4-4daa-9511-0c9fb98bad1c" providerId="ADAL" clId="{2B8E2204-9F68-4922-875F-CECA66539EED}" dt="2023-09-11T07:13:32.329" v="60" actId="113"/>
+          <ac:spMkLst>
+            <pc:docMk/>
+            <pc:sldMk cId="1265598325" sldId="256"/>
+            <ac:spMk id="2" creationId="{591DB896-D4F9-FFAE-47E6-661EEBDDB081}"/>
+          </ac:spMkLst>
+        </pc:spChg>
+        <pc:spChg chg="del">
+          <ac:chgData name="Manaswini Ray" userId="451f23f8-43b4-4daa-9511-0c9fb98bad1c" providerId="ADAL" clId="{2B8E2204-9F68-4922-875F-CECA66539EED}" dt="2023-09-11T07:13:03.362" v="58" actId="478"/>
+          <ac:spMkLst>
+            <pc:docMk/>
+            <pc:sldMk cId="1265598325" sldId="256"/>
+            <ac:spMk id="3" creationId="{EB1CBDF1-54A8-E1E2-5A3F-6A19E3A5F3B7}"/>
+          </ac:spMkLst>
+        </pc:spChg>
+      </pc:sldChg>
+      <pc:sldChg chg="modSp mod">
+        <pc:chgData name="Manaswini Ray" userId="451f23f8-43b4-4daa-9511-0c9fb98bad1c" providerId="ADAL" clId="{2B8E2204-9F68-4922-875F-CECA66539EED}" dt="2023-09-11T07:12:45.736" v="46" actId="1076"/>
+        <pc:sldMkLst>
+          <pc:docMk/>
+          <pc:sldMk cId="4290494059" sldId="263"/>
+        </pc:sldMkLst>
+        <pc:spChg chg="mod">
+          <ac:chgData name="Manaswini Ray" userId="451f23f8-43b4-4daa-9511-0c9fb98bad1c" providerId="ADAL" clId="{2B8E2204-9F68-4922-875F-CECA66539EED}" dt="2023-09-11T07:12:45.736" v="46" actId="1076"/>
+          <ac:spMkLst>
+            <pc:docMk/>
+            <pc:sldMk cId="4290494059" sldId="263"/>
+            <ac:spMk id="2" creationId="{D7B28076-1F1D-3EF6-3310-7B24D6692A94}"/>
+          </ac:spMkLst>
+        </pc:spChg>
+      </pc:sldChg>
+      <pc:sldChg chg="modSp mod">
+        <pc:chgData name="Manaswini Ray" userId="451f23f8-43b4-4daa-9511-0c9fb98bad1c" providerId="ADAL" clId="{2B8E2204-9F68-4922-875F-CECA66539EED}" dt="2023-09-11T07:12:56.969" v="57" actId="20577"/>
+        <pc:sldMkLst>
+          <pc:docMk/>
+          <pc:sldMk cId="3793449097" sldId="264"/>
+        </pc:sldMkLst>
+        <pc:spChg chg="mod">
+          <ac:chgData name="Manaswini Ray" userId="451f23f8-43b4-4daa-9511-0c9fb98bad1c" providerId="ADAL" clId="{2B8E2204-9F68-4922-875F-CECA66539EED}" dt="2023-09-11T07:12:56.969" v="57" actId="20577"/>
+          <ac:spMkLst>
+            <pc:docMk/>
+            <pc:sldMk cId="3793449097" sldId="264"/>
+            <ac:spMk id="2" creationId="{C064CB06-36C9-7C91-46B8-EC816005A5AC}"/>
+          </ac:spMkLst>
+        </pc:spChg>
+      </pc:sldChg>
       <pc:sldChg chg="addSp delSp mod">
         <pc:chgData name="Manaswini Ray" userId="451f23f8-43b4-4daa-9511-0c9fb98bad1c" providerId="ADAL" clId="{2B8E2204-9F68-4922-875F-CECA66539EED}" dt="2023-09-08T09:20:34.711" v="1" actId="22"/>
         <pc:sldMkLst>
@@ -491,6 +545,92 @@
           <pc:docMk/>
           <pc:sldMk cId="4248181221" sldId="271"/>
         </pc:sldMkLst>
+      </pc:sldChg>
+      <pc:sldChg chg="addSp modSp new mod ord">
+        <pc:chgData name="Manaswini Ray" userId="451f23f8-43b4-4daa-9511-0c9fb98bad1c" providerId="ADAL" clId="{2B8E2204-9F68-4922-875F-CECA66539EED}" dt="2023-09-11T07:13:44.443" v="62" actId="20577"/>
+        <pc:sldMkLst>
+          <pc:docMk/>
+          <pc:sldMk cId="3668497583" sldId="272"/>
+        </pc:sldMkLst>
+        <pc:spChg chg="add mod">
+          <ac:chgData name="Manaswini Ray" userId="451f23f8-43b4-4daa-9511-0c9fb98bad1c" providerId="ADAL" clId="{2B8E2204-9F68-4922-875F-CECA66539EED}" dt="2023-09-11T07:13:44.443" v="62" actId="20577"/>
+          <ac:spMkLst>
+            <pc:docMk/>
+            <pc:sldMk cId="3668497583" sldId="272"/>
+            <ac:spMk id="2" creationId="{80C39ECA-C214-317A-448C-9D9DAF3D0CF9}"/>
+          </ac:spMkLst>
+        </pc:spChg>
+      </pc:sldChg>
+      <pc:sldChg chg="addSp delSp modSp new mod">
+        <pc:chgData name="Manaswini Ray" userId="451f23f8-43b4-4daa-9511-0c9fb98bad1c" providerId="ADAL" clId="{2B8E2204-9F68-4922-875F-CECA66539EED}" dt="2023-09-11T07:18:10.181" v="143" actId="20577"/>
+        <pc:sldMkLst>
+          <pc:docMk/>
+          <pc:sldMk cId="2002171321" sldId="273"/>
+        </pc:sldMkLst>
+        <pc:spChg chg="add mod">
+          <ac:chgData name="Manaswini Ray" userId="451f23f8-43b4-4daa-9511-0c9fb98bad1c" providerId="ADAL" clId="{2B8E2204-9F68-4922-875F-CECA66539EED}" dt="2023-09-11T07:18:10.181" v="143" actId="20577"/>
+          <ac:spMkLst>
+            <pc:docMk/>
+            <pc:sldMk cId="2002171321" sldId="273"/>
+            <ac:spMk id="2" creationId="{B9B7DB80-A829-2C7A-3D7B-37097E64F335}"/>
+          </ac:spMkLst>
+        </pc:spChg>
+        <pc:spChg chg="add mod">
+          <ac:chgData name="Manaswini Ray" userId="451f23f8-43b4-4daa-9511-0c9fb98bad1c" providerId="ADAL" clId="{2B8E2204-9F68-4922-875F-CECA66539EED}" dt="2023-09-11T07:17:47.793" v="139" actId="1076"/>
+          <ac:spMkLst>
+            <pc:docMk/>
+            <pc:sldMk cId="2002171321" sldId="273"/>
+            <ac:spMk id="3" creationId="{60CC4065-14B9-D932-5254-9E5105ED5ED8}"/>
+          </ac:spMkLst>
+        </pc:spChg>
+        <pc:spChg chg="add del">
+          <ac:chgData name="Manaswini Ray" userId="451f23f8-43b4-4daa-9511-0c9fb98bad1c" providerId="ADAL" clId="{2B8E2204-9F68-4922-875F-CECA66539EED}" dt="2023-09-11T07:16:51.308" v="131" actId="478"/>
+          <ac:spMkLst>
+            <pc:docMk/>
+            <pc:sldMk cId="2002171321" sldId="273"/>
+            <ac:spMk id="4" creationId="{64510C3E-A034-39B7-B456-47BE5209525C}"/>
+          </ac:spMkLst>
+        </pc:spChg>
+        <pc:spChg chg="add del">
+          <ac:chgData name="Manaswini Ray" userId="451f23f8-43b4-4daa-9511-0c9fb98bad1c" providerId="ADAL" clId="{2B8E2204-9F68-4922-875F-CECA66539EED}" dt="2023-09-11T07:16:55.642" v="132" actId="478"/>
+          <ac:spMkLst>
+            <pc:docMk/>
+            <pc:sldMk cId="2002171321" sldId="273"/>
+            <ac:spMk id="5" creationId="{80F4B569-2E44-3951-8B84-597710108BB5}"/>
+          </ac:spMkLst>
+        </pc:spChg>
+        <pc:spChg chg="add">
+          <ac:chgData name="Manaswini Ray" userId="451f23f8-43b4-4daa-9511-0c9fb98bad1c" providerId="ADAL" clId="{2B8E2204-9F68-4922-875F-CECA66539EED}" dt="2023-09-11T07:15:58.969" v="118"/>
+          <ac:spMkLst>
+            <pc:docMk/>
+            <pc:sldMk cId="2002171321" sldId="273"/>
+            <ac:spMk id="6" creationId="{A39B4318-922B-BABB-5EAC-B5C8531C66AF}"/>
+          </ac:spMkLst>
+        </pc:spChg>
+        <pc:spChg chg="add del mod">
+          <ac:chgData name="Manaswini Ray" userId="451f23f8-43b4-4daa-9511-0c9fb98bad1c" providerId="ADAL" clId="{2B8E2204-9F68-4922-875F-CECA66539EED}" dt="2023-09-11T07:16:38.966" v="129" actId="478"/>
+          <ac:spMkLst>
+            <pc:docMk/>
+            <pc:sldMk cId="2002171321" sldId="273"/>
+            <ac:spMk id="7" creationId="{0AF89490-F970-90AE-90C4-D0A221141261}"/>
+          </ac:spMkLst>
+        </pc:spChg>
+        <pc:spChg chg="add del mod">
+          <ac:chgData name="Manaswini Ray" userId="451f23f8-43b4-4daa-9511-0c9fb98bad1c" providerId="ADAL" clId="{2B8E2204-9F68-4922-875F-CECA66539EED}" dt="2023-09-11T07:16:45.372" v="130" actId="478"/>
+          <ac:spMkLst>
+            <pc:docMk/>
+            <pc:sldMk cId="2002171321" sldId="273"/>
+            <ac:spMk id="8" creationId="{E36FAC23-D595-4232-EF69-5CFF50907EDE}"/>
+          </ac:spMkLst>
+        </pc:spChg>
+        <pc:spChg chg="add mod">
+          <ac:chgData name="Manaswini Ray" userId="451f23f8-43b4-4daa-9511-0c9fb98bad1c" providerId="ADAL" clId="{2B8E2204-9F68-4922-875F-CECA66539EED}" dt="2023-09-11T07:16:01.746" v="119"/>
+          <ac:spMkLst>
+            <pc:docMk/>
+            <pc:sldMk cId="2002171321" sldId="273"/>
+            <ac:spMk id="9" creationId="{F13E9F8C-BA68-9D5C-71B8-274D01B0F576}"/>
+          </ac:spMkLst>
+        </pc:spChg>
       </pc:sldChg>
     </pc:docChg>
   </pc:docChgLst>
@@ -646,7 +786,7 @@
           <a:p>
             <a:fld id="{A1AA28CD-13E1-4DEA-B553-BCBE77DAC64A}" type="datetimeFigureOut">
               <a:rPr lang="en-IN" smtClean="0"/>
-              <a:t>08-09-2023</a:t>
+              <a:t>11-09-2023</a:t>
             </a:fld>
             <a:endParaRPr lang="en-IN"/>
           </a:p>
@@ -846,7 +986,7 @@
           <a:p>
             <a:fld id="{A1AA28CD-13E1-4DEA-B553-BCBE77DAC64A}" type="datetimeFigureOut">
               <a:rPr lang="en-IN" smtClean="0"/>
-              <a:t>08-09-2023</a:t>
+              <a:t>11-09-2023</a:t>
             </a:fld>
             <a:endParaRPr lang="en-IN"/>
           </a:p>
@@ -1056,7 +1196,7 @@
           <a:p>
             <a:fld id="{A1AA28CD-13E1-4DEA-B553-BCBE77DAC64A}" type="datetimeFigureOut">
               <a:rPr lang="en-IN" smtClean="0"/>
-              <a:t>08-09-2023</a:t>
+              <a:t>11-09-2023</a:t>
             </a:fld>
             <a:endParaRPr lang="en-IN"/>
           </a:p>
@@ -1256,7 +1396,7 @@
           <a:p>
             <a:fld id="{A1AA28CD-13E1-4DEA-B553-BCBE77DAC64A}" type="datetimeFigureOut">
               <a:rPr lang="en-IN" smtClean="0"/>
-              <a:t>08-09-2023</a:t>
+              <a:t>11-09-2023</a:t>
             </a:fld>
             <a:endParaRPr lang="en-IN"/>
           </a:p>
@@ -1532,7 +1672,7 @@
           <a:p>
             <a:fld id="{A1AA28CD-13E1-4DEA-B553-BCBE77DAC64A}" type="datetimeFigureOut">
               <a:rPr lang="en-IN" smtClean="0"/>
-              <a:t>08-09-2023</a:t>
+              <a:t>11-09-2023</a:t>
             </a:fld>
             <a:endParaRPr lang="en-IN"/>
           </a:p>
@@ -1800,7 +1940,7 @@
           <a:p>
             <a:fld id="{A1AA28CD-13E1-4DEA-B553-BCBE77DAC64A}" type="datetimeFigureOut">
               <a:rPr lang="en-IN" smtClean="0"/>
-              <a:t>08-09-2023</a:t>
+              <a:t>11-09-2023</a:t>
             </a:fld>
             <a:endParaRPr lang="en-IN"/>
           </a:p>
@@ -2215,7 +2355,7 @@
           <a:p>
             <a:fld id="{A1AA28CD-13E1-4DEA-B553-BCBE77DAC64A}" type="datetimeFigureOut">
               <a:rPr lang="en-IN" smtClean="0"/>
-              <a:t>08-09-2023</a:t>
+              <a:t>11-09-2023</a:t>
             </a:fld>
             <a:endParaRPr lang="en-IN"/>
           </a:p>
@@ -2357,7 +2497,7 @@
           <a:p>
             <a:fld id="{A1AA28CD-13E1-4DEA-B553-BCBE77DAC64A}" type="datetimeFigureOut">
               <a:rPr lang="en-IN" smtClean="0"/>
-              <a:t>08-09-2023</a:t>
+              <a:t>11-09-2023</a:t>
             </a:fld>
             <a:endParaRPr lang="en-IN"/>
           </a:p>
@@ -2470,7 +2610,7 @@
           <a:p>
             <a:fld id="{A1AA28CD-13E1-4DEA-B553-BCBE77DAC64A}" type="datetimeFigureOut">
               <a:rPr lang="en-IN" smtClean="0"/>
-              <a:t>08-09-2023</a:t>
+              <a:t>11-09-2023</a:t>
             </a:fld>
             <a:endParaRPr lang="en-IN"/>
           </a:p>
@@ -2783,7 +2923,7 @@
           <a:p>
             <a:fld id="{A1AA28CD-13E1-4DEA-B553-BCBE77DAC64A}" type="datetimeFigureOut">
               <a:rPr lang="en-IN" smtClean="0"/>
-              <a:t>08-09-2023</a:t>
+              <a:t>11-09-2023</a:t>
             </a:fld>
             <a:endParaRPr lang="en-IN"/>
           </a:p>
@@ -3072,7 +3212,7 @@
           <a:p>
             <a:fld id="{A1AA28CD-13E1-4DEA-B553-BCBE77DAC64A}" type="datetimeFigureOut">
               <a:rPr lang="en-IN" smtClean="0"/>
-              <a:t>08-09-2023</a:t>
+              <a:t>11-09-2023</a:t>
             </a:fld>
             <a:endParaRPr lang="en-IN"/>
           </a:p>
@@ -3315,7 +3455,7 @@
           <a:p>
             <a:fld id="{A1AA28CD-13E1-4DEA-B553-BCBE77DAC64A}" type="datetimeFigureOut">
               <a:rPr lang="en-IN" smtClean="0"/>
-              <a:t>08-09-2023</a:t>
+              <a:t>11-09-2023</a:t>
             </a:fld>
             <a:endParaRPr lang="en-IN"/>
           </a:p>
@@ -3797,39 +3937,16 @@
         </p:nvSpPr>
         <p:spPr/>
         <p:txBody>
-          <a:bodyPr/>
+          <a:bodyPr>
+            <a:normAutofit/>
+          </a:bodyPr>
           <a:lstStyle/>
           <a:p>
             <a:r>
-              <a:rPr lang="en-US" dirty="0"/>
+              <a:rPr lang="en-US" sz="7200" b="1" dirty="0"/>
               <a:t>Design Patterns</a:t>
             </a:r>
-            <a:endParaRPr lang="en-IN" dirty="0"/>
-          </a:p>
-        </p:txBody>
-      </p:sp>
-      <p:sp>
-        <p:nvSpPr>
-          <p:cNvPr id="3" name="Subtitle 2">
-            <a:extLst>
-              <a:ext uri="{FF2B5EF4-FFF2-40B4-BE49-F238E27FC236}">
-                <a16:creationId xmlns:a16="http://schemas.microsoft.com/office/drawing/2014/main" id="{EB1CBDF1-54A8-E1E2-5A3F-6A19E3A5F3B7}"/>
-              </a:ext>
-            </a:extLst>
-          </p:cNvPr>
-          <p:cNvSpPr>
-            <a:spLocks noGrp="1"/>
-          </p:cNvSpPr>
-          <p:nvPr>
-            <p:ph type="subTitle" idx="1"/>
-          </p:nvPr>
-        </p:nvSpPr>
-        <p:spPr/>
-        <p:txBody>
-          <a:bodyPr/>
-          <a:lstStyle/>
-          <a:p>
-            <a:endParaRPr lang="en-IN"/>
+            <a:endParaRPr lang="en-IN" sz="7200" b="1" dirty="0"/>
           </a:p>
         </p:txBody>
       </p:sp>
@@ -6766,6 +6883,850 @@
 </p:sld>
 </file>
 
+<file path=ppt/slides/slide16.xml><?xml version="1.0" encoding="utf-8"?>
+<p:sld xmlns:a="http://schemas.openxmlformats.org/drawingml/2006/main" xmlns:r="http://schemas.openxmlformats.org/officeDocument/2006/relationships" xmlns:p="http://schemas.openxmlformats.org/presentationml/2006/main">
+  <p:cSld>
+    <p:spTree>
+      <p:nvGrpSpPr>
+        <p:cNvPr id="1" name=""/>
+        <p:cNvGrpSpPr/>
+        <p:nvPr/>
+      </p:nvGrpSpPr>
+      <p:grpSpPr>
+        <a:xfrm>
+          <a:off x="0" y="0"/>
+          <a:ext cx="0" cy="0"/>
+          <a:chOff x="0" y="0"/>
+          <a:chExt cx="0" cy="0"/>
+        </a:xfrm>
+      </p:grpSpPr>
+      <p:sp>
+        <p:nvSpPr>
+          <p:cNvPr id="2" name="Title 1">
+            <a:extLst>
+              <a:ext uri="{FF2B5EF4-FFF2-40B4-BE49-F238E27FC236}">
+                <a16:creationId xmlns:a16="http://schemas.microsoft.com/office/drawing/2014/main" id="{80C39ECA-C214-317A-448C-9D9DAF3D0CF9}"/>
+              </a:ext>
+            </a:extLst>
+          </p:cNvPr>
+          <p:cNvSpPr txBox="1">
+            <a:spLocks/>
+          </p:cNvSpPr>
+          <p:nvPr/>
+        </p:nvSpPr>
+        <p:spPr>
+          <a:xfrm>
+            <a:off x="1692965" y="2235200"/>
+            <a:ext cx="9144000" cy="2387600"/>
+          </a:xfrm>
+          <a:prstGeom prst="rect">
+            <a:avLst/>
+          </a:prstGeom>
+        </p:spPr>
+        <p:txBody>
+          <a:bodyPr>
+            <a:normAutofit/>
+          </a:bodyPr>
+          <a:lstStyle>
+            <a:lvl1pPr algn="l" defTabSz="914400" rtl="0" eaLnBrk="1" latinLnBrk="0" hangingPunct="1">
+              <a:lnSpc>
+                <a:spcPct val="90000"/>
+              </a:lnSpc>
+              <a:spcBef>
+                <a:spcPct val="0"/>
+              </a:spcBef>
+              <a:buNone/>
+              <a:defRPr sz="4400" kern="1200">
+                <a:solidFill>
+                  <a:schemeClr val="tx1"/>
+                </a:solidFill>
+                <a:latin typeface="+mj-lt"/>
+                <a:ea typeface="+mj-ea"/>
+                <a:cs typeface="+mj-cs"/>
+              </a:defRPr>
+            </a:lvl1pPr>
+          </a:lstStyle>
+          <a:p>
+            <a:pPr algn="ctr"/>
+            <a:r>
+              <a:rPr lang="en-US" sz="8000" b="1" dirty="0"/>
+              <a:t>Behavioral Design Patterns</a:t>
+            </a:r>
+            <a:endParaRPr lang="en-IN" sz="8000" b="1" dirty="0"/>
+          </a:p>
+        </p:txBody>
+      </p:sp>
+    </p:spTree>
+    <p:extLst>
+      <p:ext uri="{BB962C8B-B14F-4D97-AF65-F5344CB8AC3E}">
+        <p14:creationId xmlns:p14="http://schemas.microsoft.com/office/powerpoint/2010/main" val="3668497583"/>
+      </p:ext>
+    </p:extLst>
+  </p:cSld>
+  <p:clrMapOvr>
+    <a:masterClrMapping/>
+  </p:clrMapOvr>
+</p:sld>
+</file>
+
+<file path=ppt/slides/slide17.xml><?xml version="1.0" encoding="utf-8"?>
+<p:sld xmlns:a="http://schemas.openxmlformats.org/drawingml/2006/main" xmlns:r="http://schemas.openxmlformats.org/officeDocument/2006/relationships" xmlns:p="http://schemas.openxmlformats.org/presentationml/2006/main">
+  <p:cSld>
+    <p:spTree>
+      <p:nvGrpSpPr>
+        <p:cNvPr id="1" name=""/>
+        <p:cNvGrpSpPr/>
+        <p:nvPr/>
+      </p:nvGrpSpPr>
+      <p:grpSpPr>
+        <a:xfrm>
+          <a:off x="0" y="0"/>
+          <a:ext cx="0" cy="0"/>
+          <a:chOff x="0" y="0"/>
+          <a:chExt cx="0" cy="0"/>
+        </a:xfrm>
+      </p:grpSpPr>
+      <p:sp>
+        <p:nvSpPr>
+          <p:cNvPr id="2" name="Title 1">
+            <a:extLst>
+              <a:ext uri="{FF2B5EF4-FFF2-40B4-BE49-F238E27FC236}">
+                <a16:creationId xmlns:a16="http://schemas.microsoft.com/office/drawing/2014/main" id="{B9B7DB80-A829-2C7A-3D7B-37097E64F335}"/>
+              </a:ext>
+            </a:extLst>
+          </p:cNvPr>
+          <p:cNvSpPr txBox="1">
+            <a:spLocks/>
+          </p:cNvSpPr>
+          <p:nvPr/>
+        </p:nvSpPr>
+        <p:spPr>
+          <a:xfrm>
+            <a:off x="496957" y="417445"/>
+            <a:ext cx="10515600" cy="1325563"/>
+          </a:xfrm>
+          <a:prstGeom prst="rect">
+            <a:avLst/>
+          </a:prstGeom>
+        </p:spPr>
+        <p:txBody>
+          <a:bodyPr/>
+          <a:lstStyle>
+            <a:lvl1pPr algn="l" defTabSz="914400" rtl="0" eaLnBrk="1" latinLnBrk="0" hangingPunct="1">
+              <a:lnSpc>
+                <a:spcPct val="90000"/>
+              </a:lnSpc>
+              <a:spcBef>
+                <a:spcPct val="0"/>
+              </a:spcBef>
+              <a:buNone/>
+              <a:defRPr sz="4400" kern="1200">
+                <a:solidFill>
+                  <a:schemeClr val="tx1"/>
+                </a:solidFill>
+                <a:latin typeface="+mj-lt"/>
+                <a:ea typeface="+mj-ea"/>
+                <a:cs typeface="+mj-cs"/>
+              </a:defRPr>
+            </a:lvl1pPr>
+          </a:lstStyle>
+          <a:p>
+            <a:r>
+              <a:rPr lang="en-US" b="1" u="sng"/>
+              <a:t>Chain Of </a:t>
+            </a:r>
+            <a:r>
+              <a:rPr lang="en-US" b="1" u="sng" dirty="0"/>
+              <a:t>Responsibility Design Pattern</a:t>
+            </a:r>
+            <a:endParaRPr lang="en-IN" b="1" u="sng" dirty="0"/>
+          </a:p>
+        </p:txBody>
+      </p:sp>
+      <p:sp>
+        <p:nvSpPr>
+          <p:cNvPr id="3" name="Content Placeholder 2">
+            <a:extLst>
+              <a:ext uri="{FF2B5EF4-FFF2-40B4-BE49-F238E27FC236}">
+                <a16:creationId xmlns:a16="http://schemas.microsoft.com/office/drawing/2014/main" id="{60CC4065-14B9-D932-5254-9E5105ED5ED8}"/>
+              </a:ext>
+            </a:extLst>
+          </p:cNvPr>
+          <p:cNvSpPr txBox="1">
+            <a:spLocks/>
+          </p:cNvSpPr>
+          <p:nvPr/>
+        </p:nvSpPr>
+        <p:spPr>
+          <a:xfrm>
+            <a:off x="496957" y="1073427"/>
+            <a:ext cx="11280913" cy="5367128"/>
+          </a:xfrm>
+          <a:prstGeom prst="rect">
+            <a:avLst/>
+          </a:prstGeom>
+        </p:spPr>
+        <p:txBody>
+          <a:bodyPr>
+            <a:normAutofit fontScale="92500" lnSpcReduction="20000"/>
+          </a:bodyPr>
+          <a:lstStyle>
+            <a:lvl1pPr marL="228600" indent="-228600" algn="l" defTabSz="914400" rtl="0" eaLnBrk="1" latinLnBrk="0" hangingPunct="1">
+              <a:lnSpc>
+                <a:spcPct val="90000"/>
+              </a:lnSpc>
+              <a:spcBef>
+                <a:spcPts val="1000"/>
+              </a:spcBef>
+              <a:buFont typeface="Arial" panose="020B0604020202020204" pitchFamily="34" charset="0"/>
+              <a:buChar char="•"/>
+              <a:defRPr sz="2800" kern="1200">
+                <a:solidFill>
+                  <a:schemeClr val="tx1"/>
+                </a:solidFill>
+                <a:latin typeface="+mn-lt"/>
+                <a:ea typeface="+mn-ea"/>
+                <a:cs typeface="+mn-cs"/>
+              </a:defRPr>
+            </a:lvl1pPr>
+            <a:lvl2pPr marL="685800" indent="-228600" algn="l" defTabSz="914400" rtl="0" eaLnBrk="1" latinLnBrk="0" hangingPunct="1">
+              <a:lnSpc>
+                <a:spcPct val="90000"/>
+              </a:lnSpc>
+              <a:spcBef>
+                <a:spcPts val="500"/>
+              </a:spcBef>
+              <a:buFont typeface="Arial" panose="020B0604020202020204" pitchFamily="34" charset="0"/>
+              <a:buChar char="•"/>
+              <a:defRPr sz="2400" kern="1200">
+                <a:solidFill>
+                  <a:schemeClr val="tx1"/>
+                </a:solidFill>
+                <a:latin typeface="+mn-lt"/>
+                <a:ea typeface="+mn-ea"/>
+                <a:cs typeface="+mn-cs"/>
+              </a:defRPr>
+            </a:lvl2pPr>
+            <a:lvl3pPr marL="1143000" indent="-228600" algn="l" defTabSz="914400" rtl="0" eaLnBrk="1" latinLnBrk="0" hangingPunct="1">
+              <a:lnSpc>
+                <a:spcPct val="90000"/>
+              </a:lnSpc>
+              <a:spcBef>
+                <a:spcPts val="500"/>
+              </a:spcBef>
+              <a:buFont typeface="Arial" panose="020B0604020202020204" pitchFamily="34" charset="0"/>
+              <a:buChar char="•"/>
+              <a:defRPr sz="2000" kern="1200">
+                <a:solidFill>
+                  <a:schemeClr val="tx1"/>
+                </a:solidFill>
+                <a:latin typeface="+mn-lt"/>
+                <a:ea typeface="+mn-ea"/>
+                <a:cs typeface="+mn-cs"/>
+              </a:defRPr>
+            </a:lvl3pPr>
+            <a:lvl4pPr marL="1600200" indent="-228600" algn="l" defTabSz="914400" rtl="0" eaLnBrk="1" latinLnBrk="0" hangingPunct="1">
+              <a:lnSpc>
+                <a:spcPct val="90000"/>
+              </a:lnSpc>
+              <a:spcBef>
+                <a:spcPts val="500"/>
+              </a:spcBef>
+              <a:buFont typeface="Arial" panose="020B0604020202020204" pitchFamily="34" charset="0"/>
+              <a:buChar char="•"/>
+              <a:defRPr sz="1800" kern="1200">
+                <a:solidFill>
+                  <a:schemeClr val="tx1"/>
+                </a:solidFill>
+                <a:latin typeface="+mn-lt"/>
+                <a:ea typeface="+mn-ea"/>
+                <a:cs typeface="+mn-cs"/>
+              </a:defRPr>
+            </a:lvl4pPr>
+            <a:lvl5pPr marL="2057400" indent="-228600" algn="l" defTabSz="914400" rtl="0" eaLnBrk="1" latinLnBrk="0" hangingPunct="1">
+              <a:lnSpc>
+                <a:spcPct val="90000"/>
+              </a:lnSpc>
+              <a:spcBef>
+                <a:spcPts val="500"/>
+              </a:spcBef>
+              <a:buFont typeface="Arial" panose="020B0604020202020204" pitchFamily="34" charset="0"/>
+              <a:buChar char="•"/>
+              <a:defRPr sz="1800" kern="1200">
+                <a:solidFill>
+                  <a:schemeClr val="tx1"/>
+                </a:solidFill>
+                <a:latin typeface="+mn-lt"/>
+                <a:ea typeface="+mn-ea"/>
+                <a:cs typeface="+mn-cs"/>
+              </a:defRPr>
+            </a:lvl5pPr>
+            <a:lvl6pPr marL="2514600" indent="-228600" algn="l" defTabSz="914400" rtl="0" eaLnBrk="1" latinLnBrk="0" hangingPunct="1">
+              <a:lnSpc>
+                <a:spcPct val="90000"/>
+              </a:lnSpc>
+              <a:spcBef>
+                <a:spcPts val="500"/>
+              </a:spcBef>
+              <a:buFont typeface="Arial" panose="020B0604020202020204" pitchFamily="34" charset="0"/>
+              <a:buChar char="•"/>
+              <a:defRPr sz="1800" kern="1200">
+                <a:solidFill>
+                  <a:schemeClr val="tx1"/>
+                </a:solidFill>
+                <a:latin typeface="+mn-lt"/>
+                <a:ea typeface="+mn-ea"/>
+                <a:cs typeface="+mn-cs"/>
+              </a:defRPr>
+            </a:lvl6pPr>
+            <a:lvl7pPr marL="2971800" indent="-228600" algn="l" defTabSz="914400" rtl="0" eaLnBrk="1" latinLnBrk="0" hangingPunct="1">
+              <a:lnSpc>
+                <a:spcPct val="90000"/>
+              </a:lnSpc>
+              <a:spcBef>
+                <a:spcPts val="500"/>
+              </a:spcBef>
+              <a:buFont typeface="Arial" panose="020B0604020202020204" pitchFamily="34" charset="0"/>
+              <a:buChar char="•"/>
+              <a:defRPr sz="1800" kern="1200">
+                <a:solidFill>
+                  <a:schemeClr val="tx1"/>
+                </a:solidFill>
+                <a:latin typeface="+mn-lt"/>
+                <a:ea typeface="+mn-ea"/>
+                <a:cs typeface="+mn-cs"/>
+              </a:defRPr>
+            </a:lvl7pPr>
+            <a:lvl8pPr marL="3429000" indent="-228600" algn="l" defTabSz="914400" rtl="0" eaLnBrk="1" latinLnBrk="0" hangingPunct="1">
+              <a:lnSpc>
+                <a:spcPct val="90000"/>
+              </a:lnSpc>
+              <a:spcBef>
+                <a:spcPts val="500"/>
+              </a:spcBef>
+              <a:buFont typeface="Arial" panose="020B0604020202020204" pitchFamily="34" charset="0"/>
+              <a:buChar char="•"/>
+              <a:defRPr sz="1800" kern="1200">
+                <a:solidFill>
+                  <a:schemeClr val="tx1"/>
+                </a:solidFill>
+                <a:latin typeface="+mn-lt"/>
+                <a:ea typeface="+mn-ea"/>
+                <a:cs typeface="+mn-cs"/>
+              </a:defRPr>
+            </a:lvl8pPr>
+            <a:lvl9pPr marL="3886200" indent="-228600" algn="l" defTabSz="914400" rtl="0" eaLnBrk="1" latinLnBrk="0" hangingPunct="1">
+              <a:lnSpc>
+                <a:spcPct val="90000"/>
+              </a:lnSpc>
+              <a:spcBef>
+                <a:spcPts val="500"/>
+              </a:spcBef>
+              <a:buFont typeface="Arial" panose="020B0604020202020204" pitchFamily="34" charset="0"/>
+              <a:buChar char="•"/>
+              <a:defRPr sz="1800" kern="1200">
+                <a:solidFill>
+                  <a:schemeClr val="tx1"/>
+                </a:solidFill>
+                <a:latin typeface="+mn-lt"/>
+                <a:ea typeface="+mn-ea"/>
+                <a:cs typeface="+mn-cs"/>
+              </a:defRPr>
+            </a:lvl9pPr>
+          </a:lstStyle>
+          <a:p>
+            <a:endParaRPr lang="en-US" sz="1600" b="0" i="0" dirty="0">
+              <a:solidFill>
+                <a:srgbClr val="333333"/>
+              </a:solidFill>
+              <a:effectLst/>
+              <a:latin typeface="inter-regular"/>
+            </a:endParaRPr>
+          </a:p>
+          <a:p>
+            <a:r>
+              <a:rPr lang="en-US" sz="2200" dirty="0">
+                <a:solidFill>
+                  <a:srgbClr val="333333"/>
+                </a:solidFill>
+                <a:latin typeface="inter-regular"/>
+              </a:rPr>
+              <a:t>It says </a:t>
+            </a:r>
+            <a:r>
+              <a:rPr lang="en-US" sz="2200" b="0" i="0" dirty="0">
+                <a:solidFill>
+                  <a:srgbClr val="333333"/>
+                </a:solidFill>
+                <a:effectLst/>
+                <a:latin typeface="inter-regular"/>
+              </a:rPr>
+              <a:t>that just </a:t>
+            </a:r>
+            <a:r>
+              <a:rPr lang="en-US" sz="2200" b="1" i="0" dirty="0">
+                <a:solidFill>
+                  <a:srgbClr val="333333"/>
+                </a:solidFill>
+                <a:effectLst/>
+                <a:latin typeface="inter-bold"/>
+              </a:rPr>
+              <a:t> "</a:t>
+            </a:r>
+            <a:r>
+              <a:rPr lang="en-US" sz="2200" b="1" dirty="0">
+                <a:solidFill>
+                  <a:srgbClr val="333333"/>
+                </a:solidFill>
+                <a:latin typeface="inter-bold"/>
+              </a:rPr>
+              <a:t>a</a:t>
+            </a:r>
+            <a:r>
+              <a:rPr lang="en-US" sz="2200" b="1" i="0" dirty="0">
+                <a:solidFill>
+                  <a:srgbClr val="333333"/>
+                </a:solidFill>
+                <a:effectLst/>
+                <a:latin typeface="inter-bold"/>
+              </a:rPr>
+              <a:t>void coupling the sender of a request to its receiver by giving multiple objects a chance to handle the request".</a:t>
+            </a:r>
+            <a:r>
+              <a:rPr lang="en-US" sz="2200" b="0" i="0" dirty="0">
+                <a:solidFill>
+                  <a:srgbClr val="333333"/>
+                </a:solidFill>
+                <a:effectLst/>
+                <a:latin typeface="inter-regular"/>
+              </a:rPr>
+              <a:t> </a:t>
+            </a:r>
+          </a:p>
+          <a:p>
+            <a:pPr marL="0" indent="0">
+              <a:buNone/>
+            </a:pPr>
+            <a:r>
+              <a:rPr lang="en-US" sz="2200" b="1" u="sng" dirty="0">
+                <a:solidFill>
+                  <a:srgbClr val="333333"/>
+                </a:solidFill>
+                <a:latin typeface="inter-regular"/>
+              </a:rPr>
+              <a:t>Advantages</a:t>
+            </a:r>
+            <a:r>
+              <a:rPr lang="en-US" sz="2200" b="1" dirty="0">
+                <a:solidFill>
+                  <a:srgbClr val="333333"/>
+                </a:solidFill>
+                <a:latin typeface="inter-regular"/>
+              </a:rPr>
+              <a:t>:-</a:t>
+            </a:r>
+          </a:p>
+          <a:p>
+            <a:pPr algn="just">
+              <a:buFont typeface="Arial" panose="020B0604020202020204" pitchFamily="34" charset="0"/>
+              <a:buChar char="•"/>
+            </a:pPr>
+            <a:r>
+              <a:rPr lang="en-US" sz="2400" b="0" i="0" dirty="0">
+                <a:solidFill>
+                  <a:srgbClr val="000000"/>
+                </a:solidFill>
+                <a:effectLst/>
+                <a:latin typeface="inter-regular"/>
+              </a:rPr>
+              <a:t>It reduces the coupling.</a:t>
+            </a:r>
+          </a:p>
+          <a:p>
+            <a:pPr algn="just">
+              <a:buFont typeface="Arial" panose="020B0604020202020204" pitchFamily="34" charset="0"/>
+              <a:buChar char="•"/>
+            </a:pPr>
+            <a:r>
+              <a:rPr lang="en-US" sz="2400" b="0" i="0" dirty="0">
+                <a:solidFill>
+                  <a:srgbClr val="000000"/>
+                </a:solidFill>
+                <a:effectLst/>
+                <a:latin typeface="inter-regular"/>
+              </a:rPr>
+              <a:t>It adds flexibility while assigning the responsibilities to objects.</a:t>
+            </a:r>
+          </a:p>
+          <a:p>
+            <a:pPr algn="just">
+              <a:buFont typeface="Arial" panose="020B0604020202020204" pitchFamily="34" charset="0"/>
+              <a:buChar char="•"/>
+            </a:pPr>
+            <a:r>
+              <a:rPr lang="en-US" sz="2400" b="0" i="0" dirty="0">
+                <a:solidFill>
+                  <a:srgbClr val="000000"/>
+                </a:solidFill>
+                <a:effectLst/>
+                <a:latin typeface="inter-regular"/>
+              </a:rPr>
+              <a:t>It allows a set of classes to act as one; events produced in one class can be sent to other handler classes with the help of composition.</a:t>
+            </a:r>
+            <a:endParaRPr lang="en-US" sz="2000" b="0" i="0" dirty="0">
+              <a:solidFill>
+                <a:srgbClr val="000000"/>
+              </a:solidFill>
+              <a:effectLst/>
+              <a:latin typeface="inter-regular"/>
+            </a:endParaRPr>
+          </a:p>
+          <a:p>
+            <a:pPr marL="0" indent="0">
+              <a:buNone/>
+            </a:pPr>
+            <a:br>
+              <a:rPr lang="en-US" sz="1600" dirty="0"/>
+            </a:br>
+            <a:r>
+              <a:rPr lang="en-US" sz="2200" b="1" u="sng" dirty="0">
+                <a:solidFill>
+                  <a:srgbClr val="000000"/>
+                </a:solidFill>
+                <a:latin typeface="inter-regular"/>
+              </a:rPr>
+              <a:t>Usage</a:t>
+            </a:r>
+            <a:r>
+              <a:rPr lang="en-US" sz="2200" b="1" dirty="0">
+                <a:solidFill>
+                  <a:srgbClr val="000000"/>
+                </a:solidFill>
+                <a:latin typeface="inter-regular"/>
+              </a:rPr>
+              <a:t>:-</a:t>
+            </a:r>
+          </a:p>
+          <a:p>
+            <a:pPr algn="just">
+              <a:buFont typeface="Arial" panose="020B0604020202020204" pitchFamily="34" charset="0"/>
+              <a:buChar char="•"/>
+            </a:pPr>
+            <a:r>
+              <a:rPr lang="en-US" sz="2400" b="0" i="0" dirty="0">
+                <a:solidFill>
+                  <a:srgbClr val="000000"/>
+                </a:solidFill>
+                <a:effectLst/>
+                <a:latin typeface="inter-regular"/>
+              </a:rPr>
+              <a:t>When more than one object can handle a request and the handler is unknown.</a:t>
+            </a:r>
+          </a:p>
+          <a:p>
+            <a:pPr algn="just">
+              <a:buFont typeface="Arial" panose="020B0604020202020204" pitchFamily="34" charset="0"/>
+              <a:buChar char="•"/>
+            </a:pPr>
+            <a:r>
+              <a:rPr lang="en-US" sz="2400" b="0" i="0" dirty="0">
+                <a:solidFill>
+                  <a:srgbClr val="000000"/>
+                </a:solidFill>
+                <a:effectLst/>
+                <a:latin typeface="inter-regular"/>
+              </a:rPr>
+              <a:t>When the group of objects that can handle the request must be specified in dynamic way.</a:t>
+            </a:r>
+            <a:br>
+              <a:rPr lang="en-US" sz="2400" dirty="0"/>
+            </a:br>
+            <a:endParaRPr lang="en-US" sz="2400" b="0" i="0" dirty="0">
+              <a:solidFill>
+                <a:srgbClr val="000000"/>
+              </a:solidFill>
+              <a:effectLst/>
+              <a:latin typeface="inter-regular"/>
+            </a:endParaRPr>
+          </a:p>
+          <a:p>
+            <a:pPr marL="0" indent="0" algn="just">
+              <a:buFont typeface="Arial" panose="020B0604020202020204" pitchFamily="34" charset="0"/>
+              <a:buNone/>
+            </a:pPr>
+            <a:r>
+              <a:rPr lang="en-US" sz="2200" b="1" u="sng" dirty="0">
+                <a:solidFill>
+                  <a:schemeClr val="tx1">
+                    <a:lumMod val="95000"/>
+                    <a:lumOff val="5000"/>
+                  </a:schemeClr>
+                </a:solidFill>
+                <a:latin typeface="Google Sans"/>
+              </a:rPr>
+              <a:t>Real-Time Example</a:t>
+            </a:r>
+            <a:r>
+              <a:rPr lang="en-US" sz="2200" dirty="0">
+                <a:solidFill>
+                  <a:schemeClr val="tx1">
+                    <a:lumMod val="95000"/>
+                    <a:lumOff val="5000"/>
+                  </a:schemeClr>
+                </a:solidFill>
+                <a:latin typeface="Google Sans"/>
+              </a:rPr>
+              <a:t>:-</a:t>
+            </a:r>
+          </a:p>
+          <a:p>
+            <a:r>
+              <a:rPr lang="en-US" sz="2400" b="0" i="0" dirty="0">
+                <a:solidFill>
+                  <a:schemeClr val="tx1">
+                    <a:lumMod val="95000"/>
+                    <a:lumOff val="5000"/>
+                  </a:schemeClr>
+                </a:solidFill>
+                <a:effectLst/>
+                <a:latin typeface="Google Sans"/>
+              </a:rPr>
+              <a:t>ATM Dispense machine. The user enters the amount to be dispensed and the machine dispense amount in terms of defined currency bills such as 50$, 20$, 10$ etc. If the user enters an amount that is not multiples of 10, it throws error</a:t>
+            </a:r>
+            <a:endParaRPr lang="en-IN" sz="2400" dirty="0">
+              <a:solidFill>
+                <a:schemeClr val="tx1">
+                  <a:lumMod val="95000"/>
+                  <a:lumOff val="5000"/>
+                </a:schemeClr>
+              </a:solidFill>
+            </a:endParaRPr>
+          </a:p>
+        </p:txBody>
+      </p:sp>
+      <p:sp>
+        <p:nvSpPr>
+          <p:cNvPr id="6" name="Rectangle 3">
+            <a:extLst>
+              <a:ext uri="{FF2B5EF4-FFF2-40B4-BE49-F238E27FC236}">
+                <a16:creationId xmlns:a16="http://schemas.microsoft.com/office/drawing/2014/main" id="{A39B4318-922B-BABB-5EAC-B5C8531C66AF}"/>
+              </a:ext>
+            </a:extLst>
+          </p:cNvPr>
+          <p:cNvSpPr>
+            <a:spLocks noChangeArrowheads="1"/>
+          </p:cNvSpPr>
+          <p:nvPr/>
+        </p:nvSpPr>
+        <p:spPr bwMode="auto">
+          <a:xfrm>
+            <a:off x="0" y="15875"/>
+            <a:ext cx="12192000" cy="0"/>
+          </a:xfrm>
+          <a:prstGeom prst="rect">
+            <a:avLst/>
+          </a:prstGeom>
+          <a:noFill/>
+          <a:ln>
+            <a:noFill/>
+          </a:ln>
+          <a:effectLst/>
+          <a:extLst>
+            <a:ext uri="{909E8E84-426E-40DD-AFC4-6F175D3DCCD1}">
+              <a14:hiddenFill xmlns:a14="http://schemas.microsoft.com/office/drawing/2010/main">
+                <a:solidFill>
+                  <a:schemeClr val="accent1"/>
+                </a:solidFill>
+              </a14:hiddenFill>
+            </a:ext>
+            <a:ext uri="{91240B29-F687-4F45-9708-019B960494DF}">
+              <a14:hiddenLine xmlns:a14="http://schemas.microsoft.com/office/drawing/2010/main" w="9525">
+                <a:solidFill>
+                  <a:schemeClr val="tx1"/>
+                </a:solidFill>
+                <a:miter lim="800000"/>
+                <a:headEnd/>
+                <a:tailEnd/>
+              </a14:hiddenLine>
+            </a:ext>
+            <a:ext uri="{AF507438-7753-43E0-B8FC-AC1667EBCBE1}">
+              <a14:hiddenEffects xmlns:a14="http://schemas.microsoft.com/office/drawing/2010/main">
+                <a:effectLst>
+                  <a:outerShdw dist="35921" dir="2700000" algn="ctr" rotWithShape="0">
+                    <a:schemeClr val="bg2"/>
+                  </a:outerShdw>
+                </a:effectLst>
+              </a14:hiddenEffects>
+            </a:ext>
+          </a:extLst>
+        </p:spPr>
+        <p:txBody>
+          <a:bodyPr vert="horz" wrap="none" lIns="91440" tIns="45720" rIns="91440" bIns="45720" numCol="1" anchor="ctr" anchorCtr="0" compatLnSpc="1">
+            <a:prstTxWarp prst="textNoShape">
+              <a:avLst/>
+            </a:prstTxWarp>
+            <a:spAutoFit/>
+          </a:bodyPr>
+          <a:lstStyle/>
+          <a:p>
+            <a:pPr marL="0" marR="0" lvl="0" indent="0" algn="l" defTabSz="914400" rtl="0" eaLnBrk="0" fontAlgn="base" latinLnBrk="0" hangingPunct="0">
+              <a:lnSpc>
+                <a:spcPct val="100000"/>
+              </a:lnSpc>
+              <a:spcBef>
+                <a:spcPct val="0"/>
+              </a:spcBef>
+              <a:spcAft>
+                <a:spcPct val="0"/>
+              </a:spcAft>
+              <a:buClrTx/>
+              <a:buSzTx/>
+              <a:buFontTx/>
+              <a:buNone/>
+              <a:tabLst/>
+            </a:pPr>
+            <a:br>
+              <a:rPr kumimoji="0" lang="en-US" altLang="en-US" sz="800" b="0" i="0" u="none" strike="noStrike" cap="none" normalizeH="0" baseline="0">
+                <a:ln>
+                  <a:noFill/>
+                </a:ln>
+                <a:solidFill>
+                  <a:schemeClr val="tx1"/>
+                </a:solidFill>
+                <a:effectLst/>
+              </a:rPr>
+            </a:br>
+            <a:endParaRPr kumimoji="0" lang="en-US" altLang="en-US" sz="1800" b="0" i="0" u="none" strike="noStrike" cap="none" normalizeH="0" baseline="0">
+              <a:ln>
+                <a:noFill/>
+              </a:ln>
+              <a:solidFill>
+                <a:schemeClr val="tx1"/>
+              </a:solidFill>
+              <a:effectLst/>
+              <a:latin typeface="Arial" panose="020B0604020202020204" pitchFamily="34" charset="0"/>
+            </a:endParaRPr>
+          </a:p>
+        </p:txBody>
+      </p:sp>
+      <p:sp>
+        <p:nvSpPr>
+          <p:cNvPr id="9" name="Rectangle 6">
+            <a:extLst>
+              <a:ext uri="{FF2B5EF4-FFF2-40B4-BE49-F238E27FC236}">
+                <a16:creationId xmlns:a16="http://schemas.microsoft.com/office/drawing/2014/main" id="{F13E9F8C-BA68-9D5C-71B8-274D01B0F576}"/>
+              </a:ext>
+            </a:extLst>
+          </p:cNvPr>
+          <p:cNvSpPr>
+            <a:spLocks noChangeArrowheads="1"/>
+          </p:cNvSpPr>
+          <p:nvPr/>
+        </p:nvSpPr>
+        <p:spPr bwMode="auto">
+          <a:xfrm>
+            <a:off x="152400" y="168275"/>
+            <a:ext cx="12192000" cy="0"/>
+          </a:xfrm>
+          <a:prstGeom prst="rect">
+            <a:avLst/>
+          </a:prstGeom>
+          <a:noFill/>
+          <a:ln>
+            <a:noFill/>
+          </a:ln>
+          <a:effectLst/>
+          <a:extLst>
+            <a:ext uri="{909E8E84-426E-40DD-AFC4-6F175D3DCCD1}">
+              <a14:hiddenFill xmlns:a14="http://schemas.microsoft.com/office/drawing/2010/main">
+                <a:solidFill>
+                  <a:schemeClr val="accent1"/>
+                </a:solidFill>
+              </a14:hiddenFill>
+            </a:ext>
+            <a:ext uri="{91240B29-F687-4F45-9708-019B960494DF}">
+              <a14:hiddenLine xmlns:a14="http://schemas.microsoft.com/office/drawing/2010/main" w="9525">
+                <a:solidFill>
+                  <a:schemeClr val="tx1"/>
+                </a:solidFill>
+                <a:miter lim="800000"/>
+                <a:headEnd/>
+                <a:tailEnd/>
+              </a14:hiddenLine>
+            </a:ext>
+            <a:ext uri="{AF507438-7753-43E0-B8FC-AC1667EBCBE1}">
+              <a14:hiddenEffects xmlns:a14="http://schemas.microsoft.com/office/drawing/2010/main">
+                <a:effectLst>
+                  <a:outerShdw dist="35921" dir="2700000" algn="ctr" rotWithShape="0">
+                    <a:schemeClr val="bg2"/>
+                  </a:outerShdw>
+                </a:effectLst>
+              </a14:hiddenEffects>
+            </a:ext>
+          </a:extLst>
+        </p:spPr>
+        <p:txBody>
+          <a:bodyPr vert="horz" wrap="none" lIns="91440" tIns="45720" rIns="91440" bIns="45720" numCol="1" anchor="ctr" anchorCtr="0" compatLnSpc="1">
+            <a:prstTxWarp prst="textNoShape">
+              <a:avLst/>
+            </a:prstTxWarp>
+            <a:spAutoFit/>
+          </a:bodyPr>
+          <a:lstStyle/>
+          <a:p>
+            <a:pPr marL="0" marR="0" lvl="0" indent="0" algn="l" defTabSz="914400" rtl="0" eaLnBrk="0" fontAlgn="base" latinLnBrk="0" hangingPunct="0">
+              <a:lnSpc>
+                <a:spcPct val="100000"/>
+              </a:lnSpc>
+              <a:spcBef>
+                <a:spcPct val="0"/>
+              </a:spcBef>
+              <a:spcAft>
+                <a:spcPct val="0"/>
+              </a:spcAft>
+              <a:buClrTx/>
+              <a:buSzTx/>
+              <a:buFontTx/>
+              <a:buNone/>
+              <a:tabLst/>
+            </a:pPr>
+            <a:br>
+              <a:rPr kumimoji="0" lang="en-US" altLang="en-US" sz="800" b="0" i="0" u="none" strike="noStrike" cap="none" normalizeH="0" baseline="0">
+                <a:ln>
+                  <a:noFill/>
+                </a:ln>
+                <a:solidFill>
+                  <a:schemeClr val="tx1"/>
+                </a:solidFill>
+                <a:effectLst/>
+              </a:rPr>
+            </a:br>
+            <a:endParaRPr kumimoji="0" lang="en-US" altLang="en-US" sz="1800" b="0" i="0" u="none" strike="noStrike" cap="none" normalizeH="0" baseline="0">
+              <a:ln>
+                <a:noFill/>
+              </a:ln>
+              <a:solidFill>
+                <a:schemeClr val="tx1"/>
+              </a:solidFill>
+              <a:effectLst/>
+              <a:latin typeface="Arial" panose="020B0604020202020204" pitchFamily="34" charset="0"/>
+            </a:endParaRPr>
+          </a:p>
+        </p:txBody>
+      </p:sp>
+    </p:spTree>
+    <p:extLst>
+      <p:ext uri="{BB962C8B-B14F-4D97-AF65-F5344CB8AC3E}">
+        <p14:creationId xmlns:p14="http://schemas.microsoft.com/office/powerpoint/2010/main" val="2002171321"/>
+      </p:ext>
+    </p:extLst>
+  </p:cSld>
+  <p:clrMapOvr>
+    <a:masterClrMapping/>
+  </p:clrMapOvr>
+</p:sld>
+</file>
+
 <file path=ppt/slides/slide2.xml><?xml version="1.0" encoding="utf-8"?>
 <p:sld xmlns:a="http://schemas.openxmlformats.org/drawingml/2006/main" xmlns:r="http://schemas.openxmlformats.org/officeDocument/2006/relationships" xmlns:p="http://schemas.openxmlformats.org/presentationml/2006/main">
   <p:cSld>
@@ -6807,14 +7768,21 @@
         </p:spPr>
         <p:txBody>
           <a:bodyPr>
-            <a:normAutofit/>
+            <a:normAutofit fontScale="90000"/>
           </a:bodyPr>
           <a:lstStyle/>
           <a:p>
             <a:pPr algn="ctr"/>
             <a:r>
               <a:rPr lang="en-US" sz="8000" b="1" dirty="0"/>
-              <a:t>Creational Patterns</a:t>
+              <a:t>Creational Design</a:t>
+            </a:r>
+            <a:br>
+              <a:rPr lang="en-US" sz="8000" b="1" dirty="0"/>
+            </a:br>
+            <a:r>
+              <a:rPr lang="en-US" sz="8000" b="1" dirty="0"/>
+              <a:t> Patterns</a:t>
             </a:r>
             <a:endParaRPr lang="en-IN" sz="8000" b="1" dirty="0"/>
           </a:p>
@@ -8670,7 +9638,12 @@
             <p:ph type="ctrTitle"/>
           </p:nvPr>
         </p:nvSpPr>
-        <p:spPr/>
+        <p:spPr>
+          <a:xfrm>
+            <a:off x="1524000" y="2056642"/>
+            <a:ext cx="9144000" cy="2387600"/>
+          </a:xfrm>
+        </p:spPr>
         <p:txBody>
           <a:bodyPr>
             <a:normAutofit/>
@@ -8679,7 +9652,7 @@
           <a:p>
             <a:r>
               <a:rPr lang="en-US" sz="8000" b="1" dirty="0"/>
-              <a:t>Structural Patterns</a:t>
+              <a:t>Structural Design Patterns</a:t>
             </a:r>
             <a:endParaRPr lang="en-IN" sz="8000" b="1" dirty="0"/>
           </a:p>

</xml_diff>

<commit_message>
Committed for State Design Pattern
</commit_message>
<xml_diff>
--- a/DesignPatterns.pptx
+++ b/DesignPatterns.pptx
@@ -22,6 +22,7 @@
     <p:sldId id="271" r:id="rId16"/>
     <p:sldId id="272" r:id="rId17"/>
     <p:sldId id="273" r:id="rId18"/>
+    <p:sldId id="274" r:id="rId19"/>
   </p:sldIdLst>
   <p:sldSz cx="12192000" cy="6858000"/>
   <p:notesSz cx="6858000" cy="9144000"/>
@@ -131,7 +132,7 @@
 <file path=ppt/revisionInfo.xml><?xml version="1.0" encoding="utf-8"?>
 <p1510:revInfo xmlns:a="http://schemas.openxmlformats.org/drawingml/2006/main" xmlns:r="http://schemas.openxmlformats.org/officeDocument/2006/relationships" xmlns:p1510="http://schemas.microsoft.com/office/powerpoint/2015/10/main">
   <p1510:revLst>
-    <p1510:client id="{2B8E2204-9F68-4922-875F-CECA66539EED}" v="11" dt="2023-09-11T07:16:55.642"/>
+    <p1510:client id="{2B8E2204-9F68-4922-875F-CECA66539EED}" v="15" dt="2023-09-11T10:17:35.130"/>
   </p1510:revLst>
 </p1510:revInfo>
 </file>
@@ -460,7 +461,7 @@
   <pc:docChgLst>
     <pc:chgData name="Manaswini Ray" userId="451f23f8-43b4-4daa-9511-0c9fb98bad1c" providerId="ADAL" clId="{2B8E2204-9F68-4922-875F-CECA66539EED}"/>
     <pc:docChg chg="undo custSel addSld delSld modSld sldOrd">
-      <pc:chgData name="Manaswini Ray" userId="451f23f8-43b4-4daa-9511-0c9fb98bad1c" providerId="ADAL" clId="{2B8E2204-9F68-4922-875F-CECA66539EED}" dt="2023-09-11T07:18:10.181" v="143" actId="20577"/>
+      <pc:chgData name="Manaswini Ray" userId="451f23f8-43b4-4daa-9511-0c9fb98bad1c" providerId="ADAL" clId="{2B8E2204-9F68-4922-875F-CECA66539EED}" dt="2023-09-11T10:21:17.822" v="343" actId="255"/>
       <pc:docMkLst>
         <pc:docMk/>
       </pc:docMkLst>
@@ -562,7 +563,7 @@
         </pc:spChg>
       </pc:sldChg>
       <pc:sldChg chg="addSp delSp modSp new mod">
-        <pc:chgData name="Manaswini Ray" userId="451f23f8-43b4-4daa-9511-0c9fb98bad1c" providerId="ADAL" clId="{2B8E2204-9F68-4922-875F-CECA66539EED}" dt="2023-09-11T07:18:10.181" v="143" actId="20577"/>
+        <pc:chgData name="Manaswini Ray" userId="451f23f8-43b4-4daa-9511-0c9fb98bad1c" providerId="ADAL" clId="{2B8E2204-9F68-4922-875F-CECA66539EED}" dt="2023-09-11T10:17:23.906" v="147" actId="478"/>
         <pc:sldMkLst>
           <pc:docMk/>
           <pc:sldMk cId="2002171321" sldId="273"/>
@@ -623,12 +624,35 @@
             <ac:spMk id="8" creationId="{E36FAC23-D595-4232-EF69-5CFF50907EDE}"/>
           </ac:spMkLst>
         </pc:spChg>
-        <pc:spChg chg="add mod">
-          <ac:chgData name="Manaswini Ray" userId="451f23f8-43b4-4daa-9511-0c9fb98bad1c" providerId="ADAL" clId="{2B8E2204-9F68-4922-875F-CECA66539EED}" dt="2023-09-11T07:16:01.746" v="119"/>
+        <pc:spChg chg="add del mod">
+          <ac:chgData name="Manaswini Ray" userId="451f23f8-43b4-4daa-9511-0c9fb98bad1c" providerId="ADAL" clId="{2B8E2204-9F68-4922-875F-CECA66539EED}" dt="2023-09-11T10:17:23.906" v="147" actId="478"/>
           <ac:spMkLst>
             <pc:docMk/>
             <pc:sldMk cId="2002171321" sldId="273"/>
             <ac:spMk id="9" creationId="{F13E9F8C-BA68-9D5C-71B8-274D01B0F576}"/>
+          </ac:spMkLst>
+        </pc:spChg>
+      </pc:sldChg>
+      <pc:sldChg chg="addSp modSp new mod">
+        <pc:chgData name="Manaswini Ray" userId="451f23f8-43b4-4daa-9511-0c9fb98bad1c" providerId="ADAL" clId="{2B8E2204-9F68-4922-875F-CECA66539EED}" dt="2023-09-11T10:21:17.822" v="343" actId="255"/>
+        <pc:sldMkLst>
+          <pc:docMk/>
+          <pc:sldMk cId="513856149" sldId="274"/>
+        </pc:sldMkLst>
+        <pc:spChg chg="add mod">
+          <ac:chgData name="Manaswini Ray" userId="451f23f8-43b4-4daa-9511-0c9fb98bad1c" providerId="ADAL" clId="{2B8E2204-9F68-4922-875F-CECA66539EED}" dt="2023-09-11T10:17:41.588" v="160" actId="20577"/>
+          <ac:spMkLst>
+            <pc:docMk/>
+            <pc:sldMk cId="513856149" sldId="274"/>
+            <ac:spMk id="2" creationId="{194B9969-F769-E48D-4C9C-9AD5761CDDBB}"/>
+          </ac:spMkLst>
+        </pc:spChg>
+        <pc:spChg chg="add mod">
+          <ac:chgData name="Manaswini Ray" userId="451f23f8-43b4-4daa-9511-0c9fb98bad1c" providerId="ADAL" clId="{2B8E2204-9F68-4922-875F-CECA66539EED}" dt="2023-09-11T10:21:17.822" v="343" actId="255"/>
+          <ac:spMkLst>
+            <pc:docMk/>
+            <pc:sldMk cId="513856149" sldId="274"/>
+            <ac:spMk id="3" creationId="{B767E31B-1284-E7F2-9B31-9C1573F329BF}"/>
           </ac:spMkLst>
         </pc:spChg>
       </pc:sldChg>
@@ -7609,107 +7633,484 @@
           </a:p>
         </p:txBody>
       </p:sp>
+    </p:spTree>
+    <p:extLst>
+      <p:ext uri="{BB962C8B-B14F-4D97-AF65-F5344CB8AC3E}">
+        <p14:creationId xmlns:p14="http://schemas.microsoft.com/office/powerpoint/2010/main" val="2002171321"/>
+      </p:ext>
+    </p:extLst>
+  </p:cSld>
+  <p:clrMapOvr>
+    <a:masterClrMapping/>
+  </p:clrMapOvr>
+</p:sld>
+</file>
+
+<file path=ppt/slides/slide18.xml><?xml version="1.0" encoding="utf-8"?>
+<p:sld xmlns:a="http://schemas.openxmlformats.org/drawingml/2006/main" xmlns:r="http://schemas.openxmlformats.org/officeDocument/2006/relationships" xmlns:p="http://schemas.openxmlformats.org/presentationml/2006/main">
+  <p:cSld>
+    <p:spTree>
+      <p:nvGrpSpPr>
+        <p:cNvPr id="1" name=""/>
+        <p:cNvGrpSpPr/>
+        <p:nvPr/>
+      </p:nvGrpSpPr>
+      <p:grpSpPr>
+        <a:xfrm>
+          <a:off x="0" y="0"/>
+          <a:ext cx="0" cy="0"/>
+          <a:chOff x="0" y="0"/>
+          <a:chExt cx="0" cy="0"/>
+        </a:xfrm>
+      </p:grpSpPr>
       <p:sp>
         <p:nvSpPr>
-          <p:cNvPr id="9" name="Rectangle 6">
+          <p:cNvPr id="2" name="Title 1">
             <a:extLst>
               <a:ext uri="{FF2B5EF4-FFF2-40B4-BE49-F238E27FC236}">
-                <a16:creationId xmlns:a16="http://schemas.microsoft.com/office/drawing/2014/main" id="{F13E9F8C-BA68-9D5C-71B8-274D01B0F576}"/>
+                <a16:creationId xmlns:a16="http://schemas.microsoft.com/office/drawing/2014/main" id="{194B9969-F769-E48D-4C9C-9AD5761CDDBB}"/>
               </a:ext>
             </a:extLst>
           </p:cNvPr>
-          <p:cNvSpPr>
-            <a:spLocks noChangeArrowheads="1"/>
+          <p:cNvSpPr txBox="1">
+            <a:spLocks/>
           </p:cNvSpPr>
           <p:nvPr/>
         </p:nvSpPr>
-        <p:spPr bwMode="auto">
+        <p:spPr>
           <a:xfrm>
-            <a:off x="152400" y="168275"/>
-            <a:ext cx="12192000" cy="0"/>
+            <a:off x="496957" y="417445"/>
+            <a:ext cx="10515600" cy="1325563"/>
           </a:xfrm>
           <a:prstGeom prst="rect">
             <a:avLst/>
           </a:prstGeom>
-          <a:noFill/>
-          <a:ln>
-            <a:noFill/>
-          </a:ln>
-          <a:effectLst/>
-          <a:extLst>
-            <a:ext uri="{909E8E84-426E-40DD-AFC4-6F175D3DCCD1}">
-              <a14:hiddenFill xmlns:a14="http://schemas.microsoft.com/office/drawing/2010/main">
-                <a:solidFill>
-                  <a:schemeClr val="accent1"/>
-                </a:solidFill>
-              </a14:hiddenFill>
-            </a:ext>
-            <a:ext uri="{91240B29-F687-4F45-9708-019B960494DF}">
-              <a14:hiddenLine xmlns:a14="http://schemas.microsoft.com/office/drawing/2010/main" w="9525">
-                <a:solidFill>
-                  <a:schemeClr val="tx1"/>
-                </a:solidFill>
-                <a:miter lim="800000"/>
-                <a:headEnd/>
-                <a:tailEnd/>
-              </a14:hiddenLine>
-            </a:ext>
-            <a:ext uri="{AF507438-7753-43E0-B8FC-AC1667EBCBE1}">
-              <a14:hiddenEffects xmlns:a14="http://schemas.microsoft.com/office/drawing/2010/main">
-                <a:effectLst>
-                  <a:outerShdw dist="35921" dir="2700000" algn="ctr" rotWithShape="0">
-                    <a:schemeClr val="bg2"/>
-                  </a:outerShdw>
-                </a:effectLst>
-              </a14:hiddenEffects>
-            </a:ext>
-          </a:extLst>
         </p:spPr>
         <p:txBody>
-          <a:bodyPr vert="horz" wrap="none" lIns="91440" tIns="45720" rIns="91440" bIns="45720" numCol="1" anchor="ctr" anchorCtr="0" compatLnSpc="1">
-            <a:prstTxWarp prst="textNoShape">
-              <a:avLst/>
-            </a:prstTxWarp>
-            <a:spAutoFit/>
-          </a:bodyPr>
-          <a:lstStyle/>
-          <a:p>
-            <a:pPr marL="0" marR="0" lvl="0" indent="0" algn="l" defTabSz="914400" rtl="0" eaLnBrk="0" fontAlgn="base" latinLnBrk="0" hangingPunct="0">
+          <a:bodyPr/>
+          <a:lstStyle>
+            <a:lvl1pPr algn="l" defTabSz="914400" rtl="0" eaLnBrk="1" latinLnBrk="0" hangingPunct="1">
               <a:lnSpc>
-                <a:spcPct val="100000"/>
+                <a:spcPct val="90000"/>
               </a:lnSpc>
               <a:spcBef>
                 <a:spcPct val="0"/>
               </a:spcBef>
-              <a:spcAft>
-                <a:spcPct val="0"/>
-              </a:spcAft>
-              <a:buClrTx/>
-              <a:buSzTx/>
-              <a:buFontTx/>
-              <a:buNone/>
-              <a:tabLst/>
+              <a:buNone/>
+              <a:defRPr sz="4400" kern="1200">
+                <a:solidFill>
+                  <a:schemeClr val="tx1"/>
+                </a:solidFill>
+                <a:latin typeface="+mj-lt"/>
+                <a:ea typeface="+mj-ea"/>
+                <a:cs typeface="+mj-cs"/>
+              </a:defRPr>
+            </a:lvl1pPr>
+          </a:lstStyle>
+          <a:p>
+            <a:r>
+              <a:rPr lang="en-US" b="1" u="sng" dirty="0"/>
+              <a:t>State Design Pattern</a:t>
+            </a:r>
+            <a:endParaRPr lang="en-IN" b="1" u="sng" dirty="0"/>
+          </a:p>
+        </p:txBody>
+      </p:sp>
+      <p:sp>
+        <p:nvSpPr>
+          <p:cNvPr id="3" name="Content Placeholder 2">
+            <a:extLst>
+              <a:ext uri="{FF2B5EF4-FFF2-40B4-BE49-F238E27FC236}">
+                <a16:creationId xmlns:a16="http://schemas.microsoft.com/office/drawing/2014/main" id="{B767E31B-1284-E7F2-9B31-9C1573F329BF}"/>
+              </a:ext>
+            </a:extLst>
+          </p:cNvPr>
+          <p:cNvSpPr txBox="1">
+            <a:spLocks/>
+          </p:cNvSpPr>
+          <p:nvPr/>
+        </p:nvSpPr>
+        <p:spPr>
+          <a:xfrm>
+            <a:off x="455543" y="1073427"/>
+            <a:ext cx="11280913" cy="5367128"/>
+          </a:xfrm>
+          <a:prstGeom prst="rect">
+            <a:avLst/>
+          </a:prstGeom>
+        </p:spPr>
+        <p:txBody>
+          <a:bodyPr>
+            <a:normAutofit lnSpcReduction="10000"/>
+          </a:bodyPr>
+          <a:lstStyle>
+            <a:lvl1pPr marL="228600" indent="-228600" algn="l" defTabSz="914400" rtl="0" eaLnBrk="1" latinLnBrk="0" hangingPunct="1">
+              <a:lnSpc>
+                <a:spcPct val="90000"/>
+              </a:lnSpc>
+              <a:spcBef>
+                <a:spcPts val="1000"/>
+              </a:spcBef>
+              <a:buFont typeface="Arial" panose="020B0604020202020204" pitchFamily="34" charset="0"/>
+              <a:buChar char="•"/>
+              <a:defRPr sz="2800" kern="1200">
+                <a:solidFill>
+                  <a:schemeClr val="tx1"/>
+                </a:solidFill>
+                <a:latin typeface="+mn-lt"/>
+                <a:ea typeface="+mn-ea"/>
+                <a:cs typeface="+mn-cs"/>
+              </a:defRPr>
+            </a:lvl1pPr>
+            <a:lvl2pPr marL="685800" indent="-228600" algn="l" defTabSz="914400" rtl="0" eaLnBrk="1" latinLnBrk="0" hangingPunct="1">
+              <a:lnSpc>
+                <a:spcPct val="90000"/>
+              </a:lnSpc>
+              <a:spcBef>
+                <a:spcPts val="500"/>
+              </a:spcBef>
+              <a:buFont typeface="Arial" panose="020B0604020202020204" pitchFamily="34" charset="0"/>
+              <a:buChar char="•"/>
+              <a:defRPr sz="2400" kern="1200">
+                <a:solidFill>
+                  <a:schemeClr val="tx1"/>
+                </a:solidFill>
+                <a:latin typeface="+mn-lt"/>
+                <a:ea typeface="+mn-ea"/>
+                <a:cs typeface="+mn-cs"/>
+              </a:defRPr>
+            </a:lvl2pPr>
+            <a:lvl3pPr marL="1143000" indent="-228600" algn="l" defTabSz="914400" rtl="0" eaLnBrk="1" latinLnBrk="0" hangingPunct="1">
+              <a:lnSpc>
+                <a:spcPct val="90000"/>
+              </a:lnSpc>
+              <a:spcBef>
+                <a:spcPts val="500"/>
+              </a:spcBef>
+              <a:buFont typeface="Arial" panose="020B0604020202020204" pitchFamily="34" charset="0"/>
+              <a:buChar char="•"/>
+              <a:defRPr sz="2000" kern="1200">
+                <a:solidFill>
+                  <a:schemeClr val="tx1"/>
+                </a:solidFill>
+                <a:latin typeface="+mn-lt"/>
+                <a:ea typeface="+mn-ea"/>
+                <a:cs typeface="+mn-cs"/>
+              </a:defRPr>
+            </a:lvl3pPr>
+            <a:lvl4pPr marL="1600200" indent="-228600" algn="l" defTabSz="914400" rtl="0" eaLnBrk="1" latinLnBrk="0" hangingPunct="1">
+              <a:lnSpc>
+                <a:spcPct val="90000"/>
+              </a:lnSpc>
+              <a:spcBef>
+                <a:spcPts val="500"/>
+              </a:spcBef>
+              <a:buFont typeface="Arial" panose="020B0604020202020204" pitchFamily="34" charset="0"/>
+              <a:buChar char="•"/>
+              <a:defRPr sz="1800" kern="1200">
+                <a:solidFill>
+                  <a:schemeClr val="tx1"/>
+                </a:solidFill>
+                <a:latin typeface="+mn-lt"/>
+                <a:ea typeface="+mn-ea"/>
+                <a:cs typeface="+mn-cs"/>
+              </a:defRPr>
+            </a:lvl4pPr>
+            <a:lvl5pPr marL="2057400" indent="-228600" algn="l" defTabSz="914400" rtl="0" eaLnBrk="1" latinLnBrk="0" hangingPunct="1">
+              <a:lnSpc>
+                <a:spcPct val="90000"/>
+              </a:lnSpc>
+              <a:spcBef>
+                <a:spcPts val="500"/>
+              </a:spcBef>
+              <a:buFont typeface="Arial" panose="020B0604020202020204" pitchFamily="34" charset="0"/>
+              <a:buChar char="•"/>
+              <a:defRPr sz="1800" kern="1200">
+                <a:solidFill>
+                  <a:schemeClr val="tx1"/>
+                </a:solidFill>
+                <a:latin typeface="+mn-lt"/>
+                <a:ea typeface="+mn-ea"/>
+                <a:cs typeface="+mn-cs"/>
+              </a:defRPr>
+            </a:lvl5pPr>
+            <a:lvl6pPr marL="2514600" indent="-228600" algn="l" defTabSz="914400" rtl="0" eaLnBrk="1" latinLnBrk="0" hangingPunct="1">
+              <a:lnSpc>
+                <a:spcPct val="90000"/>
+              </a:lnSpc>
+              <a:spcBef>
+                <a:spcPts val="500"/>
+              </a:spcBef>
+              <a:buFont typeface="Arial" panose="020B0604020202020204" pitchFamily="34" charset="0"/>
+              <a:buChar char="•"/>
+              <a:defRPr sz="1800" kern="1200">
+                <a:solidFill>
+                  <a:schemeClr val="tx1"/>
+                </a:solidFill>
+                <a:latin typeface="+mn-lt"/>
+                <a:ea typeface="+mn-ea"/>
+                <a:cs typeface="+mn-cs"/>
+              </a:defRPr>
+            </a:lvl6pPr>
+            <a:lvl7pPr marL="2971800" indent="-228600" algn="l" defTabSz="914400" rtl="0" eaLnBrk="1" latinLnBrk="0" hangingPunct="1">
+              <a:lnSpc>
+                <a:spcPct val="90000"/>
+              </a:lnSpc>
+              <a:spcBef>
+                <a:spcPts val="500"/>
+              </a:spcBef>
+              <a:buFont typeface="Arial" panose="020B0604020202020204" pitchFamily="34" charset="0"/>
+              <a:buChar char="•"/>
+              <a:defRPr sz="1800" kern="1200">
+                <a:solidFill>
+                  <a:schemeClr val="tx1"/>
+                </a:solidFill>
+                <a:latin typeface="+mn-lt"/>
+                <a:ea typeface="+mn-ea"/>
+                <a:cs typeface="+mn-cs"/>
+              </a:defRPr>
+            </a:lvl7pPr>
+            <a:lvl8pPr marL="3429000" indent="-228600" algn="l" defTabSz="914400" rtl="0" eaLnBrk="1" latinLnBrk="0" hangingPunct="1">
+              <a:lnSpc>
+                <a:spcPct val="90000"/>
+              </a:lnSpc>
+              <a:spcBef>
+                <a:spcPts val="500"/>
+              </a:spcBef>
+              <a:buFont typeface="Arial" panose="020B0604020202020204" pitchFamily="34" charset="0"/>
+              <a:buChar char="•"/>
+              <a:defRPr sz="1800" kern="1200">
+                <a:solidFill>
+                  <a:schemeClr val="tx1"/>
+                </a:solidFill>
+                <a:latin typeface="+mn-lt"/>
+                <a:ea typeface="+mn-ea"/>
+                <a:cs typeface="+mn-cs"/>
+              </a:defRPr>
+            </a:lvl8pPr>
+            <a:lvl9pPr marL="3886200" indent="-228600" algn="l" defTabSz="914400" rtl="0" eaLnBrk="1" latinLnBrk="0" hangingPunct="1">
+              <a:lnSpc>
+                <a:spcPct val="90000"/>
+              </a:lnSpc>
+              <a:spcBef>
+                <a:spcPts val="500"/>
+              </a:spcBef>
+              <a:buFont typeface="Arial" panose="020B0604020202020204" pitchFamily="34" charset="0"/>
+              <a:buChar char="•"/>
+              <a:defRPr sz="1800" kern="1200">
+                <a:solidFill>
+                  <a:schemeClr val="tx1"/>
+                </a:solidFill>
+                <a:latin typeface="+mn-lt"/>
+                <a:ea typeface="+mn-ea"/>
+                <a:cs typeface="+mn-cs"/>
+              </a:defRPr>
+            </a:lvl9pPr>
+          </a:lstStyle>
+          <a:p>
+            <a:endParaRPr lang="en-US" sz="1600" b="0" i="0" dirty="0">
+              <a:solidFill>
+                <a:srgbClr val="333333"/>
+              </a:solidFill>
+              <a:effectLst/>
+              <a:latin typeface="inter-regular"/>
+            </a:endParaRPr>
+          </a:p>
+          <a:p>
+            <a:r>
+              <a:rPr lang="en-US" sz="2400" dirty="0">
+                <a:solidFill>
+                  <a:srgbClr val="333333"/>
+                </a:solidFill>
+                <a:latin typeface="inter-regular"/>
+              </a:rPr>
+              <a:t>In this</a:t>
+            </a:r>
+            <a:r>
+              <a:rPr lang="en-US" sz="2400" b="1" i="0" dirty="0">
+                <a:solidFill>
+                  <a:srgbClr val="333333"/>
+                </a:solidFill>
+                <a:effectLst/>
+                <a:latin typeface="inter-bold"/>
+              </a:rPr>
+              <a:t> </a:t>
+            </a:r>
+            <a:r>
+              <a:rPr lang="en-US" sz="2400" b="1" i="0" dirty="0">
+                <a:solidFill>
+                  <a:srgbClr val="333333"/>
+                </a:solidFill>
+                <a:effectLst/>
+                <a:latin typeface="inter-regular"/>
+              </a:rPr>
+              <a:t>we create objects which represent various states and a context object whose behavior varies as its state object changes.</a:t>
+            </a:r>
+          </a:p>
+          <a:p>
+            <a:pPr marL="0" indent="0">
+              <a:buNone/>
+            </a:pPr>
+            <a:r>
+              <a:rPr lang="en-US" sz="2200" b="1" u="sng" dirty="0">
+                <a:solidFill>
+                  <a:srgbClr val="333333"/>
+                </a:solidFill>
+                <a:latin typeface="inter-regular"/>
+              </a:rPr>
+              <a:t>Advantages</a:t>
+            </a:r>
+            <a:r>
+              <a:rPr lang="en-US" sz="2200" b="1" dirty="0">
+                <a:solidFill>
+                  <a:srgbClr val="333333"/>
+                </a:solidFill>
+                <a:latin typeface="inter-regular"/>
+              </a:rPr>
+              <a:t>:-</a:t>
+            </a:r>
+          </a:p>
+          <a:p>
+            <a:pPr algn="just">
+              <a:buFont typeface="Arial" panose="020B0604020202020204" pitchFamily="34" charset="0"/>
+              <a:buChar char="•"/>
+            </a:pPr>
+            <a:r>
+              <a:rPr lang="en-US" sz="2400" b="0" i="0" dirty="0">
+                <a:solidFill>
+                  <a:srgbClr val="000000"/>
+                </a:solidFill>
+                <a:effectLst/>
+                <a:latin typeface="inter-regular"/>
+              </a:rPr>
+              <a:t>It keeps the state-specific behavior.</a:t>
+            </a:r>
+          </a:p>
+          <a:p>
+            <a:pPr algn="just">
+              <a:buFont typeface="Arial" panose="020B0604020202020204" pitchFamily="34" charset="0"/>
+              <a:buChar char="•"/>
+            </a:pPr>
+            <a:r>
+              <a:rPr lang="en-US" sz="2400" b="0" i="0" dirty="0">
+                <a:solidFill>
+                  <a:srgbClr val="000000"/>
+                </a:solidFill>
+                <a:effectLst/>
+                <a:latin typeface="inter-regular"/>
+              </a:rPr>
+              <a:t>It makes any state transitions explicit.</a:t>
+            </a:r>
+          </a:p>
+          <a:p>
+            <a:pPr marL="0" indent="0">
+              <a:buNone/>
             </a:pPr>
             <a:br>
-              <a:rPr kumimoji="0" lang="en-US" altLang="en-US" sz="800" b="0" i="0" u="none" strike="noStrike" cap="none" normalizeH="0" baseline="0">
-                <a:ln>
-                  <a:noFill/>
-                </a:ln>
-                <a:solidFill>
-                  <a:schemeClr val="tx1"/>
-                </a:solidFill>
-                <a:effectLst/>
-              </a:rPr>
+              <a:rPr lang="en-US" sz="1600" dirty="0"/>
             </a:br>
-            <a:endParaRPr kumimoji="0" lang="en-US" altLang="en-US" sz="1800" b="0" i="0" u="none" strike="noStrike" cap="none" normalizeH="0" baseline="0">
-              <a:ln>
-                <a:noFill/>
-              </a:ln>
+            <a:r>
+              <a:rPr lang="en-US" sz="2200" b="1" u="sng" dirty="0">
+                <a:solidFill>
+                  <a:srgbClr val="000000"/>
+                </a:solidFill>
+                <a:latin typeface="inter-regular"/>
+              </a:rPr>
+              <a:t>Usage</a:t>
+            </a:r>
+            <a:r>
+              <a:rPr lang="en-US" sz="2200" b="1" dirty="0">
+                <a:solidFill>
+                  <a:srgbClr val="000000"/>
+                </a:solidFill>
+                <a:latin typeface="inter-regular"/>
+              </a:rPr>
+              <a:t>:-</a:t>
+            </a:r>
+          </a:p>
+          <a:p>
+            <a:pPr algn="just">
+              <a:buFont typeface="Arial" panose="020B0604020202020204" pitchFamily="34" charset="0"/>
+              <a:buChar char="•"/>
+            </a:pPr>
+            <a:r>
+              <a:rPr lang="en-US" sz="2400" b="0" i="0" dirty="0">
+                <a:solidFill>
+                  <a:srgbClr val="000000"/>
+                </a:solidFill>
+                <a:effectLst/>
+                <a:latin typeface="inter-regular"/>
+              </a:rPr>
+              <a:t>When the behavior of object depends on its state and it must be able to change its behavior at runtime according to the new state.</a:t>
+            </a:r>
+          </a:p>
+          <a:p>
+            <a:pPr algn="just">
+              <a:buFont typeface="Arial" panose="020B0604020202020204" pitchFamily="34" charset="0"/>
+              <a:buChar char="•"/>
+            </a:pPr>
+            <a:r>
+              <a:rPr lang="en-US" sz="2400" b="0" i="0" dirty="0">
+                <a:solidFill>
+                  <a:srgbClr val="000000"/>
+                </a:solidFill>
+                <a:effectLst/>
+                <a:latin typeface="inter-regular"/>
+              </a:rPr>
+              <a:t>It is used when the operations have large, multipart conditional statements that depend on the state of an object.</a:t>
+            </a:r>
+          </a:p>
+          <a:p>
+            <a:pPr marL="0" indent="0" algn="just">
+              <a:buFont typeface="Arial" panose="020B0604020202020204" pitchFamily="34" charset="0"/>
+              <a:buNone/>
+            </a:pPr>
+            <a:r>
+              <a:rPr lang="en-US" sz="2200" b="1" u="sng" dirty="0">
+                <a:solidFill>
+                  <a:schemeClr val="tx1">
+                    <a:lumMod val="95000"/>
+                    <a:lumOff val="5000"/>
+                  </a:schemeClr>
+                </a:solidFill>
+                <a:latin typeface="Google Sans"/>
+              </a:rPr>
+              <a:t>Real-Time Example</a:t>
+            </a:r>
+            <a:r>
+              <a:rPr lang="en-US" sz="2200" dirty="0">
+                <a:solidFill>
+                  <a:schemeClr val="tx1">
+                    <a:lumMod val="95000"/>
+                    <a:lumOff val="5000"/>
+                  </a:schemeClr>
+                </a:solidFill>
+                <a:latin typeface="Google Sans"/>
+              </a:rPr>
+              <a:t>:-</a:t>
+            </a:r>
+          </a:p>
+          <a:p>
+            <a:r>
+              <a:rPr lang="en-US" sz="2200" b="0" i="0" dirty="0">
+                <a:solidFill>
+                  <a:schemeClr val="tx1">
+                    <a:lumMod val="95000"/>
+                    <a:lumOff val="5000"/>
+                  </a:schemeClr>
+                </a:solidFill>
+                <a:effectLst/>
+                <a:latin typeface="Google Sans"/>
+              </a:rPr>
+              <a:t>Vending Machine, the status can be money inserted, not inserted, money paid, change generated.</a:t>
+            </a:r>
+            <a:endParaRPr lang="en-IN" sz="2200" dirty="0">
               <a:solidFill>
-                <a:schemeClr val="tx1"/>
+                <a:schemeClr val="tx1">
+                  <a:lumMod val="95000"/>
+                  <a:lumOff val="5000"/>
+                </a:schemeClr>
               </a:solidFill>
-              <a:effectLst/>
-              <a:latin typeface="Arial" panose="020B0604020202020204" pitchFamily="34" charset="0"/>
             </a:endParaRPr>
           </a:p>
         </p:txBody>
@@ -7717,7 +8118,7 @@
     </p:spTree>
     <p:extLst>
       <p:ext uri="{BB962C8B-B14F-4D97-AF65-F5344CB8AC3E}">
-        <p14:creationId xmlns:p14="http://schemas.microsoft.com/office/powerpoint/2010/main" val="2002171321"/>
+        <p14:creationId xmlns:p14="http://schemas.microsoft.com/office/powerpoint/2010/main" val="513856149"/>
       </p:ext>
     </p:extLst>
   </p:cSld>

</xml_diff>

<commit_message>
Committed for Observer Design Pattern
</commit_message>
<xml_diff>
--- a/DesignPatterns.pptx
+++ b/DesignPatterns.pptx
@@ -25,6 +25,7 @@
     <p:sldId id="274" r:id="rId19"/>
     <p:sldId id="275" r:id="rId20"/>
     <p:sldId id="276" r:id="rId21"/>
+    <p:sldId id="277" r:id="rId22"/>
   </p:sldIdLst>
   <p:sldSz cx="12192000" cy="6858000"/>
   <p:notesSz cx="6858000" cy="9144000"/>
@@ -134,7 +135,7 @@
 <file path=ppt/revisionInfo.xml><?xml version="1.0" encoding="utf-8"?>
 <p1510:revInfo xmlns:a="http://schemas.openxmlformats.org/drawingml/2006/main" xmlns:r="http://schemas.openxmlformats.org/officeDocument/2006/relationships" xmlns:p1510="http://schemas.microsoft.com/office/powerpoint/2015/10/main">
   <p1510:revLst>
-    <p1510:client id="{2B8E2204-9F68-4922-875F-CECA66539EED}" v="17" dt="2023-09-12T12:55:40.564"/>
+    <p1510:client id="{2B8E2204-9F68-4922-875F-CECA66539EED}" v="18" dt="2023-09-12T15:38:43.606"/>
   </p1510:revLst>
 </p1510:revInfo>
 </file>
@@ -463,7 +464,7 @@
   <pc:docChgLst>
     <pc:chgData name="Manaswini Ray" userId="451f23f8-43b4-4daa-9511-0c9fb98bad1c" providerId="ADAL" clId="{2B8E2204-9F68-4922-875F-CECA66539EED}"/>
     <pc:docChg chg="undo custSel addSld delSld modSld sldOrd">
-      <pc:chgData name="Manaswini Ray" userId="451f23f8-43b4-4daa-9511-0c9fb98bad1c" providerId="ADAL" clId="{2B8E2204-9F68-4922-875F-CECA66539EED}" dt="2023-09-12T12:58:08.248" v="498" actId="20577"/>
+      <pc:chgData name="Manaswini Ray" userId="451f23f8-43b4-4daa-9511-0c9fb98bad1c" providerId="ADAL" clId="{2B8E2204-9F68-4922-875F-CECA66539EED}" dt="2023-09-12T15:40:05.314" v="563" actId="20577"/>
       <pc:docMkLst>
         <pc:docMk/>
       </pc:docMkLst>
@@ -701,6 +702,29 @@
             <pc:docMk/>
             <pc:sldMk cId="3248968357" sldId="276"/>
             <ac:spMk id="3" creationId="{CBE139B2-E54A-CAE9-FC23-8021BF6C7F45}"/>
+          </ac:spMkLst>
+        </pc:spChg>
+      </pc:sldChg>
+      <pc:sldChg chg="addSp modSp new mod">
+        <pc:chgData name="Manaswini Ray" userId="451f23f8-43b4-4daa-9511-0c9fb98bad1c" providerId="ADAL" clId="{2B8E2204-9F68-4922-875F-CECA66539EED}" dt="2023-09-12T15:40:05.314" v="563" actId="20577"/>
+        <pc:sldMkLst>
+          <pc:docMk/>
+          <pc:sldMk cId="2762770838" sldId="277"/>
+        </pc:sldMkLst>
+        <pc:spChg chg="add mod">
+          <ac:chgData name="Manaswini Ray" userId="451f23f8-43b4-4daa-9511-0c9fb98bad1c" providerId="ADAL" clId="{2B8E2204-9F68-4922-875F-CECA66539EED}" dt="2023-09-12T15:38:47.121" v="508" actId="20577"/>
+          <ac:spMkLst>
+            <pc:docMk/>
+            <pc:sldMk cId="2762770838" sldId="277"/>
+            <ac:spMk id="2" creationId="{66AC841E-33F4-A248-8861-D73077D39F4A}"/>
+          </ac:spMkLst>
+        </pc:spChg>
+        <pc:spChg chg="add mod">
+          <ac:chgData name="Manaswini Ray" userId="451f23f8-43b4-4daa-9511-0c9fb98bad1c" providerId="ADAL" clId="{2B8E2204-9F68-4922-875F-CECA66539EED}" dt="2023-09-12T15:40:05.314" v="563" actId="20577"/>
+          <ac:spMkLst>
+            <pc:docMk/>
+            <pc:sldMk cId="2762770838" sldId="277"/>
+            <ac:spMk id="3" creationId="{B4A6DD9B-9D06-DFC3-E961-F9455E83B155}"/>
           </ac:spMkLst>
         </pc:spChg>
       </pc:sldChg>
@@ -9260,6 +9284,547 @@
     <p:extLst>
       <p:ext uri="{BB962C8B-B14F-4D97-AF65-F5344CB8AC3E}">
         <p14:creationId xmlns:p14="http://schemas.microsoft.com/office/powerpoint/2010/main" val="3248968357"/>
+      </p:ext>
+    </p:extLst>
+  </p:cSld>
+  <p:clrMapOvr>
+    <a:masterClrMapping/>
+  </p:clrMapOvr>
+</p:sld>
+</file>
+
+<file path=ppt/slides/slide21.xml><?xml version="1.0" encoding="utf-8"?>
+<p:sld xmlns:a="http://schemas.openxmlformats.org/drawingml/2006/main" xmlns:r="http://schemas.openxmlformats.org/officeDocument/2006/relationships" xmlns:p="http://schemas.openxmlformats.org/presentationml/2006/main">
+  <p:cSld>
+    <p:spTree>
+      <p:nvGrpSpPr>
+        <p:cNvPr id="1" name=""/>
+        <p:cNvGrpSpPr/>
+        <p:nvPr/>
+      </p:nvGrpSpPr>
+      <p:grpSpPr>
+        <a:xfrm>
+          <a:off x="0" y="0"/>
+          <a:ext cx="0" cy="0"/>
+          <a:chOff x="0" y="0"/>
+          <a:chExt cx="0" cy="0"/>
+        </a:xfrm>
+      </p:grpSpPr>
+      <p:sp>
+        <p:nvSpPr>
+          <p:cNvPr id="2" name="Title 1">
+            <a:extLst>
+              <a:ext uri="{FF2B5EF4-FFF2-40B4-BE49-F238E27FC236}">
+                <a16:creationId xmlns:a16="http://schemas.microsoft.com/office/drawing/2014/main" id="{66AC841E-33F4-A248-8861-D73077D39F4A}"/>
+              </a:ext>
+            </a:extLst>
+          </p:cNvPr>
+          <p:cNvSpPr txBox="1">
+            <a:spLocks/>
+          </p:cNvSpPr>
+          <p:nvPr/>
+        </p:nvSpPr>
+        <p:spPr>
+          <a:xfrm>
+            <a:off x="496957" y="417445"/>
+            <a:ext cx="10515600" cy="1325563"/>
+          </a:xfrm>
+          <a:prstGeom prst="rect">
+            <a:avLst/>
+          </a:prstGeom>
+        </p:spPr>
+        <p:txBody>
+          <a:bodyPr/>
+          <a:lstStyle>
+            <a:lvl1pPr algn="l" defTabSz="914400" rtl="0" eaLnBrk="1" latinLnBrk="0" hangingPunct="1">
+              <a:lnSpc>
+                <a:spcPct val="90000"/>
+              </a:lnSpc>
+              <a:spcBef>
+                <a:spcPct val="0"/>
+              </a:spcBef>
+              <a:buNone/>
+              <a:defRPr sz="4400" kern="1200">
+                <a:solidFill>
+                  <a:schemeClr val="tx1"/>
+                </a:solidFill>
+                <a:latin typeface="+mj-lt"/>
+                <a:ea typeface="+mj-ea"/>
+                <a:cs typeface="+mj-cs"/>
+              </a:defRPr>
+            </a:lvl1pPr>
+          </a:lstStyle>
+          <a:p>
+            <a:r>
+              <a:rPr lang="en-US" b="1" u="sng" dirty="0"/>
+              <a:t>Observer Design Pattern</a:t>
+            </a:r>
+            <a:endParaRPr lang="en-IN" b="1" u="sng" dirty="0"/>
+          </a:p>
+        </p:txBody>
+      </p:sp>
+      <p:sp>
+        <p:nvSpPr>
+          <p:cNvPr id="3" name="Content Placeholder 2">
+            <a:extLst>
+              <a:ext uri="{FF2B5EF4-FFF2-40B4-BE49-F238E27FC236}">
+                <a16:creationId xmlns:a16="http://schemas.microsoft.com/office/drawing/2014/main" id="{B4A6DD9B-9D06-DFC3-E961-F9455E83B155}"/>
+              </a:ext>
+            </a:extLst>
+          </p:cNvPr>
+          <p:cNvSpPr txBox="1">
+            <a:spLocks/>
+          </p:cNvSpPr>
+          <p:nvPr/>
+        </p:nvSpPr>
+        <p:spPr>
+          <a:xfrm>
+            <a:off x="455543" y="1073427"/>
+            <a:ext cx="11280913" cy="5367128"/>
+          </a:xfrm>
+          <a:prstGeom prst="rect">
+            <a:avLst/>
+          </a:prstGeom>
+        </p:spPr>
+        <p:txBody>
+          <a:bodyPr>
+            <a:normAutofit/>
+          </a:bodyPr>
+          <a:lstStyle>
+            <a:lvl1pPr marL="228600" indent="-228600" algn="l" defTabSz="914400" rtl="0" eaLnBrk="1" latinLnBrk="0" hangingPunct="1">
+              <a:lnSpc>
+                <a:spcPct val="90000"/>
+              </a:lnSpc>
+              <a:spcBef>
+                <a:spcPts val="1000"/>
+              </a:spcBef>
+              <a:buFont typeface="Arial" panose="020B0604020202020204" pitchFamily="34" charset="0"/>
+              <a:buChar char="•"/>
+              <a:defRPr sz="2800" kern="1200">
+                <a:solidFill>
+                  <a:schemeClr val="tx1"/>
+                </a:solidFill>
+                <a:latin typeface="+mn-lt"/>
+                <a:ea typeface="+mn-ea"/>
+                <a:cs typeface="+mn-cs"/>
+              </a:defRPr>
+            </a:lvl1pPr>
+            <a:lvl2pPr marL="685800" indent="-228600" algn="l" defTabSz="914400" rtl="0" eaLnBrk="1" latinLnBrk="0" hangingPunct="1">
+              <a:lnSpc>
+                <a:spcPct val="90000"/>
+              </a:lnSpc>
+              <a:spcBef>
+                <a:spcPts val="500"/>
+              </a:spcBef>
+              <a:buFont typeface="Arial" panose="020B0604020202020204" pitchFamily="34" charset="0"/>
+              <a:buChar char="•"/>
+              <a:defRPr sz="2400" kern="1200">
+                <a:solidFill>
+                  <a:schemeClr val="tx1"/>
+                </a:solidFill>
+                <a:latin typeface="+mn-lt"/>
+                <a:ea typeface="+mn-ea"/>
+                <a:cs typeface="+mn-cs"/>
+              </a:defRPr>
+            </a:lvl2pPr>
+            <a:lvl3pPr marL="1143000" indent="-228600" algn="l" defTabSz="914400" rtl="0" eaLnBrk="1" latinLnBrk="0" hangingPunct="1">
+              <a:lnSpc>
+                <a:spcPct val="90000"/>
+              </a:lnSpc>
+              <a:spcBef>
+                <a:spcPts val="500"/>
+              </a:spcBef>
+              <a:buFont typeface="Arial" panose="020B0604020202020204" pitchFamily="34" charset="0"/>
+              <a:buChar char="•"/>
+              <a:defRPr sz="2000" kern="1200">
+                <a:solidFill>
+                  <a:schemeClr val="tx1"/>
+                </a:solidFill>
+                <a:latin typeface="+mn-lt"/>
+                <a:ea typeface="+mn-ea"/>
+                <a:cs typeface="+mn-cs"/>
+              </a:defRPr>
+            </a:lvl3pPr>
+            <a:lvl4pPr marL="1600200" indent="-228600" algn="l" defTabSz="914400" rtl="0" eaLnBrk="1" latinLnBrk="0" hangingPunct="1">
+              <a:lnSpc>
+                <a:spcPct val="90000"/>
+              </a:lnSpc>
+              <a:spcBef>
+                <a:spcPts val="500"/>
+              </a:spcBef>
+              <a:buFont typeface="Arial" panose="020B0604020202020204" pitchFamily="34" charset="0"/>
+              <a:buChar char="•"/>
+              <a:defRPr sz="1800" kern="1200">
+                <a:solidFill>
+                  <a:schemeClr val="tx1"/>
+                </a:solidFill>
+                <a:latin typeface="+mn-lt"/>
+                <a:ea typeface="+mn-ea"/>
+                <a:cs typeface="+mn-cs"/>
+              </a:defRPr>
+            </a:lvl4pPr>
+            <a:lvl5pPr marL="2057400" indent="-228600" algn="l" defTabSz="914400" rtl="0" eaLnBrk="1" latinLnBrk="0" hangingPunct="1">
+              <a:lnSpc>
+                <a:spcPct val="90000"/>
+              </a:lnSpc>
+              <a:spcBef>
+                <a:spcPts val="500"/>
+              </a:spcBef>
+              <a:buFont typeface="Arial" panose="020B0604020202020204" pitchFamily="34" charset="0"/>
+              <a:buChar char="•"/>
+              <a:defRPr sz="1800" kern="1200">
+                <a:solidFill>
+                  <a:schemeClr val="tx1"/>
+                </a:solidFill>
+                <a:latin typeface="+mn-lt"/>
+                <a:ea typeface="+mn-ea"/>
+                <a:cs typeface="+mn-cs"/>
+              </a:defRPr>
+            </a:lvl5pPr>
+            <a:lvl6pPr marL="2514600" indent="-228600" algn="l" defTabSz="914400" rtl="0" eaLnBrk="1" latinLnBrk="0" hangingPunct="1">
+              <a:lnSpc>
+                <a:spcPct val="90000"/>
+              </a:lnSpc>
+              <a:spcBef>
+                <a:spcPts val="500"/>
+              </a:spcBef>
+              <a:buFont typeface="Arial" panose="020B0604020202020204" pitchFamily="34" charset="0"/>
+              <a:buChar char="•"/>
+              <a:defRPr sz="1800" kern="1200">
+                <a:solidFill>
+                  <a:schemeClr val="tx1"/>
+                </a:solidFill>
+                <a:latin typeface="+mn-lt"/>
+                <a:ea typeface="+mn-ea"/>
+                <a:cs typeface="+mn-cs"/>
+              </a:defRPr>
+            </a:lvl6pPr>
+            <a:lvl7pPr marL="2971800" indent="-228600" algn="l" defTabSz="914400" rtl="0" eaLnBrk="1" latinLnBrk="0" hangingPunct="1">
+              <a:lnSpc>
+                <a:spcPct val="90000"/>
+              </a:lnSpc>
+              <a:spcBef>
+                <a:spcPts val="500"/>
+              </a:spcBef>
+              <a:buFont typeface="Arial" panose="020B0604020202020204" pitchFamily="34" charset="0"/>
+              <a:buChar char="•"/>
+              <a:defRPr sz="1800" kern="1200">
+                <a:solidFill>
+                  <a:schemeClr val="tx1"/>
+                </a:solidFill>
+                <a:latin typeface="+mn-lt"/>
+                <a:ea typeface="+mn-ea"/>
+                <a:cs typeface="+mn-cs"/>
+              </a:defRPr>
+            </a:lvl7pPr>
+            <a:lvl8pPr marL="3429000" indent="-228600" algn="l" defTabSz="914400" rtl="0" eaLnBrk="1" latinLnBrk="0" hangingPunct="1">
+              <a:lnSpc>
+                <a:spcPct val="90000"/>
+              </a:lnSpc>
+              <a:spcBef>
+                <a:spcPts val="500"/>
+              </a:spcBef>
+              <a:buFont typeface="Arial" panose="020B0604020202020204" pitchFamily="34" charset="0"/>
+              <a:buChar char="•"/>
+              <a:defRPr sz="1800" kern="1200">
+                <a:solidFill>
+                  <a:schemeClr val="tx1"/>
+                </a:solidFill>
+                <a:latin typeface="+mn-lt"/>
+                <a:ea typeface="+mn-ea"/>
+                <a:cs typeface="+mn-cs"/>
+              </a:defRPr>
+            </a:lvl8pPr>
+            <a:lvl9pPr marL="3886200" indent="-228600" algn="l" defTabSz="914400" rtl="0" eaLnBrk="1" latinLnBrk="0" hangingPunct="1">
+              <a:lnSpc>
+                <a:spcPct val="90000"/>
+              </a:lnSpc>
+              <a:spcBef>
+                <a:spcPts val="500"/>
+              </a:spcBef>
+              <a:buFont typeface="Arial" panose="020B0604020202020204" pitchFamily="34" charset="0"/>
+              <a:buChar char="•"/>
+              <a:defRPr sz="1800" kern="1200">
+                <a:solidFill>
+                  <a:schemeClr val="tx1"/>
+                </a:solidFill>
+                <a:latin typeface="+mn-lt"/>
+                <a:ea typeface="+mn-ea"/>
+                <a:cs typeface="+mn-cs"/>
+              </a:defRPr>
+            </a:lvl9pPr>
+          </a:lstStyle>
+          <a:p>
+            <a:endParaRPr lang="en-US" sz="1600" b="0" i="0" dirty="0">
+              <a:solidFill>
+                <a:srgbClr val="333333"/>
+              </a:solidFill>
+              <a:effectLst/>
+              <a:latin typeface="inter-regular"/>
+            </a:endParaRPr>
+          </a:p>
+          <a:p>
+            <a:r>
+              <a:rPr lang="en-US" sz="2400" dirty="0">
+                <a:solidFill>
+                  <a:srgbClr val="333333"/>
+                </a:solidFill>
+                <a:latin typeface="inter-regular"/>
+              </a:rPr>
+              <a:t>In this</a:t>
+            </a:r>
+            <a:r>
+              <a:rPr lang="en-US" sz="2400" b="1" i="0" dirty="0">
+                <a:solidFill>
+                  <a:srgbClr val="333333"/>
+                </a:solidFill>
+                <a:effectLst/>
+                <a:latin typeface="inter-bold"/>
+              </a:rPr>
+              <a:t> </a:t>
+            </a:r>
+            <a:r>
+              <a:rPr lang="en-US" sz="2200" b="1" i="0" dirty="0">
+                <a:solidFill>
+                  <a:schemeClr val="tx1">
+                    <a:lumMod val="95000"/>
+                    <a:lumOff val="5000"/>
+                  </a:schemeClr>
+                </a:solidFill>
+                <a:effectLst/>
+                <a:latin typeface="inter-regular"/>
+              </a:rPr>
+              <a:t>"</a:t>
+            </a:r>
+            <a:r>
+              <a:rPr lang="en-US" sz="2200" b="1" i="0" dirty="0">
+                <a:solidFill>
+                  <a:srgbClr val="333333"/>
+                </a:solidFill>
+                <a:effectLst/>
+                <a:latin typeface="inter-regular"/>
+              </a:rPr>
+              <a:t>just define a one-to-one dependency so that when one object changes state, all its dependents are notified and updated automatically</a:t>
+            </a:r>
+            <a:r>
+              <a:rPr lang="en-US" sz="2200" b="1" i="0" dirty="0">
+                <a:solidFill>
+                  <a:schemeClr val="tx1">
+                    <a:lumMod val="95000"/>
+                    <a:lumOff val="5000"/>
+                  </a:schemeClr>
+                </a:solidFill>
+                <a:effectLst/>
+                <a:latin typeface="inter-regular"/>
+              </a:rPr>
+              <a:t>".</a:t>
+            </a:r>
+          </a:p>
+          <a:p>
+            <a:pPr marL="0" indent="0">
+              <a:buNone/>
+            </a:pPr>
+            <a:r>
+              <a:rPr lang="en-US" sz="2200" b="1" u="sng" dirty="0">
+                <a:solidFill>
+                  <a:srgbClr val="333333"/>
+                </a:solidFill>
+                <a:latin typeface="inter-regular"/>
+              </a:rPr>
+              <a:t>Advantages</a:t>
+            </a:r>
+            <a:r>
+              <a:rPr lang="en-US" sz="2200" b="1" dirty="0">
+                <a:solidFill>
+                  <a:srgbClr val="333333"/>
+                </a:solidFill>
+                <a:latin typeface="inter-regular"/>
+              </a:rPr>
+              <a:t>:-</a:t>
+            </a:r>
+          </a:p>
+          <a:p>
+            <a:pPr algn="just">
+              <a:buFont typeface="Arial" panose="020B0604020202020204" pitchFamily="34" charset="0"/>
+              <a:buChar char="•"/>
+            </a:pPr>
+            <a:r>
+              <a:rPr lang="en-US" sz="2200" b="0" i="0" dirty="0">
+                <a:solidFill>
+                  <a:srgbClr val="000000"/>
+                </a:solidFill>
+                <a:effectLst/>
+                <a:latin typeface="inter-regular"/>
+              </a:rPr>
+              <a:t>It describes the coupling between the objects and the observer.</a:t>
+            </a:r>
+          </a:p>
+          <a:p>
+            <a:pPr algn="just">
+              <a:buFont typeface="Arial" panose="020B0604020202020204" pitchFamily="34" charset="0"/>
+              <a:buChar char="•"/>
+            </a:pPr>
+            <a:r>
+              <a:rPr lang="en-US" sz="2200" b="0" i="0" dirty="0">
+                <a:solidFill>
+                  <a:srgbClr val="000000"/>
+                </a:solidFill>
+                <a:effectLst/>
+                <a:latin typeface="inter-regular"/>
+              </a:rPr>
+              <a:t>It provides the support for broadcast-type communication.</a:t>
+            </a:r>
+          </a:p>
+          <a:p>
+            <a:pPr marL="0" indent="0">
+              <a:buNone/>
+            </a:pPr>
+            <a:br>
+              <a:rPr lang="en-US" sz="1600" dirty="0"/>
+            </a:br>
+            <a:r>
+              <a:rPr lang="en-US" sz="2200" b="1" u="sng" dirty="0">
+                <a:solidFill>
+                  <a:srgbClr val="000000"/>
+                </a:solidFill>
+                <a:latin typeface="inter-regular"/>
+              </a:rPr>
+              <a:t>Usage</a:t>
+            </a:r>
+            <a:r>
+              <a:rPr lang="en-US" sz="2200" b="1" dirty="0">
+                <a:solidFill>
+                  <a:srgbClr val="000000"/>
+                </a:solidFill>
+                <a:latin typeface="inter-regular"/>
+              </a:rPr>
+              <a:t>:-</a:t>
+            </a:r>
+          </a:p>
+          <a:p>
+            <a:pPr algn="just">
+              <a:buFont typeface="Arial" panose="020B0604020202020204" pitchFamily="34" charset="0"/>
+              <a:buChar char="•"/>
+            </a:pPr>
+            <a:r>
+              <a:rPr lang="en-US" sz="2200" b="0" i="0" dirty="0">
+                <a:solidFill>
+                  <a:srgbClr val="000000"/>
+                </a:solidFill>
+                <a:effectLst/>
+                <a:latin typeface="inter-regular"/>
+              </a:rPr>
+              <a:t>When the change of a state in one object must be reflected in another object without keeping the objects tight coupled.</a:t>
+            </a:r>
+          </a:p>
+          <a:p>
+            <a:pPr algn="just">
+              <a:buFont typeface="Arial" panose="020B0604020202020204" pitchFamily="34" charset="0"/>
+              <a:buChar char="•"/>
+            </a:pPr>
+            <a:r>
+              <a:rPr lang="en-US" sz="2200" b="0" i="0" dirty="0">
+                <a:solidFill>
+                  <a:srgbClr val="000000"/>
+                </a:solidFill>
+                <a:effectLst/>
+                <a:latin typeface="inter-regular"/>
+              </a:rPr>
+              <a:t>When the framework we writes and needs to be enhanced in future with new observers with minimal </a:t>
+            </a:r>
+            <a:r>
+              <a:rPr lang="en-US" sz="2200" b="0" i="0" dirty="0" err="1">
+                <a:solidFill>
+                  <a:srgbClr val="000000"/>
+                </a:solidFill>
+                <a:effectLst/>
+                <a:latin typeface="inter-regular"/>
+              </a:rPr>
+              <a:t>chamges</a:t>
+            </a:r>
+            <a:r>
+              <a:rPr lang="en-US" sz="2200" b="0" i="0" dirty="0">
+                <a:solidFill>
+                  <a:srgbClr val="000000"/>
+                </a:solidFill>
+                <a:effectLst/>
+                <a:latin typeface="inter-regular"/>
+              </a:rPr>
+              <a:t>.</a:t>
+            </a:r>
+          </a:p>
+          <a:p>
+            <a:pPr marL="0" indent="0" algn="just">
+              <a:buFont typeface="Arial" panose="020B0604020202020204" pitchFamily="34" charset="0"/>
+              <a:buNone/>
+            </a:pPr>
+            <a:r>
+              <a:rPr lang="en-US" sz="2200" b="1" u="sng" dirty="0">
+                <a:solidFill>
+                  <a:schemeClr val="tx1">
+                    <a:lumMod val="95000"/>
+                    <a:lumOff val="5000"/>
+                  </a:schemeClr>
+                </a:solidFill>
+                <a:latin typeface="Google Sans"/>
+              </a:rPr>
+              <a:t>Real-Time Example</a:t>
+            </a:r>
+            <a:r>
+              <a:rPr lang="en-US" sz="2200" dirty="0">
+                <a:solidFill>
+                  <a:schemeClr val="tx1">
+                    <a:lumMod val="95000"/>
+                    <a:lumOff val="5000"/>
+                  </a:schemeClr>
+                </a:solidFill>
+                <a:latin typeface="Google Sans"/>
+              </a:rPr>
+              <a:t>:-</a:t>
+            </a:r>
+          </a:p>
+          <a:p>
+            <a:r>
+              <a:rPr lang="en-US" sz="2200" b="0" i="0" dirty="0">
+                <a:solidFill>
+                  <a:schemeClr val="tx1">
+                    <a:lumMod val="95000"/>
+                    <a:lumOff val="5000"/>
+                  </a:schemeClr>
+                </a:solidFill>
+                <a:effectLst/>
+                <a:latin typeface="Google Sans"/>
+              </a:rPr>
+              <a:t>Sending Notifications to </a:t>
+            </a:r>
+            <a:r>
+              <a:rPr lang="en-US" sz="2200" b="0" i="0">
+                <a:solidFill>
+                  <a:schemeClr val="tx1">
+                    <a:lumMod val="95000"/>
+                    <a:lumOff val="5000"/>
+                  </a:schemeClr>
+                </a:solidFill>
+                <a:effectLst/>
+                <a:latin typeface="Google Sans"/>
+              </a:rPr>
+              <a:t>all employees.</a:t>
+            </a:r>
+            <a:endParaRPr lang="en-IN" sz="2200" dirty="0">
+              <a:solidFill>
+                <a:schemeClr val="tx1">
+                  <a:lumMod val="95000"/>
+                  <a:lumOff val="5000"/>
+                </a:schemeClr>
+              </a:solidFill>
+            </a:endParaRPr>
+          </a:p>
+        </p:txBody>
+      </p:sp>
+    </p:spTree>
+    <p:extLst>
+      <p:ext uri="{BB962C8B-B14F-4D97-AF65-F5344CB8AC3E}">
+        <p14:creationId xmlns:p14="http://schemas.microsoft.com/office/powerpoint/2010/main" val="2762770838"/>
       </p:ext>
     </p:extLst>
   </p:cSld>

</xml_diff>

<commit_message>
Committed for Memento Design Pattern
</commit_message>
<xml_diff>
--- a/DesignPatterns.pptx
+++ b/DesignPatterns.pptx
@@ -26,6 +26,8 @@
     <p:sldId id="275" r:id="rId20"/>
     <p:sldId id="276" r:id="rId21"/>
     <p:sldId id="277" r:id="rId22"/>
+    <p:sldId id="278" r:id="rId23"/>
+    <p:sldId id="279" r:id="rId24"/>
   </p:sldIdLst>
   <p:sldSz cx="12192000" cy="6858000"/>
   <p:notesSz cx="6858000" cy="9144000"/>
@@ -135,7 +137,7 @@
 <file path=ppt/revisionInfo.xml><?xml version="1.0" encoding="utf-8"?>
 <p1510:revInfo xmlns:a="http://schemas.openxmlformats.org/drawingml/2006/main" xmlns:r="http://schemas.openxmlformats.org/officeDocument/2006/relationships" xmlns:p1510="http://schemas.microsoft.com/office/powerpoint/2015/10/main">
   <p1510:revLst>
-    <p1510:client id="{2B8E2204-9F68-4922-875F-CECA66539EED}" v="18" dt="2023-09-12T15:38:43.606"/>
+    <p1510:client id="{2B8E2204-9F68-4922-875F-CECA66539EED}" v="20" dt="2023-09-14T08:38:31.760"/>
   </p1510:revLst>
 </p1510:revInfo>
 </file>
@@ -464,7 +466,7 @@
   <pc:docChgLst>
     <pc:chgData name="Manaswini Ray" userId="451f23f8-43b4-4daa-9511-0c9fb98bad1c" providerId="ADAL" clId="{2B8E2204-9F68-4922-875F-CECA66539EED}"/>
     <pc:docChg chg="undo custSel addSld delSld modSld sldOrd">
-      <pc:chgData name="Manaswini Ray" userId="451f23f8-43b4-4daa-9511-0c9fb98bad1c" providerId="ADAL" clId="{2B8E2204-9F68-4922-875F-CECA66539EED}" dt="2023-09-12T15:40:05.314" v="563" actId="20577"/>
+      <pc:chgData name="Manaswini Ray" userId="451f23f8-43b4-4daa-9511-0c9fb98bad1c" providerId="ADAL" clId="{2B8E2204-9F68-4922-875F-CECA66539EED}" dt="2023-09-14T08:43:47.675" v="639" actId="20577"/>
       <pc:docMkLst>
         <pc:docMk/>
       </pc:docMkLst>
@@ -660,13 +662,13 @@
         </pc:spChg>
       </pc:sldChg>
       <pc:sldChg chg="addSp modSp new mod">
-        <pc:chgData name="Manaswini Ray" userId="451f23f8-43b4-4daa-9511-0c9fb98bad1c" providerId="ADAL" clId="{2B8E2204-9F68-4922-875F-CECA66539EED}" dt="2023-09-12T12:55:27.312" v="451" actId="20577"/>
+        <pc:chgData name="Manaswini Ray" userId="451f23f8-43b4-4daa-9511-0c9fb98bad1c" providerId="ADAL" clId="{2B8E2204-9F68-4922-875F-CECA66539EED}" dt="2023-09-14T08:38:25.342" v="584" actId="20577"/>
         <pc:sldMkLst>
           <pc:docMk/>
           <pc:sldMk cId="3144306577" sldId="275"/>
         </pc:sldMkLst>
         <pc:spChg chg="add mod">
-          <ac:chgData name="Manaswini Ray" userId="451f23f8-43b4-4daa-9511-0c9fb98bad1c" providerId="ADAL" clId="{2B8E2204-9F68-4922-875F-CECA66539EED}" dt="2023-09-12T12:50:33.389" v="353" actId="20577"/>
+          <ac:chgData name="Manaswini Ray" userId="451f23f8-43b4-4daa-9511-0c9fb98bad1c" providerId="ADAL" clId="{2B8E2204-9F68-4922-875F-CECA66539EED}" dt="2023-09-14T08:38:25.342" v="584" actId="20577"/>
           <ac:spMkLst>
             <pc:docMk/>
             <pc:sldMk cId="3144306577" sldId="275"/>
@@ -725,6 +727,52 @@
             <pc:docMk/>
             <pc:sldMk cId="2762770838" sldId="277"/>
             <ac:spMk id="3" creationId="{B4A6DD9B-9D06-DFC3-E961-F9455E83B155}"/>
+          </ac:spMkLst>
+        </pc:spChg>
+      </pc:sldChg>
+      <pc:sldChg chg="addSp modSp new mod">
+        <pc:chgData name="Manaswini Ray" userId="451f23f8-43b4-4daa-9511-0c9fb98bad1c" providerId="ADAL" clId="{2B8E2204-9F68-4922-875F-CECA66539EED}" dt="2023-09-14T08:43:47.675" v="639" actId="20577"/>
+        <pc:sldMkLst>
+          <pc:docMk/>
+          <pc:sldMk cId="93905236" sldId="278"/>
+        </pc:sldMkLst>
+        <pc:spChg chg="add mod">
+          <ac:chgData name="Manaswini Ray" userId="451f23f8-43b4-4daa-9511-0c9fb98bad1c" providerId="ADAL" clId="{2B8E2204-9F68-4922-875F-CECA66539EED}" dt="2023-09-14T08:38:18.152" v="577" actId="20577"/>
+          <ac:spMkLst>
+            <pc:docMk/>
+            <pc:sldMk cId="93905236" sldId="278"/>
+            <ac:spMk id="2" creationId="{E2B98887-7FBF-6941-48A2-28C5796B954D}"/>
+          </ac:spMkLst>
+        </pc:spChg>
+        <pc:spChg chg="add mod">
+          <ac:chgData name="Manaswini Ray" userId="451f23f8-43b4-4daa-9511-0c9fb98bad1c" providerId="ADAL" clId="{2B8E2204-9F68-4922-875F-CECA66539EED}" dt="2023-09-14T08:43:47.675" v="639" actId="20577"/>
+          <ac:spMkLst>
+            <pc:docMk/>
+            <pc:sldMk cId="93905236" sldId="278"/>
+            <ac:spMk id="3" creationId="{B0B9CD60-DD91-5945-1FF7-5CB2B12B43F8}"/>
+          </ac:spMkLst>
+        </pc:spChg>
+      </pc:sldChg>
+      <pc:sldChg chg="addSp modSp new mod">
+        <pc:chgData name="Manaswini Ray" userId="451f23f8-43b4-4daa-9511-0c9fb98bad1c" providerId="ADAL" clId="{2B8E2204-9F68-4922-875F-CECA66539EED}" dt="2023-09-14T08:41:12.507" v="618" actId="1076"/>
+        <pc:sldMkLst>
+          <pc:docMk/>
+          <pc:sldMk cId="4216032966" sldId="279"/>
+        </pc:sldMkLst>
+        <pc:spChg chg="add mod">
+          <ac:chgData name="Manaswini Ray" userId="451f23f8-43b4-4daa-9511-0c9fb98bad1c" providerId="ADAL" clId="{2B8E2204-9F68-4922-875F-CECA66539EED}" dt="2023-09-14T08:41:12.507" v="618" actId="1076"/>
+          <ac:spMkLst>
+            <pc:docMk/>
+            <pc:sldMk cId="4216032966" sldId="279"/>
+            <ac:spMk id="2" creationId="{A5A26202-3528-E44F-3068-6FDCC409D624}"/>
+          </ac:spMkLst>
+        </pc:spChg>
+        <pc:spChg chg="add mod">
+          <ac:chgData name="Manaswini Ray" userId="451f23f8-43b4-4daa-9511-0c9fb98bad1c" providerId="ADAL" clId="{2B8E2204-9F68-4922-875F-CECA66539EED}" dt="2023-09-14T08:41:08.546" v="617" actId="12"/>
+          <ac:spMkLst>
+            <pc:docMk/>
+            <pc:sldMk cId="4216032966" sldId="279"/>
+            <ac:spMk id="3" creationId="{35BEB050-2553-DE6F-B076-AFF72A20197C}"/>
           </ac:spMkLst>
         </pc:spChg>
       </pc:sldChg>
@@ -882,7 +930,7 @@
           <a:p>
             <a:fld id="{A1AA28CD-13E1-4DEA-B553-BCBE77DAC64A}" type="datetimeFigureOut">
               <a:rPr lang="en-IN" smtClean="0"/>
-              <a:t>12-09-2023</a:t>
+              <a:t>14-09-2023</a:t>
             </a:fld>
             <a:endParaRPr lang="en-IN"/>
           </a:p>
@@ -1082,7 +1130,7 @@
           <a:p>
             <a:fld id="{A1AA28CD-13E1-4DEA-B553-BCBE77DAC64A}" type="datetimeFigureOut">
               <a:rPr lang="en-IN" smtClean="0"/>
-              <a:t>12-09-2023</a:t>
+              <a:t>14-09-2023</a:t>
             </a:fld>
             <a:endParaRPr lang="en-IN"/>
           </a:p>
@@ -1292,7 +1340,7 @@
           <a:p>
             <a:fld id="{A1AA28CD-13E1-4DEA-B553-BCBE77DAC64A}" type="datetimeFigureOut">
               <a:rPr lang="en-IN" smtClean="0"/>
-              <a:t>12-09-2023</a:t>
+              <a:t>14-09-2023</a:t>
             </a:fld>
             <a:endParaRPr lang="en-IN"/>
           </a:p>
@@ -1492,7 +1540,7 @@
           <a:p>
             <a:fld id="{A1AA28CD-13E1-4DEA-B553-BCBE77DAC64A}" type="datetimeFigureOut">
               <a:rPr lang="en-IN" smtClean="0"/>
-              <a:t>12-09-2023</a:t>
+              <a:t>14-09-2023</a:t>
             </a:fld>
             <a:endParaRPr lang="en-IN"/>
           </a:p>
@@ -1768,7 +1816,7 @@
           <a:p>
             <a:fld id="{A1AA28CD-13E1-4DEA-B553-BCBE77DAC64A}" type="datetimeFigureOut">
               <a:rPr lang="en-IN" smtClean="0"/>
-              <a:t>12-09-2023</a:t>
+              <a:t>14-09-2023</a:t>
             </a:fld>
             <a:endParaRPr lang="en-IN"/>
           </a:p>
@@ -2036,7 +2084,7 @@
           <a:p>
             <a:fld id="{A1AA28CD-13E1-4DEA-B553-BCBE77DAC64A}" type="datetimeFigureOut">
               <a:rPr lang="en-IN" smtClean="0"/>
-              <a:t>12-09-2023</a:t>
+              <a:t>14-09-2023</a:t>
             </a:fld>
             <a:endParaRPr lang="en-IN"/>
           </a:p>
@@ -2451,7 +2499,7 @@
           <a:p>
             <a:fld id="{A1AA28CD-13E1-4DEA-B553-BCBE77DAC64A}" type="datetimeFigureOut">
               <a:rPr lang="en-IN" smtClean="0"/>
-              <a:t>12-09-2023</a:t>
+              <a:t>14-09-2023</a:t>
             </a:fld>
             <a:endParaRPr lang="en-IN"/>
           </a:p>
@@ -2593,7 +2641,7 @@
           <a:p>
             <a:fld id="{A1AA28CD-13E1-4DEA-B553-BCBE77DAC64A}" type="datetimeFigureOut">
               <a:rPr lang="en-IN" smtClean="0"/>
-              <a:t>12-09-2023</a:t>
+              <a:t>14-09-2023</a:t>
             </a:fld>
             <a:endParaRPr lang="en-IN"/>
           </a:p>
@@ -2706,7 +2754,7 @@
           <a:p>
             <a:fld id="{A1AA28CD-13E1-4DEA-B553-BCBE77DAC64A}" type="datetimeFigureOut">
               <a:rPr lang="en-IN" smtClean="0"/>
-              <a:t>12-09-2023</a:t>
+              <a:t>14-09-2023</a:t>
             </a:fld>
             <a:endParaRPr lang="en-IN"/>
           </a:p>
@@ -3019,7 +3067,7 @@
           <a:p>
             <a:fld id="{A1AA28CD-13E1-4DEA-B553-BCBE77DAC64A}" type="datetimeFigureOut">
               <a:rPr lang="en-IN" smtClean="0"/>
-              <a:t>12-09-2023</a:t>
+              <a:t>14-09-2023</a:t>
             </a:fld>
             <a:endParaRPr lang="en-IN"/>
           </a:p>
@@ -3308,7 +3356,7 @@
           <a:p>
             <a:fld id="{A1AA28CD-13E1-4DEA-B553-BCBE77DAC64A}" type="datetimeFigureOut">
               <a:rPr lang="en-IN" smtClean="0"/>
-              <a:t>12-09-2023</a:t>
+              <a:t>14-09-2023</a:t>
             </a:fld>
             <a:endParaRPr lang="en-IN"/>
           </a:p>
@@ -3551,7 +3599,7 @@
           <a:p>
             <a:fld id="{A1AA28CD-13E1-4DEA-B553-BCBE77DAC64A}" type="datetimeFigureOut">
               <a:rPr lang="en-IN" smtClean="0"/>
-              <a:t>12-09-2023</a:t>
+              <a:t>14-09-2023</a:t>
             </a:fld>
             <a:endParaRPr lang="en-IN"/>
           </a:p>
@@ -8264,7 +8312,7 @@
           <a:p>
             <a:r>
               <a:rPr lang="en-US" b="1" u="sng" dirty="0"/>
-              <a:t>Template Design Pattern</a:t>
+              <a:t>Template Method Design Pattern</a:t>
             </a:r>
             <a:endParaRPr lang="en-IN" b="1" u="sng" dirty="0"/>
           </a:p>
@@ -9825,6 +9873,1056 @@
     <p:extLst>
       <p:ext uri="{BB962C8B-B14F-4D97-AF65-F5344CB8AC3E}">
         <p14:creationId xmlns:p14="http://schemas.microsoft.com/office/powerpoint/2010/main" val="2762770838"/>
+      </p:ext>
+    </p:extLst>
+  </p:cSld>
+  <p:clrMapOvr>
+    <a:masterClrMapping/>
+  </p:clrMapOvr>
+</p:sld>
+</file>
+
+<file path=ppt/slides/slide22.xml><?xml version="1.0" encoding="utf-8"?>
+<p:sld xmlns:a="http://schemas.openxmlformats.org/drawingml/2006/main" xmlns:r="http://schemas.openxmlformats.org/officeDocument/2006/relationships" xmlns:p="http://schemas.openxmlformats.org/presentationml/2006/main">
+  <p:cSld>
+    <p:spTree>
+      <p:nvGrpSpPr>
+        <p:cNvPr id="1" name=""/>
+        <p:cNvGrpSpPr/>
+        <p:nvPr/>
+      </p:nvGrpSpPr>
+      <p:grpSpPr>
+        <a:xfrm>
+          <a:off x="0" y="0"/>
+          <a:ext cx="0" cy="0"/>
+          <a:chOff x="0" y="0"/>
+          <a:chExt cx="0" cy="0"/>
+        </a:xfrm>
+      </p:grpSpPr>
+      <p:sp>
+        <p:nvSpPr>
+          <p:cNvPr id="2" name="Title 1">
+            <a:extLst>
+              <a:ext uri="{FF2B5EF4-FFF2-40B4-BE49-F238E27FC236}">
+                <a16:creationId xmlns:a16="http://schemas.microsoft.com/office/drawing/2014/main" id="{E2B98887-7FBF-6941-48A2-28C5796B954D}"/>
+              </a:ext>
+            </a:extLst>
+          </p:cNvPr>
+          <p:cNvSpPr txBox="1">
+            <a:spLocks/>
+          </p:cNvSpPr>
+          <p:nvPr/>
+        </p:nvSpPr>
+        <p:spPr>
+          <a:xfrm>
+            <a:off x="496957" y="417445"/>
+            <a:ext cx="10515600" cy="1325563"/>
+          </a:xfrm>
+          <a:prstGeom prst="rect">
+            <a:avLst/>
+          </a:prstGeom>
+        </p:spPr>
+        <p:txBody>
+          <a:bodyPr/>
+          <a:lstStyle>
+            <a:lvl1pPr algn="l" defTabSz="914400" rtl="0" eaLnBrk="1" latinLnBrk="0" hangingPunct="1">
+              <a:lnSpc>
+                <a:spcPct val="90000"/>
+              </a:lnSpc>
+              <a:spcBef>
+                <a:spcPct val="0"/>
+              </a:spcBef>
+              <a:buNone/>
+              <a:defRPr sz="4400" kern="1200">
+                <a:solidFill>
+                  <a:schemeClr val="tx1"/>
+                </a:solidFill>
+                <a:latin typeface="+mj-lt"/>
+                <a:ea typeface="+mj-ea"/>
+                <a:cs typeface="+mj-cs"/>
+              </a:defRPr>
+            </a:lvl1pPr>
+          </a:lstStyle>
+          <a:p>
+            <a:r>
+              <a:rPr lang="en-US" b="1" u="sng" dirty="0"/>
+              <a:t>Strategy Design Pattern</a:t>
+            </a:r>
+            <a:endParaRPr lang="en-IN" b="1" u="sng" dirty="0"/>
+          </a:p>
+        </p:txBody>
+      </p:sp>
+      <p:sp>
+        <p:nvSpPr>
+          <p:cNvPr id="3" name="Content Placeholder 2">
+            <a:extLst>
+              <a:ext uri="{FF2B5EF4-FFF2-40B4-BE49-F238E27FC236}">
+                <a16:creationId xmlns:a16="http://schemas.microsoft.com/office/drawing/2014/main" id="{B0B9CD60-DD91-5945-1FF7-5CB2B12B43F8}"/>
+              </a:ext>
+            </a:extLst>
+          </p:cNvPr>
+          <p:cNvSpPr txBox="1">
+            <a:spLocks/>
+          </p:cNvSpPr>
+          <p:nvPr/>
+        </p:nvSpPr>
+        <p:spPr>
+          <a:xfrm>
+            <a:off x="455543" y="1073427"/>
+            <a:ext cx="11280913" cy="5367128"/>
+          </a:xfrm>
+          <a:prstGeom prst="rect">
+            <a:avLst/>
+          </a:prstGeom>
+        </p:spPr>
+        <p:txBody>
+          <a:bodyPr>
+            <a:normAutofit/>
+          </a:bodyPr>
+          <a:lstStyle>
+            <a:lvl1pPr marL="228600" indent="-228600" algn="l" defTabSz="914400" rtl="0" eaLnBrk="1" latinLnBrk="0" hangingPunct="1">
+              <a:lnSpc>
+                <a:spcPct val="90000"/>
+              </a:lnSpc>
+              <a:spcBef>
+                <a:spcPts val="1000"/>
+              </a:spcBef>
+              <a:buFont typeface="Arial" panose="020B0604020202020204" pitchFamily="34" charset="0"/>
+              <a:buChar char="•"/>
+              <a:defRPr sz="2800" kern="1200">
+                <a:solidFill>
+                  <a:schemeClr val="tx1"/>
+                </a:solidFill>
+                <a:latin typeface="+mn-lt"/>
+                <a:ea typeface="+mn-ea"/>
+                <a:cs typeface="+mn-cs"/>
+              </a:defRPr>
+            </a:lvl1pPr>
+            <a:lvl2pPr marL="685800" indent="-228600" algn="l" defTabSz="914400" rtl="0" eaLnBrk="1" latinLnBrk="0" hangingPunct="1">
+              <a:lnSpc>
+                <a:spcPct val="90000"/>
+              </a:lnSpc>
+              <a:spcBef>
+                <a:spcPts val="500"/>
+              </a:spcBef>
+              <a:buFont typeface="Arial" panose="020B0604020202020204" pitchFamily="34" charset="0"/>
+              <a:buChar char="•"/>
+              <a:defRPr sz="2400" kern="1200">
+                <a:solidFill>
+                  <a:schemeClr val="tx1"/>
+                </a:solidFill>
+                <a:latin typeface="+mn-lt"/>
+                <a:ea typeface="+mn-ea"/>
+                <a:cs typeface="+mn-cs"/>
+              </a:defRPr>
+            </a:lvl2pPr>
+            <a:lvl3pPr marL="1143000" indent="-228600" algn="l" defTabSz="914400" rtl="0" eaLnBrk="1" latinLnBrk="0" hangingPunct="1">
+              <a:lnSpc>
+                <a:spcPct val="90000"/>
+              </a:lnSpc>
+              <a:spcBef>
+                <a:spcPts val="500"/>
+              </a:spcBef>
+              <a:buFont typeface="Arial" panose="020B0604020202020204" pitchFamily="34" charset="0"/>
+              <a:buChar char="•"/>
+              <a:defRPr sz="2000" kern="1200">
+                <a:solidFill>
+                  <a:schemeClr val="tx1"/>
+                </a:solidFill>
+                <a:latin typeface="+mn-lt"/>
+                <a:ea typeface="+mn-ea"/>
+                <a:cs typeface="+mn-cs"/>
+              </a:defRPr>
+            </a:lvl3pPr>
+            <a:lvl4pPr marL="1600200" indent="-228600" algn="l" defTabSz="914400" rtl="0" eaLnBrk="1" latinLnBrk="0" hangingPunct="1">
+              <a:lnSpc>
+                <a:spcPct val="90000"/>
+              </a:lnSpc>
+              <a:spcBef>
+                <a:spcPts val="500"/>
+              </a:spcBef>
+              <a:buFont typeface="Arial" panose="020B0604020202020204" pitchFamily="34" charset="0"/>
+              <a:buChar char="•"/>
+              <a:defRPr sz="1800" kern="1200">
+                <a:solidFill>
+                  <a:schemeClr val="tx1"/>
+                </a:solidFill>
+                <a:latin typeface="+mn-lt"/>
+                <a:ea typeface="+mn-ea"/>
+                <a:cs typeface="+mn-cs"/>
+              </a:defRPr>
+            </a:lvl4pPr>
+            <a:lvl5pPr marL="2057400" indent="-228600" algn="l" defTabSz="914400" rtl="0" eaLnBrk="1" latinLnBrk="0" hangingPunct="1">
+              <a:lnSpc>
+                <a:spcPct val="90000"/>
+              </a:lnSpc>
+              <a:spcBef>
+                <a:spcPts val="500"/>
+              </a:spcBef>
+              <a:buFont typeface="Arial" panose="020B0604020202020204" pitchFamily="34" charset="0"/>
+              <a:buChar char="•"/>
+              <a:defRPr sz="1800" kern="1200">
+                <a:solidFill>
+                  <a:schemeClr val="tx1"/>
+                </a:solidFill>
+                <a:latin typeface="+mn-lt"/>
+                <a:ea typeface="+mn-ea"/>
+                <a:cs typeface="+mn-cs"/>
+              </a:defRPr>
+            </a:lvl5pPr>
+            <a:lvl6pPr marL="2514600" indent="-228600" algn="l" defTabSz="914400" rtl="0" eaLnBrk="1" latinLnBrk="0" hangingPunct="1">
+              <a:lnSpc>
+                <a:spcPct val="90000"/>
+              </a:lnSpc>
+              <a:spcBef>
+                <a:spcPts val="500"/>
+              </a:spcBef>
+              <a:buFont typeface="Arial" panose="020B0604020202020204" pitchFamily="34" charset="0"/>
+              <a:buChar char="•"/>
+              <a:defRPr sz="1800" kern="1200">
+                <a:solidFill>
+                  <a:schemeClr val="tx1"/>
+                </a:solidFill>
+                <a:latin typeface="+mn-lt"/>
+                <a:ea typeface="+mn-ea"/>
+                <a:cs typeface="+mn-cs"/>
+              </a:defRPr>
+            </a:lvl6pPr>
+            <a:lvl7pPr marL="2971800" indent="-228600" algn="l" defTabSz="914400" rtl="0" eaLnBrk="1" latinLnBrk="0" hangingPunct="1">
+              <a:lnSpc>
+                <a:spcPct val="90000"/>
+              </a:lnSpc>
+              <a:spcBef>
+                <a:spcPts val="500"/>
+              </a:spcBef>
+              <a:buFont typeface="Arial" panose="020B0604020202020204" pitchFamily="34" charset="0"/>
+              <a:buChar char="•"/>
+              <a:defRPr sz="1800" kern="1200">
+                <a:solidFill>
+                  <a:schemeClr val="tx1"/>
+                </a:solidFill>
+                <a:latin typeface="+mn-lt"/>
+                <a:ea typeface="+mn-ea"/>
+                <a:cs typeface="+mn-cs"/>
+              </a:defRPr>
+            </a:lvl7pPr>
+            <a:lvl8pPr marL="3429000" indent="-228600" algn="l" defTabSz="914400" rtl="0" eaLnBrk="1" latinLnBrk="0" hangingPunct="1">
+              <a:lnSpc>
+                <a:spcPct val="90000"/>
+              </a:lnSpc>
+              <a:spcBef>
+                <a:spcPts val="500"/>
+              </a:spcBef>
+              <a:buFont typeface="Arial" panose="020B0604020202020204" pitchFamily="34" charset="0"/>
+              <a:buChar char="•"/>
+              <a:defRPr sz="1800" kern="1200">
+                <a:solidFill>
+                  <a:schemeClr val="tx1"/>
+                </a:solidFill>
+                <a:latin typeface="+mn-lt"/>
+                <a:ea typeface="+mn-ea"/>
+                <a:cs typeface="+mn-cs"/>
+              </a:defRPr>
+            </a:lvl8pPr>
+            <a:lvl9pPr marL="3886200" indent="-228600" algn="l" defTabSz="914400" rtl="0" eaLnBrk="1" latinLnBrk="0" hangingPunct="1">
+              <a:lnSpc>
+                <a:spcPct val="90000"/>
+              </a:lnSpc>
+              <a:spcBef>
+                <a:spcPts val="500"/>
+              </a:spcBef>
+              <a:buFont typeface="Arial" panose="020B0604020202020204" pitchFamily="34" charset="0"/>
+              <a:buChar char="•"/>
+              <a:defRPr sz="1800" kern="1200">
+                <a:solidFill>
+                  <a:schemeClr val="tx1"/>
+                </a:solidFill>
+                <a:latin typeface="+mn-lt"/>
+                <a:ea typeface="+mn-ea"/>
+                <a:cs typeface="+mn-cs"/>
+              </a:defRPr>
+            </a:lvl9pPr>
+          </a:lstStyle>
+          <a:p>
+            <a:endParaRPr lang="en-US" sz="600" b="0" i="0" dirty="0">
+              <a:solidFill>
+                <a:srgbClr val="333333"/>
+              </a:solidFill>
+              <a:effectLst/>
+              <a:latin typeface="inter-regular"/>
+            </a:endParaRPr>
+          </a:p>
+          <a:p>
+            <a:r>
+              <a:rPr lang="en-US" sz="2400" dirty="0">
+                <a:solidFill>
+                  <a:srgbClr val="333333"/>
+                </a:solidFill>
+                <a:latin typeface="inter-regular"/>
+              </a:rPr>
+              <a:t>In this</a:t>
+            </a:r>
+            <a:r>
+              <a:rPr lang="en-US" sz="2400" b="1" i="0" dirty="0">
+                <a:solidFill>
+                  <a:srgbClr val="333333"/>
+                </a:solidFill>
+                <a:effectLst/>
+                <a:latin typeface="inter-bold"/>
+              </a:rPr>
+              <a:t> </a:t>
+            </a:r>
+            <a:r>
+              <a:rPr lang="en-US" sz="2200" b="1" i="0" dirty="0">
+                <a:solidFill>
+                  <a:srgbClr val="333333"/>
+                </a:solidFill>
+                <a:effectLst/>
+                <a:latin typeface="inter-regular"/>
+              </a:rPr>
+              <a:t>"defines a family of functionality, encapsulate each one, and make them interchangeable".</a:t>
+            </a:r>
+            <a:endParaRPr lang="en-US" sz="2200" b="1" i="0" dirty="0">
+              <a:solidFill>
+                <a:schemeClr val="tx1">
+                  <a:lumMod val="95000"/>
+                  <a:lumOff val="5000"/>
+                </a:schemeClr>
+              </a:solidFill>
+              <a:effectLst/>
+              <a:latin typeface="inter-regular"/>
+            </a:endParaRPr>
+          </a:p>
+          <a:p>
+            <a:pPr marL="0" indent="0">
+              <a:buNone/>
+            </a:pPr>
+            <a:r>
+              <a:rPr lang="en-US" sz="2200" b="1" u="sng" dirty="0">
+                <a:solidFill>
+                  <a:srgbClr val="333333"/>
+                </a:solidFill>
+                <a:latin typeface="inter-regular"/>
+              </a:rPr>
+              <a:t>Advantages</a:t>
+            </a:r>
+            <a:r>
+              <a:rPr lang="en-US" sz="2200" b="1" dirty="0">
+                <a:solidFill>
+                  <a:srgbClr val="333333"/>
+                </a:solidFill>
+                <a:latin typeface="inter-regular"/>
+              </a:rPr>
+              <a:t>:-</a:t>
+            </a:r>
+          </a:p>
+          <a:p>
+            <a:pPr algn="just">
+              <a:buFont typeface="Arial" panose="020B0604020202020204" pitchFamily="34" charset="0"/>
+              <a:buChar char="•"/>
+            </a:pPr>
+            <a:r>
+              <a:rPr lang="en-US" sz="2000" b="0" i="0" dirty="0">
+                <a:solidFill>
+                  <a:srgbClr val="000000"/>
+                </a:solidFill>
+                <a:effectLst/>
+                <a:latin typeface="inter-regular"/>
+              </a:rPr>
+              <a:t>It provides a substitute to subclassing.</a:t>
+            </a:r>
+          </a:p>
+          <a:p>
+            <a:pPr algn="just">
+              <a:buFont typeface="Arial" panose="020B0604020202020204" pitchFamily="34" charset="0"/>
+              <a:buChar char="•"/>
+            </a:pPr>
+            <a:r>
+              <a:rPr lang="en-US" sz="2000" b="0" i="0" dirty="0">
+                <a:solidFill>
+                  <a:srgbClr val="000000"/>
+                </a:solidFill>
+                <a:effectLst/>
+                <a:latin typeface="inter-regular"/>
+              </a:rPr>
+              <a:t>It defines each behavior within its own class, eliminating the need for conditional statements.</a:t>
+            </a:r>
+          </a:p>
+          <a:p>
+            <a:pPr algn="just">
+              <a:buFont typeface="Arial" panose="020B0604020202020204" pitchFamily="34" charset="0"/>
+              <a:buChar char="•"/>
+            </a:pPr>
+            <a:r>
+              <a:rPr lang="en-US" sz="2000" b="0" i="0" dirty="0">
+                <a:solidFill>
+                  <a:srgbClr val="000000"/>
+                </a:solidFill>
+                <a:effectLst/>
+                <a:latin typeface="inter-regular"/>
+              </a:rPr>
+              <a:t>It makes it easier to extend and incorporate new behavior without changing the application.</a:t>
+            </a:r>
+          </a:p>
+          <a:p>
+            <a:pPr marL="0" indent="0">
+              <a:buNone/>
+            </a:pPr>
+            <a:br>
+              <a:rPr lang="en-US" sz="1600" dirty="0"/>
+            </a:br>
+            <a:r>
+              <a:rPr lang="en-US" sz="2200" b="1" u="sng" dirty="0">
+                <a:solidFill>
+                  <a:srgbClr val="000000"/>
+                </a:solidFill>
+                <a:latin typeface="inter-regular"/>
+              </a:rPr>
+              <a:t>Usage</a:t>
+            </a:r>
+            <a:r>
+              <a:rPr lang="en-US" sz="2200" b="1" dirty="0">
+                <a:solidFill>
+                  <a:srgbClr val="000000"/>
+                </a:solidFill>
+                <a:latin typeface="inter-regular"/>
+              </a:rPr>
+              <a:t>:-</a:t>
+            </a:r>
+          </a:p>
+          <a:p>
+            <a:pPr algn="just">
+              <a:buFont typeface="Arial" panose="020B0604020202020204" pitchFamily="34" charset="0"/>
+              <a:buChar char="•"/>
+            </a:pPr>
+            <a:r>
+              <a:rPr lang="en-US" sz="2000" b="0" i="0" dirty="0">
+                <a:solidFill>
+                  <a:srgbClr val="000000"/>
+                </a:solidFill>
+                <a:effectLst/>
+                <a:latin typeface="inter-regular"/>
+              </a:rPr>
+              <a:t>When the multiple classes differ only in their </a:t>
+            </a:r>
+            <a:r>
+              <a:rPr lang="en-US" sz="2000" b="0" i="0">
+                <a:solidFill>
+                  <a:srgbClr val="000000"/>
+                </a:solidFill>
+                <a:effectLst/>
+                <a:latin typeface="inter-regular"/>
+              </a:rPr>
+              <a:t>behaviors e</a:t>
+            </a:r>
+            <a:r>
+              <a:rPr lang="en-US" sz="2000" dirty="0">
+                <a:solidFill>
+                  <a:srgbClr val="000000"/>
+                </a:solidFill>
+                <a:latin typeface="inter-regular"/>
+              </a:rPr>
+              <a:t>.</a:t>
+            </a:r>
+            <a:r>
+              <a:rPr lang="en-US" sz="2000" b="0" i="0">
+                <a:solidFill>
+                  <a:srgbClr val="000000"/>
+                </a:solidFill>
+                <a:effectLst/>
+                <a:latin typeface="inter-regular"/>
+              </a:rPr>
+              <a:t>g</a:t>
+            </a:r>
+            <a:r>
+              <a:rPr lang="en-US" sz="2000" b="0" i="0" dirty="0">
+                <a:solidFill>
+                  <a:srgbClr val="000000"/>
+                </a:solidFill>
+                <a:effectLst/>
+                <a:latin typeface="inter-regular"/>
+              </a:rPr>
+              <a:t>. Servlet API.</a:t>
+            </a:r>
+          </a:p>
+          <a:p>
+            <a:pPr algn="just">
+              <a:buFont typeface="Arial" panose="020B0604020202020204" pitchFamily="34" charset="0"/>
+              <a:buChar char="•"/>
+            </a:pPr>
+            <a:r>
+              <a:rPr lang="en-US" sz="2000" b="0" i="0" dirty="0">
+                <a:solidFill>
+                  <a:srgbClr val="000000"/>
+                </a:solidFill>
+                <a:effectLst/>
+                <a:latin typeface="inter-regular"/>
+              </a:rPr>
+              <a:t>It is used when you need different variations of an algorithm.</a:t>
+            </a:r>
+          </a:p>
+          <a:p>
+            <a:pPr marL="0" indent="0" algn="just">
+              <a:buFont typeface="Arial" panose="020B0604020202020204" pitchFamily="34" charset="0"/>
+              <a:buNone/>
+            </a:pPr>
+            <a:r>
+              <a:rPr lang="en-US" sz="2200" b="1" u="sng" dirty="0">
+                <a:solidFill>
+                  <a:schemeClr val="tx1">
+                    <a:lumMod val="95000"/>
+                    <a:lumOff val="5000"/>
+                  </a:schemeClr>
+                </a:solidFill>
+                <a:latin typeface="Google Sans"/>
+              </a:rPr>
+              <a:t>Real-Time Example</a:t>
+            </a:r>
+            <a:r>
+              <a:rPr lang="en-US" sz="2200" dirty="0">
+                <a:solidFill>
+                  <a:schemeClr val="tx1">
+                    <a:lumMod val="95000"/>
+                    <a:lumOff val="5000"/>
+                  </a:schemeClr>
+                </a:solidFill>
+                <a:latin typeface="Google Sans"/>
+              </a:rPr>
+              <a:t>:-</a:t>
+            </a:r>
+          </a:p>
+          <a:p>
+            <a:r>
+              <a:rPr lang="en-US" sz="2200" b="0" i="0" dirty="0">
+                <a:solidFill>
+                  <a:schemeClr val="tx1">
+                    <a:lumMod val="95000"/>
+                    <a:lumOff val="5000"/>
+                  </a:schemeClr>
+                </a:solidFill>
+                <a:effectLst/>
+              </a:rPr>
+              <a:t>A good real world example of a strategy pattern would be a credit card purchase. When you buy something with a credit card, the type of credit card doesn't matter.</a:t>
+            </a:r>
+            <a:endParaRPr lang="en-IN" sz="2200" dirty="0">
+              <a:solidFill>
+                <a:schemeClr val="tx1">
+                  <a:lumMod val="95000"/>
+                  <a:lumOff val="5000"/>
+                </a:schemeClr>
+              </a:solidFill>
+            </a:endParaRPr>
+          </a:p>
+        </p:txBody>
+      </p:sp>
+    </p:spTree>
+    <p:extLst>
+      <p:ext uri="{BB962C8B-B14F-4D97-AF65-F5344CB8AC3E}">
+        <p14:creationId xmlns:p14="http://schemas.microsoft.com/office/powerpoint/2010/main" val="93905236"/>
+      </p:ext>
+    </p:extLst>
+  </p:cSld>
+  <p:clrMapOvr>
+    <a:masterClrMapping/>
+  </p:clrMapOvr>
+</p:sld>
+</file>
+
+<file path=ppt/slides/slide23.xml><?xml version="1.0" encoding="utf-8"?>
+<p:sld xmlns:a="http://schemas.openxmlformats.org/drawingml/2006/main" xmlns:r="http://schemas.openxmlformats.org/officeDocument/2006/relationships" xmlns:p="http://schemas.openxmlformats.org/presentationml/2006/main">
+  <p:cSld>
+    <p:spTree>
+      <p:nvGrpSpPr>
+        <p:cNvPr id="1" name=""/>
+        <p:cNvGrpSpPr/>
+        <p:nvPr/>
+      </p:nvGrpSpPr>
+      <p:grpSpPr>
+        <a:xfrm>
+          <a:off x="0" y="0"/>
+          <a:ext cx="0" cy="0"/>
+          <a:chOff x="0" y="0"/>
+          <a:chExt cx="0" cy="0"/>
+        </a:xfrm>
+      </p:grpSpPr>
+      <p:sp>
+        <p:nvSpPr>
+          <p:cNvPr id="2" name="Title 1">
+            <a:extLst>
+              <a:ext uri="{FF2B5EF4-FFF2-40B4-BE49-F238E27FC236}">
+                <a16:creationId xmlns:a16="http://schemas.microsoft.com/office/drawing/2014/main" id="{A5A26202-3528-E44F-3068-6FDCC409D624}"/>
+              </a:ext>
+            </a:extLst>
+          </p:cNvPr>
+          <p:cNvSpPr txBox="1">
+            <a:spLocks/>
+          </p:cNvSpPr>
+          <p:nvPr/>
+        </p:nvSpPr>
+        <p:spPr>
+          <a:xfrm>
+            <a:off x="455543" y="268358"/>
+            <a:ext cx="10515600" cy="1325563"/>
+          </a:xfrm>
+          <a:prstGeom prst="rect">
+            <a:avLst/>
+          </a:prstGeom>
+        </p:spPr>
+        <p:txBody>
+          <a:bodyPr/>
+          <a:lstStyle>
+            <a:lvl1pPr algn="l" defTabSz="914400" rtl="0" eaLnBrk="1" latinLnBrk="0" hangingPunct="1">
+              <a:lnSpc>
+                <a:spcPct val="90000"/>
+              </a:lnSpc>
+              <a:spcBef>
+                <a:spcPct val="0"/>
+              </a:spcBef>
+              <a:buNone/>
+              <a:defRPr sz="4400" kern="1200">
+                <a:solidFill>
+                  <a:schemeClr val="tx1"/>
+                </a:solidFill>
+                <a:latin typeface="+mj-lt"/>
+                <a:ea typeface="+mj-ea"/>
+                <a:cs typeface="+mj-cs"/>
+              </a:defRPr>
+            </a:lvl1pPr>
+          </a:lstStyle>
+          <a:p>
+            <a:r>
+              <a:rPr lang="en-US" b="1" u="sng" dirty="0"/>
+              <a:t>Memento Design Pattern</a:t>
+            </a:r>
+            <a:endParaRPr lang="en-IN" b="1" u="sng" dirty="0"/>
+          </a:p>
+        </p:txBody>
+      </p:sp>
+      <p:sp>
+        <p:nvSpPr>
+          <p:cNvPr id="3" name="Content Placeholder 2">
+            <a:extLst>
+              <a:ext uri="{FF2B5EF4-FFF2-40B4-BE49-F238E27FC236}">
+                <a16:creationId xmlns:a16="http://schemas.microsoft.com/office/drawing/2014/main" id="{35BEB050-2553-DE6F-B076-AFF72A20197C}"/>
+              </a:ext>
+            </a:extLst>
+          </p:cNvPr>
+          <p:cNvSpPr txBox="1">
+            <a:spLocks/>
+          </p:cNvSpPr>
+          <p:nvPr/>
+        </p:nvSpPr>
+        <p:spPr>
+          <a:xfrm>
+            <a:off x="455543" y="1073427"/>
+            <a:ext cx="11280913" cy="5367128"/>
+          </a:xfrm>
+          <a:prstGeom prst="rect">
+            <a:avLst/>
+          </a:prstGeom>
+        </p:spPr>
+        <p:txBody>
+          <a:bodyPr>
+            <a:normAutofit lnSpcReduction="10000"/>
+          </a:bodyPr>
+          <a:lstStyle>
+            <a:lvl1pPr marL="228600" indent="-228600" algn="l" defTabSz="914400" rtl="0" eaLnBrk="1" latinLnBrk="0" hangingPunct="1">
+              <a:lnSpc>
+                <a:spcPct val="90000"/>
+              </a:lnSpc>
+              <a:spcBef>
+                <a:spcPts val="1000"/>
+              </a:spcBef>
+              <a:buFont typeface="Arial" panose="020B0604020202020204" pitchFamily="34" charset="0"/>
+              <a:buChar char="•"/>
+              <a:defRPr sz="2800" kern="1200">
+                <a:solidFill>
+                  <a:schemeClr val="tx1"/>
+                </a:solidFill>
+                <a:latin typeface="+mn-lt"/>
+                <a:ea typeface="+mn-ea"/>
+                <a:cs typeface="+mn-cs"/>
+              </a:defRPr>
+            </a:lvl1pPr>
+            <a:lvl2pPr marL="685800" indent="-228600" algn="l" defTabSz="914400" rtl="0" eaLnBrk="1" latinLnBrk="0" hangingPunct="1">
+              <a:lnSpc>
+                <a:spcPct val="90000"/>
+              </a:lnSpc>
+              <a:spcBef>
+                <a:spcPts val="500"/>
+              </a:spcBef>
+              <a:buFont typeface="Arial" panose="020B0604020202020204" pitchFamily="34" charset="0"/>
+              <a:buChar char="•"/>
+              <a:defRPr sz="2400" kern="1200">
+                <a:solidFill>
+                  <a:schemeClr val="tx1"/>
+                </a:solidFill>
+                <a:latin typeface="+mn-lt"/>
+                <a:ea typeface="+mn-ea"/>
+                <a:cs typeface="+mn-cs"/>
+              </a:defRPr>
+            </a:lvl2pPr>
+            <a:lvl3pPr marL="1143000" indent="-228600" algn="l" defTabSz="914400" rtl="0" eaLnBrk="1" latinLnBrk="0" hangingPunct="1">
+              <a:lnSpc>
+                <a:spcPct val="90000"/>
+              </a:lnSpc>
+              <a:spcBef>
+                <a:spcPts val="500"/>
+              </a:spcBef>
+              <a:buFont typeface="Arial" panose="020B0604020202020204" pitchFamily="34" charset="0"/>
+              <a:buChar char="•"/>
+              <a:defRPr sz="2000" kern="1200">
+                <a:solidFill>
+                  <a:schemeClr val="tx1"/>
+                </a:solidFill>
+                <a:latin typeface="+mn-lt"/>
+                <a:ea typeface="+mn-ea"/>
+                <a:cs typeface="+mn-cs"/>
+              </a:defRPr>
+            </a:lvl3pPr>
+            <a:lvl4pPr marL="1600200" indent="-228600" algn="l" defTabSz="914400" rtl="0" eaLnBrk="1" latinLnBrk="0" hangingPunct="1">
+              <a:lnSpc>
+                <a:spcPct val="90000"/>
+              </a:lnSpc>
+              <a:spcBef>
+                <a:spcPts val="500"/>
+              </a:spcBef>
+              <a:buFont typeface="Arial" panose="020B0604020202020204" pitchFamily="34" charset="0"/>
+              <a:buChar char="•"/>
+              <a:defRPr sz="1800" kern="1200">
+                <a:solidFill>
+                  <a:schemeClr val="tx1"/>
+                </a:solidFill>
+                <a:latin typeface="+mn-lt"/>
+                <a:ea typeface="+mn-ea"/>
+                <a:cs typeface="+mn-cs"/>
+              </a:defRPr>
+            </a:lvl4pPr>
+            <a:lvl5pPr marL="2057400" indent="-228600" algn="l" defTabSz="914400" rtl="0" eaLnBrk="1" latinLnBrk="0" hangingPunct="1">
+              <a:lnSpc>
+                <a:spcPct val="90000"/>
+              </a:lnSpc>
+              <a:spcBef>
+                <a:spcPts val="500"/>
+              </a:spcBef>
+              <a:buFont typeface="Arial" panose="020B0604020202020204" pitchFamily="34" charset="0"/>
+              <a:buChar char="•"/>
+              <a:defRPr sz="1800" kern="1200">
+                <a:solidFill>
+                  <a:schemeClr val="tx1"/>
+                </a:solidFill>
+                <a:latin typeface="+mn-lt"/>
+                <a:ea typeface="+mn-ea"/>
+                <a:cs typeface="+mn-cs"/>
+              </a:defRPr>
+            </a:lvl5pPr>
+            <a:lvl6pPr marL="2514600" indent="-228600" algn="l" defTabSz="914400" rtl="0" eaLnBrk="1" latinLnBrk="0" hangingPunct="1">
+              <a:lnSpc>
+                <a:spcPct val="90000"/>
+              </a:lnSpc>
+              <a:spcBef>
+                <a:spcPts val="500"/>
+              </a:spcBef>
+              <a:buFont typeface="Arial" panose="020B0604020202020204" pitchFamily="34" charset="0"/>
+              <a:buChar char="•"/>
+              <a:defRPr sz="1800" kern="1200">
+                <a:solidFill>
+                  <a:schemeClr val="tx1"/>
+                </a:solidFill>
+                <a:latin typeface="+mn-lt"/>
+                <a:ea typeface="+mn-ea"/>
+                <a:cs typeface="+mn-cs"/>
+              </a:defRPr>
+            </a:lvl6pPr>
+            <a:lvl7pPr marL="2971800" indent="-228600" algn="l" defTabSz="914400" rtl="0" eaLnBrk="1" latinLnBrk="0" hangingPunct="1">
+              <a:lnSpc>
+                <a:spcPct val="90000"/>
+              </a:lnSpc>
+              <a:spcBef>
+                <a:spcPts val="500"/>
+              </a:spcBef>
+              <a:buFont typeface="Arial" panose="020B0604020202020204" pitchFamily="34" charset="0"/>
+              <a:buChar char="•"/>
+              <a:defRPr sz="1800" kern="1200">
+                <a:solidFill>
+                  <a:schemeClr val="tx1"/>
+                </a:solidFill>
+                <a:latin typeface="+mn-lt"/>
+                <a:ea typeface="+mn-ea"/>
+                <a:cs typeface="+mn-cs"/>
+              </a:defRPr>
+            </a:lvl7pPr>
+            <a:lvl8pPr marL="3429000" indent="-228600" algn="l" defTabSz="914400" rtl="0" eaLnBrk="1" latinLnBrk="0" hangingPunct="1">
+              <a:lnSpc>
+                <a:spcPct val="90000"/>
+              </a:lnSpc>
+              <a:spcBef>
+                <a:spcPts val="500"/>
+              </a:spcBef>
+              <a:buFont typeface="Arial" panose="020B0604020202020204" pitchFamily="34" charset="0"/>
+              <a:buChar char="•"/>
+              <a:defRPr sz="1800" kern="1200">
+                <a:solidFill>
+                  <a:schemeClr val="tx1"/>
+                </a:solidFill>
+                <a:latin typeface="+mn-lt"/>
+                <a:ea typeface="+mn-ea"/>
+                <a:cs typeface="+mn-cs"/>
+              </a:defRPr>
+            </a:lvl8pPr>
+            <a:lvl9pPr marL="3886200" indent="-228600" algn="l" defTabSz="914400" rtl="0" eaLnBrk="1" latinLnBrk="0" hangingPunct="1">
+              <a:lnSpc>
+                <a:spcPct val="90000"/>
+              </a:lnSpc>
+              <a:spcBef>
+                <a:spcPts val="500"/>
+              </a:spcBef>
+              <a:buFont typeface="Arial" panose="020B0604020202020204" pitchFamily="34" charset="0"/>
+              <a:buChar char="•"/>
+              <a:defRPr sz="1800" kern="1200">
+                <a:solidFill>
+                  <a:schemeClr val="tx1"/>
+                </a:solidFill>
+                <a:latin typeface="+mn-lt"/>
+                <a:ea typeface="+mn-ea"/>
+                <a:cs typeface="+mn-cs"/>
+              </a:defRPr>
+            </a:lvl9pPr>
+          </a:lstStyle>
+          <a:p>
+            <a:r>
+              <a:rPr lang="en-US" sz="2400" dirty="0">
+                <a:solidFill>
+                  <a:srgbClr val="333333"/>
+                </a:solidFill>
+                <a:latin typeface="inter-regular"/>
+              </a:rPr>
+              <a:t>In this</a:t>
+            </a:r>
+            <a:r>
+              <a:rPr lang="en-US" sz="2400" b="1" i="0" dirty="0">
+                <a:solidFill>
+                  <a:srgbClr val="333333"/>
+                </a:solidFill>
+                <a:effectLst/>
+                <a:latin typeface="inter-bold"/>
+              </a:rPr>
+              <a:t> </a:t>
+            </a:r>
+            <a:r>
+              <a:rPr lang="en-US" sz="2200" b="1" i="0" dirty="0">
+                <a:solidFill>
+                  <a:srgbClr val="333333"/>
+                </a:solidFill>
+                <a:effectLst/>
+                <a:latin typeface="inter-regular"/>
+              </a:rPr>
+              <a:t>"to restore the state of an object to its previous state". </a:t>
+            </a:r>
+            <a:r>
+              <a:rPr lang="en-US" sz="2200" b="0" i="0" dirty="0">
+                <a:solidFill>
+                  <a:srgbClr val="333333"/>
+                </a:solidFill>
+                <a:effectLst/>
+                <a:latin typeface="inter-regular"/>
+              </a:rPr>
+              <a:t>But it must do this without violating Encapsulation. Such case is useful in case of error or failure.</a:t>
+            </a:r>
+            <a:endParaRPr lang="en-US" sz="2200" b="1" i="0" dirty="0">
+              <a:solidFill>
+                <a:schemeClr val="tx1">
+                  <a:lumMod val="95000"/>
+                  <a:lumOff val="5000"/>
+                </a:schemeClr>
+              </a:solidFill>
+              <a:effectLst/>
+              <a:latin typeface="inter-regular"/>
+            </a:endParaRPr>
+          </a:p>
+          <a:p>
+            <a:pPr marL="0" indent="0">
+              <a:buNone/>
+            </a:pPr>
+            <a:r>
+              <a:rPr lang="en-US" sz="2200" b="1" u="sng" dirty="0">
+                <a:solidFill>
+                  <a:srgbClr val="333333"/>
+                </a:solidFill>
+                <a:latin typeface="inter-regular"/>
+              </a:rPr>
+              <a:t>Advantages</a:t>
+            </a:r>
+            <a:r>
+              <a:rPr lang="en-US" sz="2200" b="1" dirty="0">
+                <a:solidFill>
+                  <a:srgbClr val="333333"/>
+                </a:solidFill>
+                <a:latin typeface="inter-regular"/>
+              </a:rPr>
+              <a:t>:-</a:t>
+            </a:r>
+          </a:p>
+          <a:p>
+            <a:pPr algn="just">
+              <a:buFont typeface="Arial" panose="020B0604020202020204" pitchFamily="34" charset="0"/>
+              <a:buChar char="•"/>
+            </a:pPr>
+            <a:r>
+              <a:rPr lang="en-US" sz="2200" b="0" i="0" dirty="0">
+                <a:solidFill>
+                  <a:srgbClr val="000000"/>
+                </a:solidFill>
+                <a:effectLst/>
+                <a:latin typeface="inter-regular"/>
+              </a:rPr>
+              <a:t>It preserves encapsulation boundaries.</a:t>
+            </a:r>
+          </a:p>
+          <a:p>
+            <a:pPr algn="just">
+              <a:buFont typeface="Arial" panose="020B0604020202020204" pitchFamily="34" charset="0"/>
+              <a:buChar char="•"/>
+            </a:pPr>
+            <a:r>
+              <a:rPr lang="en-US" sz="2200" b="0" i="0" dirty="0">
+                <a:solidFill>
+                  <a:srgbClr val="000000"/>
+                </a:solidFill>
+                <a:effectLst/>
+                <a:latin typeface="inter-regular"/>
+              </a:rPr>
+              <a:t>It simplifies the originator.</a:t>
+            </a:r>
+          </a:p>
+          <a:p>
+            <a:pPr marL="0" indent="0">
+              <a:buNone/>
+            </a:pPr>
+            <a:br>
+              <a:rPr lang="en-US" sz="1600" dirty="0"/>
+            </a:br>
+            <a:r>
+              <a:rPr lang="en-US" sz="2200" b="1" u="sng" dirty="0">
+                <a:solidFill>
+                  <a:srgbClr val="000000"/>
+                </a:solidFill>
+                <a:latin typeface="inter-regular"/>
+              </a:rPr>
+              <a:t>Usage</a:t>
+            </a:r>
+            <a:r>
+              <a:rPr lang="en-US" sz="2200" b="1" dirty="0">
+                <a:solidFill>
+                  <a:srgbClr val="000000"/>
+                </a:solidFill>
+                <a:latin typeface="inter-regular"/>
+              </a:rPr>
+              <a:t>:-</a:t>
+            </a:r>
+          </a:p>
+          <a:p>
+            <a:pPr algn="just">
+              <a:buFont typeface="Arial" panose="020B0604020202020204" pitchFamily="34" charset="0"/>
+              <a:buChar char="•"/>
+            </a:pPr>
+            <a:r>
+              <a:rPr lang="en-US" sz="2200" b="0" i="0" dirty="0">
+                <a:solidFill>
+                  <a:srgbClr val="000000"/>
+                </a:solidFill>
+                <a:effectLst/>
+                <a:latin typeface="inter-regular"/>
+              </a:rPr>
+              <a:t>It is used in Undo and Redo operations in most software.</a:t>
+            </a:r>
+          </a:p>
+          <a:p>
+            <a:pPr algn="just">
+              <a:buFont typeface="Arial" panose="020B0604020202020204" pitchFamily="34" charset="0"/>
+              <a:buChar char="•"/>
+            </a:pPr>
+            <a:r>
+              <a:rPr lang="en-US" sz="2200" b="0" i="0" dirty="0">
+                <a:solidFill>
+                  <a:srgbClr val="000000"/>
+                </a:solidFill>
+                <a:effectLst/>
+                <a:latin typeface="inter-regular"/>
+              </a:rPr>
+              <a:t>It is also used in database transactions.</a:t>
+            </a:r>
+          </a:p>
+          <a:p>
+            <a:pPr marL="0" indent="0" algn="just">
+              <a:buNone/>
+            </a:pPr>
+            <a:endParaRPr lang="en-US" sz="1900" b="0" i="0" dirty="0">
+              <a:solidFill>
+                <a:srgbClr val="000000"/>
+              </a:solidFill>
+              <a:effectLst/>
+              <a:latin typeface="inter-regular"/>
+            </a:endParaRPr>
+          </a:p>
+          <a:p>
+            <a:pPr marL="0" indent="0" algn="just">
+              <a:buFont typeface="Arial" panose="020B0604020202020204" pitchFamily="34" charset="0"/>
+              <a:buNone/>
+            </a:pPr>
+            <a:r>
+              <a:rPr lang="en-US" sz="2200" b="1" u="sng" dirty="0">
+                <a:solidFill>
+                  <a:schemeClr val="tx1">
+                    <a:lumMod val="95000"/>
+                    <a:lumOff val="5000"/>
+                  </a:schemeClr>
+                </a:solidFill>
+                <a:latin typeface="Google Sans"/>
+              </a:rPr>
+              <a:t>Real-Time Example</a:t>
+            </a:r>
+            <a:r>
+              <a:rPr lang="en-US" sz="2200" dirty="0">
+                <a:solidFill>
+                  <a:schemeClr val="tx1">
+                    <a:lumMod val="95000"/>
+                    <a:lumOff val="5000"/>
+                  </a:schemeClr>
+                </a:solidFill>
+                <a:latin typeface="Google Sans"/>
+              </a:rPr>
+              <a:t>:-</a:t>
+            </a:r>
+          </a:p>
+          <a:p>
+            <a:r>
+              <a:rPr lang="en-US" sz="2000" b="0" i="0" dirty="0">
+                <a:solidFill>
+                  <a:schemeClr val="tx1">
+                    <a:lumMod val="95000"/>
+                    <a:lumOff val="5000"/>
+                  </a:schemeClr>
+                </a:solidFill>
+                <a:effectLst/>
+              </a:rPr>
+              <a:t>Text editors like Microsoft Word or Notepad use the Memento pattern to implement undo and redo functionality. Each time a user makes a change, a memento (snapshot) of the document's state is created and stored in a history. Users can then undo or redo their actions by restoring the document to a previous state.</a:t>
+            </a:r>
+            <a:endParaRPr lang="en-IN" sz="2000" dirty="0">
+              <a:solidFill>
+                <a:schemeClr val="tx1">
+                  <a:lumMod val="95000"/>
+                  <a:lumOff val="5000"/>
+                </a:schemeClr>
+              </a:solidFill>
+            </a:endParaRPr>
+          </a:p>
+        </p:txBody>
+      </p:sp>
+    </p:spTree>
+    <p:extLst>
+      <p:ext uri="{BB962C8B-B14F-4D97-AF65-F5344CB8AC3E}">
+        <p14:creationId xmlns:p14="http://schemas.microsoft.com/office/powerpoint/2010/main" val="4216032966"/>
       </p:ext>
     </p:extLst>
   </p:cSld>

</xml_diff>

<commit_message>
Committed Iterator Design Pattern
</commit_message>
<xml_diff>
--- a/DesignPatterns.pptx
+++ b/DesignPatterns.pptx
@@ -28,6 +28,8 @@
     <p:sldId id="277" r:id="rId22"/>
     <p:sldId id="278" r:id="rId23"/>
     <p:sldId id="279" r:id="rId24"/>
+    <p:sldId id="280" r:id="rId25"/>
+    <p:sldId id="281" r:id="rId26"/>
   </p:sldIdLst>
   <p:sldSz cx="12192000" cy="6858000"/>
   <p:notesSz cx="6858000" cy="9144000"/>
@@ -137,7 +139,7 @@
 <file path=ppt/revisionInfo.xml><?xml version="1.0" encoding="utf-8"?>
 <p1510:revInfo xmlns:a="http://schemas.openxmlformats.org/drawingml/2006/main" xmlns:r="http://schemas.openxmlformats.org/officeDocument/2006/relationships" xmlns:p1510="http://schemas.microsoft.com/office/powerpoint/2015/10/main">
   <p1510:revLst>
-    <p1510:client id="{2B8E2204-9F68-4922-875F-CECA66539EED}" v="20" dt="2023-09-14T08:38:31.760"/>
+    <p1510:client id="{2B8E2204-9F68-4922-875F-CECA66539EED}" v="22" dt="2023-09-15T13:36:24.935"/>
   </p1510:revLst>
 </p1510:revInfo>
 </file>
@@ -466,7 +468,7 @@
   <pc:docChgLst>
     <pc:chgData name="Manaswini Ray" userId="451f23f8-43b4-4daa-9511-0c9fb98bad1c" providerId="ADAL" clId="{2B8E2204-9F68-4922-875F-CECA66539EED}"/>
     <pc:docChg chg="undo custSel addSld delSld modSld sldOrd">
-      <pc:chgData name="Manaswini Ray" userId="451f23f8-43b4-4daa-9511-0c9fb98bad1c" providerId="ADAL" clId="{2B8E2204-9F68-4922-875F-CECA66539EED}" dt="2023-09-14T08:43:47.675" v="639" actId="20577"/>
+      <pc:chgData name="Manaswini Ray" userId="451f23f8-43b4-4daa-9511-0c9fb98bad1c" providerId="ADAL" clId="{2B8E2204-9F68-4922-875F-CECA66539EED}" dt="2023-09-15T13:37:27.521" v="712" actId="20577"/>
       <pc:docMkLst>
         <pc:docMk/>
       </pc:docMkLst>
@@ -776,6 +778,52 @@
           </ac:spMkLst>
         </pc:spChg>
       </pc:sldChg>
+      <pc:sldChg chg="addSp modSp new mod">
+        <pc:chgData name="Manaswini Ray" userId="451f23f8-43b4-4daa-9511-0c9fb98bad1c" providerId="ADAL" clId="{2B8E2204-9F68-4922-875F-CECA66539EED}" dt="2023-09-15T13:36:01.917" v="679" actId="20577"/>
+        <pc:sldMkLst>
+          <pc:docMk/>
+          <pc:sldMk cId="636266154" sldId="280"/>
+        </pc:sldMkLst>
+        <pc:spChg chg="add mod">
+          <ac:chgData name="Manaswini Ray" userId="451f23f8-43b4-4daa-9511-0c9fb98bad1c" providerId="ADAL" clId="{2B8E2204-9F68-4922-875F-CECA66539EED}" dt="2023-09-15T13:34:37.270" v="651" actId="20577"/>
+          <ac:spMkLst>
+            <pc:docMk/>
+            <pc:sldMk cId="636266154" sldId="280"/>
+            <ac:spMk id="2" creationId="{3224A6B8-3B1A-9A68-DA17-AF574982C01F}"/>
+          </ac:spMkLst>
+        </pc:spChg>
+        <pc:spChg chg="add mod">
+          <ac:chgData name="Manaswini Ray" userId="451f23f8-43b4-4daa-9511-0c9fb98bad1c" providerId="ADAL" clId="{2B8E2204-9F68-4922-875F-CECA66539EED}" dt="2023-09-15T13:36:01.917" v="679" actId="20577"/>
+          <ac:spMkLst>
+            <pc:docMk/>
+            <pc:sldMk cId="636266154" sldId="280"/>
+            <ac:spMk id="3" creationId="{62EF7CD0-F099-681E-2B99-8A048C77B4B8}"/>
+          </ac:spMkLst>
+        </pc:spChg>
+      </pc:sldChg>
+      <pc:sldChg chg="addSp modSp new mod">
+        <pc:chgData name="Manaswini Ray" userId="451f23f8-43b4-4daa-9511-0c9fb98bad1c" providerId="ADAL" clId="{2B8E2204-9F68-4922-875F-CECA66539EED}" dt="2023-09-15T13:37:27.521" v="712" actId="20577"/>
+        <pc:sldMkLst>
+          <pc:docMk/>
+          <pc:sldMk cId="3983001647" sldId="281"/>
+        </pc:sldMkLst>
+        <pc:spChg chg="add mod">
+          <ac:chgData name="Manaswini Ray" userId="451f23f8-43b4-4daa-9511-0c9fb98bad1c" providerId="ADAL" clId="{2B8E2204-9F68-4922-875F-CECA66539EED}" dt="2023-09-15T13:36:29.501" v="689" actId="20577"/>
+          <ac:spMkLst>
+            <pc:docMk/>
+            <pc:sldMk cId="3983001647" sldId="281"/>
+            <ac:spMk id="2" creationId="{AC588AF8-BF73-1540-8A00-83CEA52FDC84}"/>
+          </ac:spMkLst>
+        </pc:spChg>
+        <pc:spChg chg="add mod">
+          <ac:chgData name="Manaswini Ray" userId="451f23f8-43b4-4daa-9511-0c9fb98bad1c" providerId="ADAL" clId="{2B8E2204-9F68-4922-875F-CECA66539EED}" dt="2023-09-15T13:37:27.521" v="712" actId="20577"/>
+          <ac:spMkLst>
+            <pc:docMk/>
+            <pc:sldMk cId="3983001647" sldId="281"/>
+            <ac:spMk id="3" creationId="{0EBC096C-D7C5-A89A-E836-FDC26CD205A1}"/>
+          </ac:spMkLst>
+        </pc:spChg>
+      </pc:sldChg>
     </pc:docChg>
   </pc:docChgLst>
 </pc:chgInfo>
@@ -930,7 +978,7 @@
           <a:p>
             <a:fld id="{A1AA28CD-13E1-4DEA-B553-BCBE77DAC64A}" type="datetimeFigureOut">
               <a:rPr lang="en-IN" smtClean="0"/>
-              <a:t>14-09-2023</a:t>
+              <a:t>15-09-2023</a:t>
             </a:fld>
             <a:endParaRPr lang="en-IN"/>
           </a:p>
@@ -1130,7 +1178,7 @@
           <a:p>
             <a:fld id="{A1AA28CD-13E1-4DEA-B553-BCBE77DAC64A}" type="datetimeFigureOut">
               <a:rPr lang="en-IN" smtClean="0"/>
-              <a:t>14-09-2023</a:t>
+              <a:t>15-09-2023</a:t>
             </a:fld>
             <a:endParaRPr lang="en-IN"/>
           </a:p>
@@ -1340,7 +1388,7 @@
           <a:p>
             <a:fld id="{A1AA28CD-13E1-4DEA-B553-BCBE77DAC64A}" type="datetimeFigureOut">
               <a:rPr lang="en-IN" smtClean="0"/>
-              <a:t>14-09-2023</a:t>
+              <a:t>15-09-2023</a:t>
             </a:fld>
             <a:endParaRPr lang="en-IN"/>
           </a:p>
@@ -1540,7 +1588,7 @@
           <a:p>
             <a:fld id="{A1AA28CD-13E1-4DEA-B553-BCBE77DAC64A}" type="datetimeFigureOut">
               <a:rPr lang="en-IN" smtClean="0"/>
-              <a:t>14-09-2023</a:t>
+              <a:t>15-09-2023</a:t>
             </a:fld>
             <a:endParaRPr lang="en-IN"/>
           </a:p>
@@ -1816,7 +1864,7 @@
           <a:p>
             <a:fld id="{A1AA28CD-13E1-4DEA-B553-BCBE77DAC64A}" type="datetimeFigureOut">
               <a:rPr lang="en-IN" smtClean="0"/>
-              <a:t>14-09-2023</a:t>
+              <a:t>15-09-2023</a:t>
             </a:fld>
             <a:endParaRPr lang="en-IN"/>
           </a:p>
@@ -2084,7 +2132,7 @@
           <a:p>
             <a:fld id="{A1AA28CD-13E1-4DEA-B553-BCBE77DAC64A}" type="datetimeFigureOut">
               <a:rPr lang="en-IN" smtClean="0"/>
-              <a:t>14-09-2023</a:t>
+              <a:t>15-09-2023</a:t>
             </a:fld>
             <a:endParaRPr lang="en-IN"/>
           </a:p>
@@ -2499,7 +2547,7 @@
           <a:p>
             <a:fld id="{A1AA28CD-13E1-4DEA-B553-BCBE77DAC64A}" type="datetimeFigureOut">
               <a:rPr lang="en-IN" smtClean="0"/>
-              <a:t>14-09-2023</a:t>
+              <a:t>15-09-2023</a:t>
             </a:fld>
             <a:endParaRPr lang="en-IN"/>
           </a:p>
@@ -2641,7 +2689,7 @@
           <a:p>
             <a:fld id="{A1AA28CD-13E1-4DEA-B553-BCBE77DAC64A}" type="datetimeFigureOut">
               <a:rPr lang="en-IN" smtClean="0"/>
-              <a:t>14-09-2023</a:t>
+              <a:t>15-09-2023</a:t>
             </a:fld>
             <a:endParaRPr lang="en-IN"/>
           </a:p>
@@ -2754,7 +2802,7 @@
           <a:p>
             <a:fld id="{A1AA28CD-13E1-4DEA-B553-BCBE77DAC64A}" type="datetimeFigureOut">
               <a:rPr lang="en-IN" smtClean="0"/>
-              <a:t>14-09-2023</a:t>
+              <a:t>15-09-2023</a:t>
             </a:fld>
             <a:endParaRPr lang="en-IN"/>
           </a:p>
@@ -3067,7 +3115,7 @@
           <a:p>
             <a:fld id="{A1AA28CD-13E1-4DEA-B553-BCBE77DAC64A}" type="datetimeFigureOut">
               <a:rPr lang="en-IN" smtClean="0"/>
-              <a:t>14-09-2023</a:t>
+              <a:t>15-09-2023</a:t>
             </a:fld>
             <a:endParaRPr lang="en-IN"/>
           </a:p>
@@ -3356,7 +3404,7 @@
           <a:p>
             <a:fld id="{A1AA28CD-13E1-4DEA-B553-BCBE77DAC64A}" type="datetimeFigureOut">
               <a:rPr lang="en-IN" smtClean="0"/>
-              <a:t>14-09-2023</a:t>
+              <a:t>15-09-2023</a:t>
             </a:fld>
             <a:endParaRPr lang="en-IN"/>
           </a:p>
@@ -3599,7 +3647,7 @@
           <a:p>
             <a:fld id="{A1AA28CD-13E1-4DEA-B553-BCBE77DAC64A}" type="datetimeFigureOut">
               <a:rPr lang="en-IN" smtClean="0"/>
-              <a:t>14-09-2023</a:t>
+              <a:t>15-09-2023</a:t>
             </a:fld>
             <a:endParaRPr lang="en-IN"/>
           </a:p>
@@ -10923,6 +10971,1000 @@
     <p:extLst>
       <p:ext uri="{BB962C8B-B14F-4D97-AF65-F5344CB8AC3E}">
         <p14:creationId xmlns:p14="http://schemas.microsoft.com/office/powerpoint/2010/main" val="4216032966"/>
+      </p:ext>
+    </p:extLst>
+  </p:cSld>
+  <p:clrMapOvr>
+    <a:masterClrMapping/>
+  </p:clrMapOvr>
+</p:sld>
+</file>
+
+<file path=ppt/slides/slide24.xml><?xml version="1.0" encoding="utf-8"?>
+<p:sld xmlns:a="http://schemas.openxmlformats.org/drawingml/2006/main" xmlns:r="http://schemas.openxmlformats.org/officeDocument/2006/relationships" xmlns:p="http://schemas.openxmlformats.org/presentationml/2006/main">
+  <p:cSld>
+    <p:spTree>
+      <p:nvGrpSpPr>
+        <p:cNvPr id="1" name=""/>
+        <p:cNvGrpSpPr/>
+        <p:nvPr/>
+      </p:nvGrpSpPr>
+      <p:grpSpPr>
+        <a:xfrm>
+          <a:off x="0" y="0"/>
+          <a:ext cx="0" cy="0"/>
+          <a:chOff x="0" y="0"/>
+          <a:chExt cx="0" cy="0"/>
+        </a:xfrm>
+      </p:grpSpPr>
+      <p:sp>
+        <p:nvSpPr>
+          <p:cNvPr id="2" name="Title 1">
+            <a:extLst>
+              <a:ext uri="{FF2B5EF4-FFF2-40B4-BE49-F238E27FC236}">
+                <a16:creationId xmlns:a16="http://schemas.microsoft.com/office/drawing/2014/main" id="{3224A6B8-3B1A-9A68-DA17-AF574982C01F}"/>
+              </a:ext>
+            </a:extLst>
+          </p:cNvPr>
+          <p:cNvSpPr txBox="1">
+            <a:spLocks/>
+          </p:cNvSpPr>
+          <p:nvPr/>
+        </p:nvSpPr>
+        <p:spPr>
+          <a:xfrm>
+            <a:off x="455543" y="268358"/>
+            <a:ext cx="10515600" cy="1325563"/>
+          </a:xfrm>
+          <a:prstGeom prst="rect">
+            <a:avLst/>
+          </a:prstGeom>
+        </p:spPr>
+        <p:txBody>
+          <a:bodyPr/>
+          <a:lstStyle>
+            <a:lvl1pPr algn="l" defTabSz="914400" rtl="0" eaLnBrk="1" latinLnBrk="0" hangingPunct="1">
+              <a:lnSpc>
+                <a:spcPct val="90000"/>
+              </a:lnSpc>
+              <a:spcBef>
+                <a:spcPct val="0"/>
+              </a:spcBef>
+              <a:buNone/>
+              <a:defRPr sz="4400" kern="1200">
+                <a:solidFill>
+                  <a:schemeClr val="tx1"/>
+                </a:solidFill>
+                <a:latin typeface="+mj-lt"/>
+                <a:ea typeface="+mj-ea"/>
+                <a:cs typeface="+mj-cs"/>
+              </a:defRPr>
+            </a:lvl1pPr>
+          </a:lstStyle>
+          <a:p>
+            <a:r>
+              <a:rPr lang="en-US" b="1" u="sng" dirty="0"/>
+              <a:t>Mediator Design Pattern</a:t>
+            </a:r>
+            <a:endParaRPr lang="en-IN" b="1" u="sng" dirty="0"/>
+          </a:p>
+        </p:txBody>
+      </p:sp>
+      <p:sp>
+        <p:nvSpPr>
+          <p:cNvPr id="3" name="Content Placeholder 2">
+            <a:extLst>
+              <a:ext uri="{FF2B5EF4-FFF2-40B4-BE49-F238E27FC236}">
+                <a16:creationId xmlns:a16="http://schemas.microsoft.com/office/drawing/2014/main" id="{62EF7CD0-F099-681E-2B99-8A048C77B4B8}"/>
+              </a:ext>
+            </a:extLst>
+          </p:cNvPr>
+          <p:cNvSpPr txBox="1">
+            <a:spLocks/>
+          </p:cNvSpPr>
+          <p:nvPr/>
+        </p:nvSpPr>
+        <p:spPr>
+          <a:xfrm>
+            <a:off x="455543" y="1073427"/>
+            <a:ext cx="11280913" cy="5367128"/>
+          </a:xfrm>
+          <a:prstGeom prst="rect">
+            <a:avLst/>
+          </a:prstGeom>
+        </p:spPr>
+        <p:txBody>
+          <a:bodyPr>
+            <a:normAutofit/>
+          </a:bodyPr>
+          <a:lstStyle>
+            <a:lvl1pPr marL="228600" indent="-228600" algn="l" defTabSz="914400" rtl="0" eaLnBrk="1" latinLnBrk="0" hangingPunct="1">
+              <a:lnSpc>
+                <a:spcPct val="90000"/>
+              </a:lnSpc>
+              <a:spcBef>
+                <a:spcPts val="1000"/>
+              </a:spcBef>
+              <a:buFont typeface="Arial" panose="020B0604020202020204" pitchFamily="34" charset="0"/>
+              <a:buChar char="•"/>
+              <a:defRPr sz="2800" kern="1200">
+                <a:solidFill>
+                  <a:schemeClr val="tx1"/>
+                </a:solidFill>
+                <a:latin typeface="+mn-lt"/>
+                <a:ea typeface="+mn-ea"/>
+                <a:cs typeface="+mn-cs"/>
+              </a:defRPr>
+            </a:lvl1pPr>
+            <a:lvl2pPr marL="685800" indent="-228600" algn="l" defTabSz="914400" rtl="0" eaLnBrk="1" latinLnBrk="0" hangingPunct="1">
+              <a:lnSpc>
+                <a:spcPct val="90000"/>
+              </a:lnSpc>
+              <a:spcBef>
+                <a:spcPts val="500"/>
+              </a:spcBef>
+              <a:buFont typeface="Arial" panose="020B0604020202020204" pitchFamily="34" charset="0"/>
+              <a:buChar char="•"/>
+              <a:defRPr sz="2400" kern="1200">
+                <a:solidFill>
+                  <a:schemeClr val="tx1"/>
+                </a:solidFill>
+                <a:latin typeface="+mn-lt"/>
+                <a:ea typeface="+mn-ea"/>
+                <a:cs typeface="+mn-cs"/>
+              </a:defRPr>
+            </a:lvl2pPr>
+            <a:lvl3pPr marL="1143000" indent="-228600" algn="l" defTabSz="914400" rtl="0" eaLnBrk="1" latinLnBrk="0" hangingPunct="1">
+              <a:lnSpc>
+                <a:spcPct val="90000"/>
+              </a:lnSpc>
+              <a:spcBef>
+                <a:spcPts val="500"/>
+              </a:spcBef>
+              <a:buFont typeface="Arial" panose="020B0604020202020204" pitchFamily="34" charset="0"/>
+              <a:buChar char="•"/>
+              <a:defRPr sz="2000" kern="1200">
+                <a:solidFill>
+                  <a:schemeClr val="tx1"/>
+                </a:solidFill>
+                <a:latin typeface="+mn-lt"/>
+                <a:ea typeface="+mn-ea"/>
+                <a:cs typeface="+mn-cs"/>
+              </a:defRPr>
+            </a:lvl3pPr>
+            <a:lvl4pPr marL="1600200" indent="-228600" algn="l" defTabSz="914400" rtl="0" eaLnBrk="1" latinLnBrk="0" hangingPunct="1">
+              <a:lnSpc>
+                <a:spcPct val="90000"/>
+              </a:lnSpc>
+              <a:spcBef>
+                <a:spcPts val="500"/>
+              </a:spcBef>
+              <a:buFont typeface="Arial" panose="020B0604020202020204" pitchFamily="34" charset="0"/>
+              <a:buChar char="•"/>
+              <a:defRPr sz="1800" kern="1200">
+                <a:solidFill>
+                  <a:schemeClr val="tx1"/>
+                </a:solidFill>
+                <a:latin typeface="+mn-lt"/>
+                <a:ea typeface="+mn-ea"/>
+                <a:cs typeface="+mn-cs"/>
+              </a:defRPr>
+            </a:lvl4pPr>
+            <a:lvl5pPr marL="2057400" indent="-228600" algn="l" defTabSz="914400" rtl="0" eaLnBrk="1" latinLnBrk="0" hangingPunct="1">
+              <a:lnSpc>
+                <a:spcPct val="90000"/>
+              </a:lnSpc>
+              <a:spcBef>
+                <a:spcPts val="500"/>
+              </a:spcBef>
+              <a:buFont typeface="Arial" panose="020B0604020202020204" pitchFamily="34" charset="0"/>
+              <a:buChar char="•"/>
+              <a:defRPr sz="1800" kern="1200">
+                <a:solidFill>
+                  <a:schemeClr val="tx1"/>
+                </a:solidFill>
+                <a:latin typeface="+mn-lt"/>
+                <a:ea typeface="+mn-ea"/>
+                <a:cs typeface="+mn-cs"/>
+              </a:defRPr>
+            </a:lvl5pPr>
+            <a:lvl6pPr marL="2514600" indent="-228600" algn="l" defTabSz="914400" rtl="0" eaLnBrk="1" latinLnBrk="0" hangingPunct="1">
+              <a:lnSpc>
+                <a:spcPct val="90000"/>
+              </a:lnSpc>
+              <a:spcBef>
+                <a:spcPts val="500"/>
+              </a:spcBef>
+              <a:buFont typeface="Arial" panose="020B0604020202020204" pitchFamily="34" charset="0"/>
+              <a:buChar char="•"/>
+              <a:defRPr sz="1800" kern="1200">
+                <a:solidFill>
+                  <a:schemeClr val="tx1"/>
+                </a:solidFill>
+                <a:latin typeface="+mn-lt"/>
+                <a:ea typeface="+mn-ea"/>
+                <a:cs typeface="+mn-cs"/>
+              </a:defRPr>
+            </a:lvl6pPr>
+            <a:lvl7pPr marL="2971800" indent="-228600" algn="l" defTabSz="914400" rtl="0" eaLnBrk="1" latinLnBrk="0" hangingPunct="1">
+              <a:lnSpc>
+                <a:spcPct val="90000"/>
+              </a:lnSpc>
+              <a:spcBef>
+                <a:spcPts val="500"/>
+              </a:spcBef>
+              <a:buFont typeface="Arial" panose="020B0604020202020204" pitchFamily="34" charset="0"/>
+              <a:buChar char="•"/>
+              <a:defRPr sz="1800" kern="1200">
+                <a:solidFill>
+                  <a:schemeClr val="tx1"/>
+                </a:solidFill>
+                <a:latin typeface="+mn-lt"/>
+                <a:ea typeface="+mn-ea"/>
+                <a:cs typeface="+mn-cs"/>
+              </a:defRPr>
+            </a:lvl7pPr>
+            <a:lvl8pPr marL="3429000" indent="-228600" algn="l" defTabSz="914400" rtl="0" eaLnBrk="1" latinLnBrk="0" hangingPunct="1">
+              <a:lnSpc>
+                <a:spcPct val="90000"/>
+              </a:lnSpc>
+              <a:spcBef>
+                <a:spcPts val="500"/>
+              </a:spcBef>
+              <a:buFont typeface="Arial" panose="020B0604020202020204" pitchFamily="34" charset="0"/>
+              <a:buChar char="•"/>
+              <a:defRPr sz="1800" kern="1200">
+                <a:solidFill>
+                  <a:schemeClr val="tx1"/>
+                </a:solidFill>
+                <a:latin typeface="+mn-lt"/>
+                <a:ea typeface="+mn-ea"/>
+                <a:cs typeface="+mn-cs"/>
+              </a:defRPr>
+            </a:lvl8pPr>
+            <a:lvl9pPr marL="3886200" indent="-228600" algn="l" defTabSz="914400" rtl="0" eaLnBrk="1" latinLnBrk="0" hangingPunct="1">
+              <a:lnSpc>
+                <a:spcPct val="90000"/>
+              </a:lnSpc>
+              <a:spcBef>
+                <a:spcPts val="500"/>
+              </a:spcBef>
+              <a:buFont typeface="Arial" panose="020B0604020202020204" pitchFamily="34" charset="0"/>
+              <a:buChar char="•"/>
+              <a:defRPr sz="1800" kern="1200">
+                <a:solidFill>
+                  <a:schemeClr val="tx1"/>
+                </a:solidFill>
+                <a:latin typeface="+mn-lt"/>
+                <a:ea typeface="+mn-ea"/>
+                <a:cs typeface="+mn-cs"/>
+              </a:defRPr>
+            </a:lvl9pPr>
+          </a:lstStyle>
+          <a:p>
+            <a:r>
+              <a:rPr lang="en-US" sz="2400" dirty="0">
+                <a:solidFill>
+                  <a:srgbClr val="333333"/>
+                </a:solidFill>
+                <a:latin typeface="inter-regular"/>
+              </a:rPr>
+              <a:t>In this</a:t>
+            </a:r>
+            <a:r>
+              <a:rPr lang="en-US" sz="2400" b="1" i="0" dirty="0">
+                <a:solidFill>
+                  <a:srgbClr val="333333"/>
+                </a:solidFill>
+                <a:effectLst/>
+                <a:latin typeface="inter-bold"/>
+              </a:rPr>
+              <a:t> </a:t>
+            </a:r>
+            <a:r>
+              <a:rPr lang="en-US" sz="2200" b="1" i="0" dirty="0">
+                <a:solidFill>
+                  <a:srgbClr val="333333"/>
+                </a:solidFill>
+                <a:effectLst/>
+                <a:latin typeface="inter-regular"/>
+              </a:rPr>
+              <a:t>"to define an object that encapsulates how a set of objects interact".</a:t>
+            </a:r>
+          </a:p>
+          <a:p>
+            <a:pPr marL="0" indent="0">
+              <a:buNone/>
+            </a:pPr>
+            <a:r>
+              <a:rPr lang="en-US" sz="2200" b="1" u="sng" dirty="0">
+                <a:solidFill>
+                  <a:srgbClr val="333333"/>
+                </a:solidFill>
+                <a:latin typeface="inter-regular"/>
+              </a:rPr>
+              <a:t>Advantages</a:t>
+            </a:r>
+            <a:r>
+              <a:rPr lang="en-US" sz="2200" b="1" dirty="0">
+                <a:solidFill>
+                  <a:srgbClr val="333333"/>
+                </a:solidFill>
+                <a:latin typeface="inter-regular"/>
+              </a:rPr>
+              <a:t>:-</a:t>
+            </a:r>
+          </a:p>
+          <a:p>
+            <a:pPr algn="just">
+              <a:buFont typeface="Arial" panose="020B0604020202020204" pitchFamily="34" charset="0"/>
+              <a:buChar char="•"/>
+            </a:pPr>
+            <a:r>
+              <a:rPr lang="en-US" sz="2000" b="0" i="0" dirty="0">
+                <a:solidFill>
+                  <a:srgbClr val="000000"/>
+                </a:solidFill>
+                <a:effectLst/>
+                <a:latin typeface="inter-regular"/>
+              </a:rPr>
+              <a:t>It decouples the number of classes.</a:t>
+            </a:r>
+          </a:p>
+          <a:p>
+            <a:pPr algn="just">
+              <a:buFont typeface="Arial" panose="020B0604020202020204" pitchFamily="34" charset="0"/>
+              <a:buChar char="•"/>
+            </a:pPr>
+            <a:r>
+              <a:rPr lang="en-US" sz="2000" b="0" i="0" dirty="0">
+                <a:solidFill>
+                  <a:srgbClr val="000000"/>
+                </a:solidFill>
+                <a:effectLst/>
+                <a:latin typeface="inter-regular"/>
+              </a:rPr>
+              <a:t>It simplifies object protocols.</a:t>
+            </a:r>
+          </a:p>
+          <a:p>
+            <a:pPr algn="just">
+              <a:buFont typeface="Arial" panose="020B0604020202020204" pitchFamily="34" charset="0"/>
+              <a:buChar char="•"/>
+            </a:pPr>
+            <a:r>
+              <a:rPr lang="en-US" sz="2000" b="0" i="0" dirty="0">
+                <a:solidFill>
+                  <a:srgbClr val="000000"/>
+                </a:solidFill>
+                <a:effectLst/>
+                <a:latin typeface="inter-regular"/>
+              </a:rPr>
+              <a:t>It centralizes the control.</a:t>
+            </a:r>
+          </a:p>
+          <a:p>
+            <a:pPr algn="just">
+              <a:buFont typeface="Arial" panose="020B0604020202020204" pitchFamily="34" charset="0"/>
+              <a:buChar char="•"/>
+            </a:pPr>
+            <a:r>
+              <a:rPr lang="en-US" sz="2000" b="0" i="0" dirty="0">
+                <a:solidFill>
+                  <a:srgbClr val="000000"/>
+                </a:solidFill>
+                <a:effectLst/>
+                <a:latin typeface="inter-regular"/>
+              </a:rPr>
+              <a:t>The individual components become simpler and much easier to deal with because they don't need to pass messages to one another.</a:t>
+            </a:r>
+          </a:p>
+          <a:p>
+            <a:pPr marL="0" indent="0">
+              <a:buNone/>
+            </a:pPr>
+            <a:r>
+              <a:rPr lang="en-US" sz="2200" b="1" u="sng" dirty="0">
+                <a:solidFill>
+                  <a:srgbClr val="000000"/>
+                </a:solidFill>
+                <a:latin typeface="inter-regular"/>
+              </a:rPr>
+              <a:t>Usage</a:t>
+            </a:r>
+            <a:r>
+              <a:rPr lang="en-US" sz="2200" b="1" dirty="0">
+                <a:solidFill>
+                  <a:srgbClr val="000000"/>
+                </a:solidFill>
+                <a:latin typeface="inter-regular"/>
+              </a:rPr>
+              <a:t>:-</a:t>
+            </a:r>
+          </a:p>
+          <a:p>
+            <a:pPr algn="just">
+              <a:buFont typeface="Arial" panose="020B0604020202020204" pitchFamily="34" charset="0"/>
+              <a:buChar char="•"/>
+            </a:pPr>
+            <a:r>
+              <a:rPr lang="en-US" sz="2200" b="0" i="0" dirty="0">
+                <a:solidFill>
+                  <a:srgbClr val="000000"/>
+                </a:solidFill>
+                <a:effectLst/>
+                <a:latin typeface="inter-regular"/>
+              </a:rPr>
+              <a:t>It is commonly used in message-based systems likewise chat applications.</a:t>
+            </a:r>
+          </a:p>
+          <a:p>
+            <a:pPr algn="just">
+              <a:buFont typeface="Arial" panose="020B0604020202020204" pitchFamily="34" charset="0"/>
+              <a:buChar char="•"/>
+            </a:pPr>
+            <a:r>
+              <a:rPr lang="en-US" sz="2200" b="0" i="0" dirty="0">
+                <a:solidFill>
+                  <a:srgbClr val="000000"/>
+                </a:solidFill>
+                <a:effectLst/>
+                <a:latin typeface="inter-regular"/>
+              </a:rPr>
+              <a:t>When the set of objects communicate in complex but in well-defined ways.</a:t>
+            </a:r>
+          </a:p>
+          <a:p>
+            <a:pPr marL="0" indent="0" algn="just">
+              <a:buNone/>
+            </a:pPr>
+            <a:endParaRPr lang="en-US" sz="1900" b="0" i="0" dirty="0">
+              <a:solidFill>
+                <a:srgbClr val="000000"/>
+              </a:solidFill>
+              <a:effectLst/>
+              <a:latin typeface="inter-regular"/>
+            </a:endParaRPr>
+          </a:p>
+          <a:p>
+            <a:pPr marL="0" indent="0" algn="just">
+              <a:buFont typeface="Arial" panose="020B0604020202020204" pitchFamily="34" charset="0"/>
+              <a:buNone/>
+            </a:pPr>
+            <a:r>
+              <a:rPr lang="en-US" sz="2200" b="1" u="sng" dirty="0">
+                <a:solidFill>
+                  <a:schemeClr val="tx1">
+                    <a:lumMod val="95000"/>
+                    <a:lumOff val="5000"/>
+                  </a:schemeClr>
+                </a:solidFill>
+                <a:latin typeface="Google Sans"/>
+              </a:rPr>
+              <a:t>Real-Time Example</a:t>
+            </a:r>
+            <a:r>
+              <a:rPr lang="en-US" sz="2200" dirty="0">
+                <a:solidFill>
+                  <a:schemeClr val="tx1">
+                    <a:lumMod val="95000"/>
+                    <a:lumOff val="5000"/>
+                  </a:schemeClr>
+                </a:solidFill>
+                <a:latin typeface="Google Sans"/>
+              </a:rPr>
+              <a:t>:-</a:t>
+            </a:r>
+          </a:p>
+          <a:p>
+            <a:r>
+              <a:rPr lang="en-US" sz="2000" b="0" i="0" dirty="0">
+                <a:solidFill>
+                  <a:schemeClr val="tx1">
+                    <a:lumMod val="95000"/>
+                    <a:lumOff val="5000"/>
+                  </a:schemeClr>
+                </a:solidFill>
+                <a:effectLst/>
+              </a:rPr>
+              <a:t>Event Manager.</a:t>
+            </a:r>
+            <a:endParaRPr lang="en-IN" sz="2000" dirty="0">
+              <a:solidFill>
+                <a:schemeClr val="tx1">
+                  <a:lumMod val="95000"/>
+                  <a:lumOff val="5000"/>
+                </a:schemeClr>
+              </a:solidFill>
+            </a:endParaRPr>
+          </a:p>
+        </p:txBody>
+      </p:sp>
+    </p:spTree>
+    <p:extLst>
+      <p:ext uri="{BB962C8B-B14F-4D97-AF65-F5344CB8AC3E}">
+        <p14:creationId xmlns:p14="http://schemas.microsoft.com/office/powerpoint/2010/main" val="636266154"/>
+      </p:ext>
+    </p:extLst>
+  </p:cSld>
+  <p:clrMapOvr>
+    <a:masterClrMapping/>
+  </p:clrMapOvr>
+</p:sld>
+</file>
+
+<file path=ppt/slides/slide25.xml><?xml version="1.0" encoding="utf-8"?>
+<p:sld xmlns:a="http://schemas.openxmlformats.org/drawingml/2006/main" xmlns:r="http://schemas.openxmlformats.org/officeDocument/2006/relationships" xmlns:p="http://schemas.openxmlformats.org/presentationml/2006/main">
+  <p:cSld>
+    <p:spTree>
+      <p:nvGrpSpPr>
+        <p:cNvPr id="1" name=""/>
+        <p:cNvGrpSpPr/>
+        <p:nvPr/>
+      </p:nvGrpSpPr>
+      <p:grpSpPr>
+        <a:xfrm>
+          <a:off x="0" y="0"/>
+          <a:ext cx="0" cy="0"/>
+          <a:chOff x="0" y="0"/>
+          <a:chExt cx="0" cy="0"/>
+        </a:xfrm>
+      </p:grpSpPr>
+      <p:sp>
+        <p:nvSpPr>
+          <p:cNvPr id="2" name="Title 1">
+            <a:extLst>
+              <a:ext uri="{FF2B5EF4-FFF2-40B4-BE49-F238E27FC236}">
+                <a16:creationId xmlns:a16="http://schemas.microsoft.com/office/drawing/2014/main" id="{AC588AF8-BF73-1540-8A00-83CEA52FDC84}"/>
+              </a:ext>
+            </a:extLst>
+          </p:cNvPr>
+          <p:cNvSpPr txBox="1">
+            <a:spLocks/>
+          </p:cNvSpPr>
+          <p:nvPr/>
+        </p:nvSpPr>
+        <p:spPr>
+          <a:xfrm>
+            <a:off x="455543" y="268358"/>
+            <a:ext cx="10515600" cy="1325563"/>
+          </a:xfrm>
+          <a:prstGeom prst="rect">
+            <a:avLst/>
+          </a:prstGeom>
+        </p:spPr>
+        <p:txBody>
+          <a:bodyPr/>
+          <a:lstStyle>
+            <a:lvl1pPr algn="l" defTabSz="914400" rtl="0" eaLnBrk="1" latinLnBrk="0" hangingPunct="1">
+              <a:lnSpc>
+                <a:spcPct val="90000"/>
+              </a:lnSpc>
+              <a:spcBef>
+                <a:spcPct val="0"/>
+              </a:spcBef>
+              <a:buNone/>
+              <a:defRPr sz="4400" kern="1200">
+                <a:solidFill>
+                  <a:schemeClr val="tx1"/>
+                </a:solidFill>
+                <a:latin typeface="+mj-lt"/>
+                <a:ea typeface="+mj-ea"/>
+                <a:cs typeface="+mj-cs"/>
+              </a:defRPr>
+            </a:lvl1pPr>
+          </a:lstStyle>
+          <a:p>
+            <a:r>
+              <a:rPr lang="en-US" b="1" u="sng" dirty="0"/>
+              <a:t>Iterator Design Pattern</a:t>
+            </a:r>
+            <a:endParaRPr lang="en-IN" b="1" u="sng" dirty="0"/>
+          </a:p>
+        </p:txBody>
+      </p:sp>
+      <p:sp>
+        <p:nvSpPr>
+          <p:cNvPr id="3" name="Content Placeholder 2">
+            <a:extLst>
+              <a:ext uri="{FF2B5EF4-FFF2-40B4-BE49-F238E27FC236}">
+                <a16:creationId xmlns:a16="http://schemas.microsoft.com/office/drawing/2014/main" id="{0EBC096C-D7C5-A89A-E836-FDC26CD205A1}"/>
+              </a:ext>
+            </a:extLst>
+          </p:cNvPr>
+          <p:cNvSpPr txBox="1">
+            <a:spLocks/>
+          </p:cNvSpPr>
+          <p:nvPr/>
+        </p:nvSpPr>
+        <p:spPr>
+          <a:xfrm>
+            <a:off x="455543" y="1073427"/>
+            <a:ext cx="11280913" cy="5367128"/>
+          </a:xfrm>
+          <a:prstGeom prst="rect">
+            <a:avLst/>
+          </a:prstGeom>
+        </p:spPr>
+        <p:txBody>
+          <a:bodyPr>
+            <a:normAutofit/>
+          </a:bodyPr>
+          <a:lstStyle>
+            <a:lvl1pPr marL="228600" indent="-228600" algn="l" defTabSz="914400" rtl="0" eaLnBrk="1" latinLnBrk="0" hangingPunct="1">
+              <a:lnSpc>
+                <a:spcPct val="90000"/>
+              </a:lnSpc>
+              <a:spcBef>
+                <a:spcPts val="1000"/>
+              </a:spcBef>
+              <a:buFont typeface="Arial" panose="020B0604020202020204" pitchFamily="34" charset="0"/>
+              <a:buChar char="•"/>
+              <a:defRPr sz="2800" kern="1200">
+                <a:solidFill>
+                  <a:schemeClr val="tx1"/>
+                </a:solidFill>
+                <a:latin typeface="+mn-lt"/>
+                <a:ea typeface="+mn-ea"/>
+                <a:cs typeface="+mn-cs"/>
+              </a:defRPr>
+            </a:lvl1pPr>
+            <a:lvl2pPr marL="685800" indent="-228600" algn="l" defTabSz="914400" rtl="0" eaLnBrk="1" latinLnBrk="0" hangingPunct="1">
+              <a:lnSpc>
+                <a:spcPct val="90000"/>
+              </a:lnSpc>
+              <a:spcBef>
+                <a:spcPts val="500"/>
+              </a:spcBef>
+              <a:buFont typeface="Arial" panose="020B0604020202020204" pitchFamily="34" charset="0"/>
+              <a:buChar char="•"/>
+              <a:defRPr sz="2400" kern="1200">
+                <a:solidFill>
+                  <a:schemeClr val="tx1"/>
+                </a:solidFill>
+                <a:latin typeface="+mn-lt"/>
+                <a:ea typeface="+mn-ea"/>
+                <a:cs typeface="+mn-cs"/>
+              </a:defRPr>
+            </a:lvl2pPr>
+            <a:lvl3pPr marL="1143000" indent="-228600" algn="l" defTabSz="914400" rtl="0" eaLnBrk="1" latinLnBrk="0" hangingPunct="1">
+              <a:lnSpc>
+                <a:spcPct val="90000"/>
+              </a:lnSpc>
+              <a:spcBef>
+                <a:spcPts val="500"/>
+              </a:spcBef>
+              <a:buFont typeface="Arial" panose="020B0604020202020204" pitchFamily="34" charset="0"/>
+              <a:buChar char="•"/>
+              <a:defRPr sz="2000" kern="1200">
+                <a:solidFill>
+                  <a:schemeClr val="tx1"/>
+                </a:solidFill>
+                <a:latin typeface="+mn-lt"/>
+                <a:ea typeface="+mn-ea"/>
+                <a:cs typeface="+mn-cs"/>
+              </a:defRPr>
+            </a:lvl3pPr>
+            <a:lvl4pPr marL="1600200" indent="-228600" algn="l" defTabSz="914400" rtl="0" eaLnBrk="1" latinLnBrk="0" hangingPunct="1">
+              <a:lnSpc>
+                <a:spcPct val="90000"/>
+              </a:lnSpc>
+              <a:spcBef>
+                <a:spcPts val="500"/>
+              </a:spcBef>
+              <a:buFont typeface="Arial" panose="020B0604020202020204" pitchFamily="34" charset="0"/>
+              <a:buChar char="•"/>
+              <a:defRPr sz="1800" kern="1200">
+                <a:solidFill>
+                  <a:schemeClr val="tx1"/>
+                </a:solidFill>
+                <a:latin typeface="+mn-lt"/>
+                <a:ea typeface="+mn-ea"/>
+                <a:cs typeface="+mn-cs"/>
+              </a:defRPr>
+            </a:lvl4pPr>
+            <a:lvl5pPr marL="2057400" indent="-228600" algn="l" defTabSz="914400" rtl="0" eaLnBrk="1" latinLnBrk="0" hangingPunct="1">
+              <a:lnSpc>
+                <a:spcPct val="90000"/>
+              </a:lnSpc>
+              <a:spcBef>
+                <a:spcPts val="500"/>
+              </a:spcBef>
+              <a:buFont typeface="Arial" panose="020B0604020202020204" pitchFamily="34" charset="0"/>
+              <a:buChar char="•"/>
+              <a:defRPr sz="1800" kern="1200">
+                <a:solidFill>
+                  <a:schemeClr val="tx1"/>
+                </a:solidFill>
+                <a:latin typeface="+mn-lt"/>
+                <a:ea typeface="+mn-ea"/>
+                <a:cs typeface="+mn-cs"/>
+              </a:defRPr>
+            </a:lvl5pPr>
+            <a:lvl6pPr marL="2514600" indent="-228600" algn="l" defTabSz="914400" rtl="0" eaLnBrk="1" latinLnBrk="0" hangingPunct="1">
+              <a:lnSpc>
+                <a:spcPct val="90000"/>
+              </a:lnSpc>
+              <a:spcBef>
+                <a:spcPts val="500"/>
+              </a:spcBef>
+              <a:buFont typeface="Arial" panose="020B0604020202020204" pitchFamily="34" charset="0"/>
+              <a:buChar char="•"/>
+              <a:defRPr sz="1800" kern="1200">
+                <a:solidFill>
+                  <a:schemeClr val="tx1"/>
+                </a:solidFill>
+                <a:latin typeface="+mn-lt"/>
+                <a:ea typeface="+mn-ea"/>
+                <a:cs typeface="+mn-cs"/>
+              </a:defRPr>
+            </a:lvl6pPr>
+            <a:lvl7pPr marL="2971800" indent="-228600" algn="l" defTabSz="914400" rtl="0" eaLnBrk="1" latinLnBrk="0" hangingPunct="1">
+              <a:lnSpc>
+                <a:spcPct val="90000"/>
+              </a:lnSpc>
+              <a:spcBef>
+                <a:spcPts val="500"/>
+              </a:spcBef>
+              <a:buFont typeface="Arial" panose="020B0604020202020204" pitchFamily="34" charset="0"/>
+              <a:buChar char="•"/>
+              <a:defRPr sz="1800" kern="1200">
+                <a:solidFill>
+                  <a:schemeClr val="tx1"/>
+                </a:solidFill>
+                <a:latin typeface="+mn-lt"/>
+                <a:ea typeface="+mn-ea"/>
+                <a:cs typeface="+mn-cs"/>
+              </a:defRPr>
+            </a:lvl7pPr>
+            <a:lvl8pPr marL="3429000" indent="-228600" algn="l" defTabSz="914400" rtl="0" eaLnBrk="1" latinLnBrk="0" hangingPunct="1">
+              <a:lnSpc>
+                <a:spcPct val="90000"/>
+              </a:lnSpc>
+              <a:spcBef>
+                <a:spcPts val="500"/>
+              </a:spcBef>
+              <a:buFont typeface="Arial" panose="020B0604020202020204" pitchFamily="34" charset="0"/>
+              <a:buChar char="•"/>
+              <a:defRPr sz="1800" kern="1200">
+                <a:solidFill>
+                  <a:schemeClr val="tx1"/>
+                </a:solidFill>
+                <a:latin typeface="+mn-lt"/>
+                <a:ea typeface="+mn-ea"/>
+                <a:cs typeface="+mn-cs"/>
+              </a:defRPr>
+            </a:lvl8pPr>
+            <a:lvl9pPr marL="3886200" indent="-228600" algn="l" defTabSz="914400" rtl="0" eaLnBrk="1" latinLnBrk="0" hangingPunct="1">
+              <a:lnSpc>
+                <a:spcPct val="90000"/>
+              </a:lnSpc>
+              <a:spcBef>
+                <a:spcPts val="500"/>
+              </a:spcBef>
+              <a:buFont typeface="Arial" panose="020B0604020202020204" pitchFamily="34" charset="0"/>
+              <a:buChar char="•"/>
+              <a:defRPr sz="1800" kern="1200">
+                <a:solidFill>
+                  <a:schemeClr val="tx1"/>
+                </a:solidFill>
+                <a:latin typeface="+mn-lt"/>
+                <a:ea typeface="+mn-ea"/>
+                <a:cs typeface="+mn-cs"/>
+              </a:defRPr>
+            </a:lvl9pPr>
+          </a:lstStyle>
+          <a:p>
+            <a:r>
+              <a:rPr lang="en-US" sz="2400" dirty="0">
+                <a:solidFill>
+                  <a:srgbClr val="333333"/>
+                </a:solidFill>
+                <a:latin typeface="inter-regular"/>
+              </a:rPr>
+              <a:t>In this</a:t>
+            </a:r>
+            <a:r>
+              <a:rPr lang="en-US" sz="2400" b="1" i="0" dirty="0">
+                <a:solidFill>
+                  <a:srgbClr val="333333"/>
+                </a:solidFill>
+                <a:effectLst/>
+                <a:latin typeface="inter-bold"/>
+              </a:rPr>
+              <a:t> </a:t>
+            </a:r>
+            <a:r>
+              <a:rPr lang="en-US" sz="2200" b="1" i="0" dirty="0">
+                <a:solidFill>
+                  <a:srgbClr val="333333"/>
+                </a:solidFill>
+                <a:effectLst/>
+                <a:latin typeface="inter-bold"/>
+              </a:rPr>
+              <a:t>"to access the elements of an aggregate object sequentially without exposing its underlying implementation".</a:t>
+            </a:r>
+          </a:p>
+          <a:p>
+            <a:pPr marL="0" indent="0">
+              <a:buNone/>
+            </a:pPr>
+            <a:r>
+              <a:rPr lang="en-US" sz="2200" b="1" u="sng" dirty="0">
+                <a:solidFill>
+                  <a:srgbClr val="333333"/>
+                </a:solidFill>
+                <a:latin typeface="inter-regular"/>
+              </a:rPr>
+              <a:t>Advantages</a:t>
+            </a:r>
+            <a:r>
+              <a:rPr lang="en-US" sz="2200" b="1" dirty="0">
+                <a:solidFill>
+                  <a:srgbClr val="333333"/>
+                </a:solidFill>
+                <a:latin typeface="inter-regular"/>
+              </a:rPr>
+              <a:t>:-</a:t>
+            </a:r>
+          </a:p>
+          <a:p>
+            <a:pPr algn="just">
+              <a:buFont typeface="Arial" panose="020B0604020202020204" pitchFamily="34" charset="0"/>
+              <a:buChar char="•"/>
+            </a:pPr>
+            <a:r>
+              <a:rPr lang="en-US" sz="2200" b="0" i="0" dirty="0">
+                <a:solidFill>
+                  <a:srgbClr val="000000"/>
+                </a:solidFill>
+                <a:effectLst/>
+                <a:latin typeface="inter-regular"/>
+              </a:rPr>
+              <a:t>It supports variations in the traversal of a collection.</a:t>
+            </a:r>
+          </a:p>
+          <a:p>
+            <a:pPr algn="just">
+              <a:buFont typeface="Arial" panose="020B0604020202020204" pitchFamily="34" charset="0"/>
+              <a:buChar char="•"/>
+            </a:pPr>
+            <a:r>
+              <a:rPr lang="en-US" sz="2200" b="0" i="0" dirty="0">
+                <a:solidFill>
+                  <a:srgbClr val="000000"/>
+                </a:solidFill>
+                <a:effectLst/>
+                <a:latin typeface="inter-regular"/>
+              </a:rPr>
+              <a:t>It simplifies the interface to the collection.</a:t>
+            </a:r>
+          </a:p>
+          <a:p>
+            <a:pPr marL="0" indent="0">
+              <a:buNone/>
+            </a:pPr>
+            <a:r>
+              <a:rPr lang="en-US" sz="2200" b="1" u="sng" dirty="0">
+                <a:solidFill>
+                  <a:srgbClr val="000000"/>
+                </a:solidFill>
+                <a:latin typeface="inter-regular"/>
+              </a:rPr>
+              <a:t>Usage</a:t>
+            </a:r>
+            <a:r>
+              <a:rPr lang="en-US" sz="2200" b="1" dirty="0">
+                <a:solidFill>
+                  <a:srgbClr val="000000"/>
+                </a:solidFill>
+                <a:latin typeface="inter-regular"/>
+              </a:rPr>
+              <a:t>:-</a:t>
+            </a:r>
+          </a:p>
+          <a:p>
+            <a:pPr algn="just">
+              <a:buFont typeface="Arial" panose="020B0604020202020204" pitchFamily="34" charset="0"/>
+              <a:buChar char="•"/>
+            </a:pPr>
+            <a:r>
+              <a:rPr lang="en-US" sz="2200" b="0" i="0" dirty="0">
+                <a:solidFill>
+                  <a:srgbClr val="000000"/>
+                </a:solidFill>
+                <a:effectLst/>
+                <a:latin typeface="inter-regular"/>
+              </a:rPr>
+              <a:t>When you want to access a collection of objects without exposing its internal representation.</a:t>
+            </a:r>
+          </a:p>
+          <a:p>
+            <a:pPr algn="just">
+              <a:buFont typeface="Arial" panose="020B0604020202020204" pitchFamily="34" charset="0"/>
+              <a:buChar char="•"/>
+            </a:pPr>
+            <a:r>
+              <a:rPr lang="en-US" sz="2200" b="0" i="0" dirty="0">
+                <a:solidFill>
+                  <a:srgbClr val="000000"/>
+                </a:solidFill>
+                <a:effectLst/>
+                <a:latin typeface="inter-regular"/>
+              </a:rPr>
+              <a:t>When there are multiple traversals of objects need to be supported in the collection.</a:t>
+            </a:r>
+          </a:p>
+          <a:p>
+            <a:pPr marL="0" indent="0" algn="just">
+              <a:buNone/>
+            </a:pPr>
+            <a:endParaRPr lang="en-US" sz="1900" b="0" i="0" dirty="0">
+              <a:solidFill>
+                <a:srgbClr val="000000"/>
+              </a:solidFill>
+              <a:effectLst/>
+              <a:latin typeface="inter-regular"/>
+            </a:endParaRPr>
+          </a:p>
+          <a:p>
+            <a:pPr marL="0" indent="0" algn="just">
+              <a:buFont typeface="Arial" panose="020B0604020202020204" pitchFamily="34" charset="0"/>
+              <a:buNone/>
+            </a:pPr>
+            <a:r>
+              <a:rPr lang="en-US" sz="2200" b="1" u="sng" dirty="0">
+                <a:solidFill>
+                  <a:schemeClr val="tx1">
+                    <a:lumMod val="95000"/>
+                    <a:lumOff val="5000"/>
+                  </a:schemeClr>
+                </a:solidFill>
+                <a:latin typeface="Google Sans"/>
+              </a:rPr>
+              <a:t>Real-Time Example</a:t>
+            </a:r>
+            <a:r>
+              <a:rPr lang="en-US" sz="2200" dirty="0">
+                <a:solidFill>
+                  <a:schemeClr val="tx1">
+                    <a:lumMod val="95000"/>
+                    <a:lumOff val="5000"/>
+                  </a:schemeClr>
+                </a:solidFill>
+                <a:latin typeface="Google Sans"/>
+              </a:rPr>
+              <a:t>:-</a:t>
+            </a:r>
+          </a:p>
+          <a:p>
+            <a:r>
+              <a:rPr lang="en-US" sz="2000" b="0" i="0" dirty="0">
+                <a:solidFill>
+                  <a:schemeClr val="tx1">
+                    <a:lumMod val="95000"/>
+                    <a:lumOff val="5000"/>
+                  </a:schemeClr>
+                </a:solidFill>
+                <a:effectLst/>
+              </a:rPr>
+              <a:t>Student Data.</a:t>
+            </a:r>
+            <a:endParaRPr lang="en-IN" sz="2000" dirty="0">
+              <a:solidFill>
+                <a:schemeClr val="tx1">
+                  <a:lumMod val="95000"/>
+                  <a:lumOff val="5000"/>
+                </a:schemeClr>
+              </a:solidFill>
+            </a:endParaRPr>
+          </a:p>
+        </p:txBody>
+      </p:sp>
+    </p:spTree>
+    <p:extLst>
+      <p:ext uri="{BB962C8B-B14F-4D97-AF65-F5344CB8AC3E}">
+        <p14:creationId xmlns:p14="http://schemas.microsoft.com/office/powerpoint/2010/main" val="3983001647"/>
       </p:ext>
     </p:extLst>
   </p:cSld>

</xml_diff>